<commit_message>
⚡ feat(word) Add report
</commit_message>
<xml_diff>
--- a/Diagrams/guides/Propuesta migracion - Perceptio.pptx
+++ b/Diagrams/guides/Propuesta migracion - Perceptio.pptx
@@ -5,22 +5,21 @@
     <p:sldMasterId id="2147483648" r:id="rId4"/>
   </p:sldMasterIdLst>
   <p:notesMasterIdLst>
-    <p:notesMasterId r:id="rId15"/>
+    <p:notesMasterId r:id="rId14"/>
   </p:notesMasterIdLst>
   <p:handoutMasterIdLst>
-    <p:handoutMasterId r:id="rId16"/>
+    <p:handoutMasterId r:id="rId15"/>
   </p:handoutMasterIdLst>
   <p:sldIdLst>
     <p:sldId id="256" r:id="rId5"/>
     <p:sldId id="265" r:id="rId6"/>
-    <p:sldId id="276" r:id="rId7"/>
-    <p:sldId id="267" r:id="rId8"/>
-    <p:sldId id="266" r:id="rId9"/>
-    <p:sldId id="277" r:id="rId10"/>
-    <p:sldId id="279" r:id="rId11"/>
-    <p:sldId id="280" r:id="rId12"/>
-    <p:sldId id="281" r:id="rId13"/>
-    <p:sldId id="278" r:id="rId14"/>
+    <p:sldId id="267" r:id="rId7"/>
+    <p:sldId id="266" r:id="rId8"/>
+    <p:sldId id="277" r:id="rId9"/>
+    <p:sldId id="279" r:id="rId10"/>
+    <p:sldId id="280" r:id="rId11"/>
+    <p:sldId id="281" r:id="rId12"/>
+    <p:sldId id="278" r:id="rId13"/>
   </p:sldIdLst>
   <p:sldSz cx="12192000" cy="6858000"/>
   <p:notesSz cx="6858000" cy="9144000"/>
@@ -176,10 +175,7 @@
             <a:pPr>
               <a:defRPr sz="1400" b="0" i="0" u="none" strike="noStrike" kern="1200" spc="0" baseline="0">
                 <a:solidFill>
-                  <a:schemeClr val="tx1">
-                    <a:lumMod val="65000"/>
-                    <a:lumOff val="35000"/>
-                  </a:schemeClr>
+                  <a:srgbClr val="FF0000"/>
                 </a:solidFill>
                 <a:latin typeface="+mn-lt"/>
                 <a:ea typeface="+mn-ea"/>
@@ -187,14 +183,26 @@
               </a:defRPr>
             </a:pPr>
             <a:r>
-              <a:rPr lang="es-CO" b="1"/>
+              <a:rPr lang="es-CO" b="1">
+                <a:solidFill>
+                  <a:srgbClr val="FF0000"/>
+                </a:solidFill>
+              </a:rPr>
               <a:t>Deadline de</a:t>
             </a:r>
             <a:r>
-              <a:rPr lang="es-CO" b="1" baseline="0"/>
+              <a:rPr lang="es-CO" b="1" baseline="0">
+                <a:solidFill>
+                  <a:srgbClr val="FF0000"/>
+                </a:solidFill>
+              </a:rPr>
               <a:t> migracion.</a:t>
             </a:r>
-            <a:endParaRPr lang="es-CO" b="1"/>
+            <a:endParaRPr lang="es-CO" b="1">
+              <a:solidFill>
+                <a:srgbClr val="FF0000"/>
+              </a:solidFill>
+            </a:endParaRPr>
           </a:p>
         </c:rich>
       </c:tx>
@@ -202,8 +210,8 @@
         <c:manualLayout>
           <c:xMode val="edge"/>
           <c:yMode val="edge"/>
-          <c:x val="0.44586351021263132"/>
-          <c:y val="4.1666677182181804E-2"/>
+          <c:x val="0.4446214700714004"/>
+          <c:y val="3.0033966195014458E-2"/>
         </c:manualLayout>
       </c:layout>
       <c:overlay val="0"/>
@@ -221,10 +229,7 @@
           <a:pPr>
             <a:defRPr sz="1400" b="0" i="0" u="none" strike="noStrike" kern="1200" spc="0" baseline="0">
               <a:solidFill>
-                <a:schemeClr val="tx1">
-                  <a:lumMod val="65000"/>
-                  <a:lumOff val="35000"/>
-                </a:schemeClr>
+                <a:srgbClr val="FF0000"/>
               </a:solidFill>
               <a:latin typeface="+mn-lt"/>
               <a:ea typeface="+mn-ea"/>
@@ -243,9 +248,9 @@
           <c:xMode val="edge"/>
           <c:yMode val="edge"/>
           <c:x val="0.23901110139010401"/>
-          <c:y val="0.29900093352537188"/>
+          <c:y val="0.24251194587391914"/>
           <c:w val="0.73926050354816764"/>
-          <c:h val="0.59242494256635947"/>
+          <c:h val="0.69130332135024841"/>
         </c:manualLayout>
       </c:layout>
       <c:barChart>
@@ -278,46 +283,88 @@
           <c:invertIfNegative val="0"/>
           <c:cat>
             <c:strRef>
-              <c:f>Gantt!$B$10:$B$22</c:f>
+              <c:f>Gantt!$B$10:$B$36</c:f>
               <c:strCache>
-                <c:ptCount val="13"/>
+                <c:ptCount val="27"/>
                 <c:pt idx="0">
                   <c:v>Análisis de Impacto.</c:v>
                 </c:pt>
                 <c:pt idx="1">
+                  <c:v>Configurar Integration Runtime.</c:v>
+                </c:pt>
+                <c:pt idx="2">
                   <c:v>Configurar workspaces en Synapse.</c:v>
                 </c:pt>
-                <c:pt idx="2">
+                <c:pt idx="3">
                   <c:v>Configurar clusters en Databricks.</c:v>
                 </c:pt>
-                <c:pt idx="3">
-                  <c:v>Crea Key Vaults, secretos.</c:v>
+                <c:pt idx="4">
+                  <c:v>Crear Key Vaults, secretos.</c:v>
                 </c:pt>
-                <c:pt idx="4">
+                <c:pt idx="5">
+                  <c:v>Configurar Storage Services.</c:v>
+                </c:pt>
+                <c:pt idx="6">
                   <c:v>Configurar instancia SQL Server.</c:v>
                 </c:pt>
-                <c:pt idx="5">
+                <c:pt idx="7">
                   <c:v>Configurar CI/CD pipelines.</c:v>
                 </c:pt>
-                <c:pt idx="6">
+                <c:pt idx="8">
                   <c:v>Exportar pipelines y datasets de ADF.</c:v>
                 </c:pt>
-                <c:pt idx="7">
+                <c:pt idx="9">
                   <c:v>Desplegar pipelines y datasets.</c:v>
                 </c:pt>
-                <c:pt idx="8">
+                <c:pt idx="10">
                   <c:v>Configurar Linked Services.</c:v>
                 </c:pt>
-                <c:pt idx="9">
+                <c:pt idx="11">
+                  <c:v>Configurar Monitor para pipelines ADF.</c:v>
+                </c:pt>
+                <c:pt idx="12">
+                  <c:v>Exportar scripts Synapse.</c:v>
+                </c:pt>
+                <c:pt idx="13">
+                  <c:v>Importar scripts en Synapse.</c:v>
+                </c:pt>
+                <c:pt idx="14">
+                  <c:v>Exportar Notebooks de Databricks.</c:v>
+                </c:pt>
+                <c:pt idx="15">
+                  <c:v>Configurar notebooks en Databricks.</c:v>
+                </c:pt>
+                <c:pt idx="16">
+                  <c:v>Exportar contenedores del Storage Account.</c:v>
+                </c:pt>
+                <c:pt idx="17">
+                  <c:v>importar datos en Storage Services.</c:v>
+                </c:pt>
+                <c:pt idx="18">
+                  <c:v>Exportar backup de  SQL Databases.</c:v>
+                </c:pt>
+                <c:pt idx="19">
+                  <c:v>Importar tablas en SQL Databases.</c:v>
+                </c:pt>
+                <c:pt idx="20">
                   <c:v>Ejecutar Pipelines.</c:v>
                 </c:pt>
-                <c:pt idx="10">
+                <c:pt idx="21">
+                  <c:v>Exportar Logic Apps.</c:v>
+                </c:pt>
+                <c:pt idx="22">
+                  <c:v>importar Logic Apps.</c:v>
+                </c:pt>
+                <c:pt idx="23">
+                  <c:v>Configurar Insights Logic Apps.</c:v>
+                </c:pt>
+                <c:pt idx="24">
                   <c:v>Validación.</c:v>
                 </c:pt>
-                <c:pt idx="11">
-                  <c:v>Monitoreo y Optimización.</c:v>
+                <c:pt idx="25">
+                  <c:v>Optimización.</c:v>
                 </c:pt>
-                <c:pt idx="12">
+                <c:pt idx="26">
                   <c:v>Evaluacion.</c:v>
                 </c:pt>
               </c:strCache>
@@ -325,10 +372,10 @@
           </c:cat>
           <c:val>
             <c:numRef>
-              <c:f>Gantt!$C$10:$C$22</c:f>
+              <c:f>Gantt!$C$10:$C$36</c:f>
               <c:numCache>
                 <c:formatCode>m/d/yyyy</c:formatCode>
-                <c:ptCount val="13"/>
+                <c:ptCount val="27"/>
                 <c:pt idx="0">
                   <c:v>45551</c:v>
                 </c:pt>
@@ -336,7 +383,7 @@
                   <c:v>45558</c:v>
                 </c:pt>
                 <c:pt idx="2">
-                  <c:v>45562</c:v>
+                  <c:v>45560</c:v>
                 </c:pt>
                 <c:pt idx="3">
                   <c:v>45565</c:v>
@@ -351,16 +398,16 @@
                   <c:v>45574</c:v>
                 </c:pt>
                 <c:pt idx="7">
-                  <c:v>45575</c:v>
+                  <c:v>45579</c:v>
                 </c:pt>
                 <c:pt idx="8">
-                  <c:v>45576</c:v>
+                  <c:v>45581</c:v>
                 </c:pt>
                 <c:pt idx="9">
-                  <c:v>45579</c:v>
+                  <c:v>45582</c:v>
                 </c:pt>
                 <c:pt idx="10">
-                  <c:v>45581</c:v>
+                  <c:v>45583</c:v>
                 </c:pt>
                 <c:pt idx="11">
                   <c:v>45586</c:v>
@@ -368,12 +415,54 @@
                 <c:pt idx="12">
                   <c:v>45587</c:v>
                 </c:pt>
+                <c:pt idx="13">
+                  <c:v>45588</c:v>
+                </c:pt>
+                <c:pt idx="14">
+                  <c:v>45590</c:v>
+                </c:pt>
+                <c:pt idx="15">
+                  <c:v>45593</c:v>
+                </c:pt>
+                <c:pt idx="16">
+                  <c:v>45595</c:v>
+                </c:pt>
+                <c:pt idx="17">
+                  <c:v>45596</c:v>
+                </c:pt>
+                <c:pt idx="18">
+                  <c:v>45600</c:v>
+                </c:pt>
+                <c:pt idx="19">
+                  <c:v>45628</c:v>
+                </c:pt>
+                <c:pt idx="20">
+                  <c:v>45630</c:v>
+                </c:pt>
+                <c:pt idx="21">
+                  <c:v>45635</c:v>
+                </c:pt>
+                <c:pt idx="22">
+                  <c:v>45642</c:v>
+                </c:pt>
+                <c:pt idx="23">
+                  <c:v>45644</c:v>
+                </c:pt>
+                <c:pt idx="24">
+                  <c:v>45645</c:v>
+                </c:pt>
+                <c:pt idx="25">
+                  <c:v>45649</c:v>
+                </c:pt>
+                <c:pt idx="26">
+                  <c:v>45650</c:v>
+                </c:pt>
               </c:numCache>
             </c:numRef>
           </c:val>
           <c:extLst>
             <c:ext xmlns:c16="http://schemas.microsoft.com/office/drawing/2014/chart" uri="{C3380CC4-5D6E-409C-BE32-E72D297353CC}">
-              <c16:uniqueId val="{00000000-8EC5-43D8-A9A3-15F3ED06FF28}"/>
+              <c16:uniqueId val="{00000000-82C4-48C1-9871-DFEB3A918CD9}"/>
             </c:ext>
           </c:extLst>
         </c:ser>
@@ -416,12 +505,9 @@
               <a:lstStyle/>
               <a:p>
                 <a:pPr>
-                  <a:defRPr sz="900" b="0" i="0" u="none" strike="noStrike" kern="1200" baseline="0">
+                  <a:defRPr sz="700" b="1" i="0" u="none" strike="noStrike" kern="1200" baseline="0">
                     <a:solidFill>
-                      <a:schemeClr val="bg1">
-                        <a:lumMod val="75000"/>
-                        <a:lumOff val="25000"/>
-                      </a:schemeClr>
+                      <a:schemeClr val="bg1"/>
                     </a:solidFill>
                     <a:latin typeface="+mn-lt"/>
                     <a:ea typeface="+mn-ea"/>
@@ -461,46 +547,88 @@
           </c:dLbls>
           <c:cat>
             <c:strRef>
-              <c:f>Gantt!$B$10:$B$22</c:f>
+              <c:f>Gantt!$B$10:$B$36</c:f>
               <c:strCache>
-                <c:ptCount val="13"/>
+                <c:ptCount val="27"/>
                 <c:pt idx="0">
                   <c:v>Análisis de Impacto.</c:v>
                 </c:pt>
                 <c:pt idx="1">
+                  <c:v>Configurar Integration Runtime.</c:v>
+                </c:pt>
+                <c:pt idx="2">
                   <c:v>Configurar workspaces en Synapse.</c:v>
                 </c:pt>
-                <c:pt idx="2">
+                <c:pt idx="3">
                   <c:v>Configurar clusters en Databricks.</c:v>
                 </c:pt>
-                <c:pt idx="3">
-                  <c:v>Crea Key Vaults, secretos.</c:v>
+                <c:pt idx="4">
+                  <c:v>Crear Key Vaults, secretos.</c:v>
                 </c:pt>
-                <c:pt idx="4">
+                <c:pt idx="5">
+                  <c:v>Configurar Storage Services.</c:v>
+                </c:pt>
+                <c:pt idx="6">
                   <c:v>Configurar instancia SQL Server.</c:v>
                 </c:pt>
-                <c:pt idx="5">
+                <c:pt idx="7">
                   <c:v>Configurar CI/CD pipelines.</c:v>
                 </c:pt>
-                <c:pt idx="6">
+                <c:pt idx="8">
                   <c:v>Exportar pipelines y datasets de ADF.</c:v>
                 </c:pt>
-                <c:pt idx="7">
+                <c:pt idx="9">
                   <c:v>Desplegar pipelines y datasets.</c:v>
                 </c:pt>
-                <c:pt idx="8">
+                <c:pt idx="10">
                   <c:v>Configurar Linked Services.</c:v>
                 </c:pt>
-                <c:pt idx="9">
+                <c:pt idx="11">
+                  <c:v>Configurar Monitor para pipelines ADF.</c:v>
+                </c:pt>
+                <c:pt idx="12">
+                  <c:v>Exportar scripts Synapse.</c:v>
+                </c:pt>
+                <c:pt idx="13">
+                  <c:v>Importar scripts en Synapse.</c:v>
+                </c:pt>
+                <c:pt idx="14">
+                  <c:v>Exportar Notebooks de Databricks.</c:v>
+                </c:pt>
+                <c:pt idx="15">
+                  <c:v>Configurar notebooks en Databricks.</c:v>
+                </c:pt>
+                <c:pt idx="16">
+                  <c:v>Exportar contenedores del Storage Account.</c:v>
+                </c:pt>
+                <c:pt idx="17">
+                  <c:v>importar datos en Storage Services.</c:v>
+                </c:pt>
+                <c:pt idx="18">
+                  <c:v>Exportar backup de  SQL Databases.</c:v>
+                </c:pt>
+                <c:pt idx="19">
+                  <c:v>Importar tablas en SQL Databases.</c:v>
+                </c:pt>
+                <c:pt idx="20">
                   <c:v>Ejecutar Pipelines.</c:v>
                 </c:pt>
-                <c:pt idx="10">
+                <c:pt idx="21">
+                  <c:v>Exportar Logic Apps.</c:v>
+                </c:pt>
+                <c:pt idx="22">
+                  <c:v>importar Logic Apps.</c:v>
+                </c:pt>
+                <c:pt idx="23">
+                  <c:v>Configurar Insights Logic Apps.</c:v>
+                </c:pt>
+                <c:pt idx="24">
                   <c:v>Validación.</c:v>
                 </c:pt>
-                <c:pt idx="11">
-                  <c:v>Monitoreo y Optimización.</c:v>
+                <c:pt idx="25">
+                  <c:v>Optimización.</c:v>
                 </c:pt>
-                <c:pt idx="12">
+                <c:pt idx="26">
                   <c:v>Evaluacion.</c:v>
                 </c:pt>
               </c:strCache>
@@ -508,18 +636,18 @@
           </c:cat>
           <c:val>
             <c:numRef>
-              <c:f>Gantt!$D$10:$D$22</c:f>
+              <c:f>Gantt!$D$10:$D$36</c:f>
               <c:numCache>
                 <c:formatCode>General</c:formatCode>
-                <c:ptCount val="13"/>
+                <c:ptCount val="27"/>
                 <c:pt idx="0">
                   <c:v>7</c:v>
                 </c:pt>
                 <c:pt idx="1">
-                  <c:v>4</c:v>
+                  <c:v>2</c:v>
                 </c:pt>
                 <c:pt idx="2">
-                  <c:v>3</c:v>
+                  <c:v>5</c:v>
                 </c:pt>
                 <c:pt idx="3">
                   <c:v>2</c:v>
@@ -531,24 +659,66 @@
                   <c:v>2</c:v>
                 </c:pt>
                 <c:pt idx="6">
+                  <c:v>5</c:v>
+                </c:pt>
+                <c:pt idx="7">
+                  <c:v>2</c:v>
+                </c:pt>
+                <c:pt idx="8">
                   <c:v>1</c:v>
                 </c:pt>
-                <c:pt idx="7">
+                <c:pt idx="9">
                   <c:v>1</c:v>
                 </c:pt>
-                <c:pt idx="8">
+                <c:pt idx="10">
                   <c:v>3</c:v>
-                </c:pt>
-                <c:pt idx="9">
-                  <c:v>2</c:v>
-                </c:pt>
-                <c:pt idx="10">
-                  <c:v>5</c:v>
                 </c:pt>
                 <c:pt idx="11">
                   <c:v>1</c:v>
                 </c:pt>
                 <c:pt idx="12">
+                  <c:v>1</c:v>
+                </c:pt>
+                <c:pt idx="13">
+                  <c:v>2</c:v>
+                </c:pt>
+                <c:pt idx="14">
+                  <c:v>3</c:v>
+                </c:pt>
+                <c:pt idx="15">
+                  <c:v>2</c:v>
+                </c:pt>
+                <c:pt idx="16">
+                  <c:v>1</c:v>
+                </c:pt>
+                <c:pt idx="17">
+                  <c:v>4</c:v>
+                </c:pt>
+                <c:pt idx="18">
+                  <c:v>28</c:v>
+                </c:pt>
+                <c:pt idx="19">
+                  <c:v>2</c:v>
+                </c:pt>
+                <c:pt idx="20">
+                  <c:v>5</c:v>
+                </c:pt>
+                <c:pt idx="21">
+                  <c:v>7</c:v>
+                </c:pt>
+                <c:pt idx="22">
+                  <c:v>2</c:v>
+                </c:pt>
+                <c:pt idx="23">
+                  <c:v>1</c:v>
+                </c:pt>
+                <c:pt idx="24">
+                  <c:v>4</c:v>
+                </c:pt>
+                <c:pt idx="25">
+                  <c:v>1</c:v>
+                </c:pt>
+                <c:pt idx="26">
                   <c:v>6</c:v>
                 </c:pt>
               </c:numCache>
@@ -556,7 +726,7 @@
           </c:val>
           <c:extLst>
             <c:ext xmlns:c16="http://schemas.microsoft.com/office/drawing/2014/chart" uri="{C3380CC4-5D6E-409C-BE32-E72D297353CC}">
-              <c16:uniqueId val="{00000001-8EC5-43D8-A9A3-15F3ED06FF28}"/>
+              <c16:uniqueId val="{00000001-82C4-48C1-9871-DFEB3A918CD9}"/>
             </c:ext>
           </c:extLst>
         </c:ser>
@@ -602,12 +772,9 @@
           <a:lstStyle/>
           <a:p>
             <a:pPr>
-              <a:defRPr sz="1200" b="1" i="0" u="none" strike="noStrike" kern="1200" baseline="0">
+              <a:defRPr sz="900" b="1" i="0" u="none" strike="noStrike" kern="1200" baseline="0">
                 <a:solidFill>
-                  <a:schemeClr val="tx1">
-                    <a:lumMod val="65000"/>
-                    <a:lumOff val="35000"/>
-                  </a:schemeClr>
+                  <a:srgbClr val="FFFF00"/>
                 </a:solidFill>
                 <a:latin typeface="+mn-lt"/>
                 <a:ea typeface="+mn-ea"/>
@@ -628,7 +795,7 @@
         <c:axId val="1184412656"/>
         <c:scaling>
           <c:orientation val="minMax"/>
-          <c:max val="45593"/>
+          <c:max val="45657"/>
           <c:min val="45551"/>
         </c:scaling>
         <c:delete val="0"/>
@@ -665,10 +832,7 @@
             <a:pPr>
               <a:defRPr sz="900" b="1" i="0" u="none" strike="noStrike" kern="1200" baseline="0">
                 <a:solidFill>
-                  <a:schemeClr val="tx1">
-                    <a:lumMod val="65000"/>
-                    <a:lumOff val="35000"/>
-                  </a:schemeClr>
+                  <a:srgbClr val="FFFF00"/>
                 </a:solidFill>
                 <a:latin typeface="+mn-lt"/>
                 <a:ea typeface="+mn-ea"/>
@@ -692,6 +856,16 @@
     </c:plotArea>
     <c:legend>
       <c:legendPos val="b"/>
+      <c:layout>
+        <c:manualLayout>
+          <c:xMode val="edge"/>
+          <c:yMode val="edge"/>
+          <c:x val="0.41818479185210661"/>
+          <c:y val="0.94617187205666287"/>
+          <c:w val="0.16363041629578678"/>
+          <c:h val="3.4689371962475977E-2"/>
+        </c:manualLayout>
+      </c:layout>
       <c:overlay val="0"/>
       <c:spPr>
         <a:noFill/>
@@ -1384,7 +1558,7 @@
             <a:pPr algn="r" rtl="0"/>
             <a:fld id="{C57DE37D-B738-4817-B751-0C1B86D8B665}" type="datetime1">
               <a:rPr lang="es-ES" smtClean="0"/>
-              <a:t>13/09/2024</a:t>
+              <a:t>15/09/2024</a:t>
             </a:fld>
             <a:endParaRPr dirty="0"/>
           </a:p>
@@ -1554,7 +1728,7 @@
             <a:fld id="{17BB30D9-D505-4352-B274-A1AB529BC646}" type="datetime1">
               <a:rPr lang="es-ES" smtClean="0"/>
               <a:pPr/>
-              <a:t>13/09/2024</a:t>
+              <a:t>15/09/2024</a:t>
             </a:fld>
             <a:endParaRPr lang="es-ES" dirty="0"/>
           </a:p>
@@ -1984,7 +2158,7 @@
     </p:spTree>
     <p:extLst>
       <p:ext uri="{BB962C8B-B14F-4D97-AF65-F5344CB8AC3E}">
-        <p14:creationId xmlns:p14="http://schemas.microsoft.com/office/powerpoint/2010/main" val="2275032356"/>
+        <p14:creationId xmlns:p14="http://schemas.microsoft.com/office/powerpoint/2010/main" val="1962836447"/>
       </p:ext>
     </p:extLst>
   </p:cSld>
@@ -2069,7 +2243,7 @@
     </p:spTree>
     <p:extLst>
       <p:ext uri="{BB962C8B-B14F-4D97-AF65-F5344CB8AC3E}">
-        <p14:creationId xmlns:p14="http://schemas.microsoft.com/office/powerpoint/2010/main" val="1962836447"/>
+        <p14:creationId xmlns:p14="http://schemas.microsoft.com/office/powerpoint/2010/main" val="3171899052"/>
       </p:ext>
     </p:extLst>
   </p:cSld>
@@ -2154,7 +2328,7 @@
     </p:spTree>
     <p:extLst>
       <p:ext uri="{BB962C8B-B14F-4D97-AF65-F5344CB8AC3E}">
-        <p14:creationId xmlns:p14="http://schemas.microsoft.com/office/powerpoint/2010/main" val="3171899052"/>
+        <p14:creationId xmlns:p14="http://schemas.microsoft.com/office/powerpoint/2010/main" val="1351420944"/>
       </p:ext>
     </p:extLst>
   </p:cSld>
@@ -2239,7 +2413,7 @@
     </p:spTree>
     <p:extLst>
       <p:ext uri="{BB962C8B-B14F-4D97-AF65-F5344CB8AC3E}">
-        <p14:creationId xmlns:p14="http://schemas.microsoft.com/office/powerpoint/2010/main" val="1351420944"/>
+        <p14:creationId xmlns:p14="http://schemas.microsoft.com/office/powerpoint/2010/main" val="1651911614"/>
       </p:ext>
     </p:extLst>
   </p:cSld>
@@ -2324,7 +2498,7 @@
     </p:spTree>
     <p:extLst>
       <p:ext uri="{BB962C8B-B14F-4D97-AF65-F5344CB8AC3E}">
-        <p14:creationId xmlns:p14="http://schemas.microsoft.com/office/powerpoint/2010/main" val="1651911614"/>
+        <p14:creationId xmlns:p14="http://schemas.microsoft.com/office/powerpoint/2010/main" val="3219785553"/>
       </p:ext>
     </p:extLst>
   </p:cSld>
@@ -2401,91 +2575,6 @@
               <a:rPr lang="es-ES" smtClean="0"/>
               <a:pPr/>
               <a:t>8</a:t>
-            </a:fld>
-            <a:endParaRPr lang="es-ES" dirty="0"/>
-          </a:p>
-        </p:txBody>
-      </p:sp>
-    </p:spTree>
-    <p:extLst>
-      <p:ext uri="{BB962C8B-B14F-4D97-AF65-F5344CB8AC3E}">
-        <p14:creationId xmlns:p14="http://schemas.microsoft.com/office/powerpoint/2010/main" val="3219785553"/>
-      </p:ext>
-    </p:extLst>
-  </p:cSld>
-  <p:clrMapOvr>
-    <a:masterClrMapping/>
-  </p:clrMapOvr>
-</p:notes>
-</file>
-
-<file path=ppt/notesSlides/notesSlide8.xml><?xml version="1.0" encoding="utf-8"?>
-<p:notes xmlns:a="http://schemas.openxmlformats.org/drawingml/2006/main" xmlns:r="http://schemas.openxmlformats.org/officeDocument/2006/relationships" xmlns:p="http://schemas.openxmlformats.org/presentationml/2006/main">
-  <p:cSld>
-    <p:spTree>
-      <p:nvGrpSpPr>
-        <p:cNvPr id="1" name=""/>
-        <p:cNvGrpSpPr/>
-        <p:nvPr/>
-      </p:nvGrpSpPr>
-      <p:grpSpPr>
-        <a:xfrm>
-          <a:off x="0" y="0"/>
-          <a:ext cx="0" cy="0"/>
-          <a:chOff x="0" y="0"/>
-          <a:chExt cx="0" cy="0"/>
-        </a:xfrm>
-      </p:grpSpPr>
-      <p:sp>
-        <p:nvSpPr>
-          <p:cNvPr id="2" name="Marcador de imagen de diapositiva 1"/>
-          <p:cNvSpPr>
-            <a:spLocks noGrp="1" noRot="1" noChangeAspect="1"/>
-          </p:cNvSpPr>
-          <p:nvPr>
-            <p:ph type="sldImg"/>
-          </p:nvPr>
-        </p:nvSpPr>
-        <p:spPr/>
-      </p:sp>
-      <p:sp>
-        <p:nvSpPr>
-          <p:cNvPr id="3" name="Marcador de notas 2"/>
-          <p:cNvSpPr>
-            <a:spLocks noGrp="1"/>
-          </p:cNvSpPr>
-          <p:nvPr>
-            <p:ph type="body" idx="1"/>
-          </p:nvPr>
-        </p:nvSpPr>
-        <p:spPr/>
-        <p:txBody>
-          <a:bodyPr/>
-          <a:lstStyle/>
-          <a:p>
-            <a:endParaRPr lang="es-ES"/>
-          </a:p>
-        </p:txBody>
-      </p:sp>
-      <p:sp>
-        <p:nvSpPr>
-          <p:cNvPr id="4" name="Marcador de número de diapositiva 3"/>
-          <p:cNvSpPr>
-            <a:spLocks noGrp="1"/>
-          </p:cNvSpPr>
-          <p:nvPr>
-            <p:ph type="sldNum" sz="quarter" idx="10"/>
-          </p:nvPr>
-        </p:nvSpPr>
-        <p:spPr/>
-        <p:txBody>
-          <a:bodyPr/>
-          <a:lstStyle/>
-          <a:p>
-            <a:fld id="{5EE2CF44-2B13-41B4-A334-1CDF534EEBBF}" type="slidenum">
-              <a:rPr lang="es-ES" smtClean="0"/>
-              <a:pPr/>
-              <a:t>9</a:t>
             </a:fld>
             <a:endParaRPr lang="es-ES" dirty="0"/>
           </a:p>
@@ -2877,7 +2966,7 @@
             <a:fld id="{FC1B432D-78E7-40AE-81C6-52773394A046}" type="datetime1">
               <a:rPr lang="es-ES" smtClean="0"/>
               <a:pPr/>
-              <a:t>13/09/2024</a:t>
+              <a:t>15/09/2024</a:t>
             </a:fld>
             <a:endParaRPr lang="es-ES" dirty="0"/>
           </a:p>
@@ -3067,7 +3156,7 @@
             <a:fld id="{E062C603-371F-4D8B-AFB8-8337237C6271}" type="datetime1">
               <a:rPr lang="es-ES" smtClean="0"/>
               <a:pPr algn="r"/>
-              <a:t>13/09/2024</a:t>
+              <a:t>15/09/2024</a:t>
             </a:fld>
             <a:endParaRPr lang="es-ES" dirty="0"/>
           </a:p>
@@ -3250,7 +3339,7 @@
             <a:fld id="{D1AE6EBB-BEC9-4000-8D95-40B44C4E2CA6}" type="datetime1">
               <a:rPr lang="es-ES" smtClean="0"/>
               <a:pPr/>
-              <a:t>13/09/2024</a:t>
+              <a:t>15/09/2024</a:t>
             </a:fld>
             <a:endParaRPr lang="es-ES" dirty="0"/>
           </a:p>
@@ -3695,7 +3784,7 @@
             <a:fld id="{7CAF1BE7-5365-4137-AE14-A7C362FC891C}" type="datetime1">
               <a:rPr lang="es-ES" smtClean="0"/>
               <a:pPr/>
-              <a:t>13/09/2024</a:t>
+              <a:t>15/09/2024</a:t>
             </a:fld>
             <a:endParaRPr lang="es-ES" dirty="0"/>
           </a:p>
@@ -4144,7 +4233,7 @@
             <a:fld id="{CCE83AA6-4601-4BF7-BD54-99DD2B193FD1}" type="datetime1">
               <a:rPr lang="es-ES" smtClean="0"/>
               <a:pPr/>
-              <a:t>13/09/2024</a:t>
+              <a:t>15/09/2024</a:t>
             </a:fld>
             <a:endParaRPr lang="es-ES" dirty="0"/>
           </a:p>
@@ -4271,7 +4360,7 @@
             <a:fld id="{808DBE58-23DC-4EE9-8158-B69AC44D4A43}" type="datetime1">
               <a:rPr lang="es-ES" smtClean="0"/>
               <a:pPr/>
-              <a:t>13/09/2024</a:t>
+              <a:t>15/09/2024</a:t>
             </a:fld>
             <a:endParaRPr lang="es-ES" dirty="0"/>
           </a:p>
@@ -4374,7 +4463,7 @@
             <a:fld id="{97C2EBBF-D49B-4842-B69E-CE552000DC09}" type="datetime1">
               <a:rPr lang="es-ES" smtClean="0"/>
               <a:pPr/>
-              <a:t>13/09/2024</a:t>
+              <a:t>15/09/2024</a:t>
             </a:fld>
             <a:endParaRPr lang="es-ES" dirty="0"/>
           </a:p>
@@ -4668,7 +4757,7 @@
             <a:fld id="{AF364E66-D00E-49A9-9E62-AB0485562249}" type="datetime1">
               <a:rPr lang="es-ES" smtClean="0"/>
               <a:pPr algn="r"/>
-              <a:t>13/09/2024</a:t>
+              <a:t>15/09/2024</a:t>
             </a:fld>
             <a:endParaRPr lang="es-ES" dirty="0"/>
           </a:p>
@@ -4994,7 +5083,7 @@
             <a:fld id="{8EB92E29-7FB2-4284-9496-FE061DBF8A30}" type="datetime1">
               <a:rPr lang="es-ES" smtClean="0"/>
               <a:pPr/>
-              <a:t>13/09/2024</a:t>
+              <a:t>15/09/2024</a:t>
             </a:fld>
             <a:endParaRPr lang="es-ES" dirty="0"/>
           </a:p>
@@ -5210,7 +5299,7 @@
             <a:fld id="{F03D15E0-E6C7-48CB-A009-DF16BCB95302}" type="datetime1">
               <a:rPr lang="es-ES" smtClean="0"/>
               <a:pPr/>
-              <a:t>13/09/2024</a:t>
+              <a:t>15/09/2024</a:t>
             </a:fld>
             <a:endParaRPr lang="es-ES" dirty="0"/>
           </a:p>
@@ -5820,126 +5909,6 @@
 </p:sld>
 </file>
 
-<file path=ppt/slides/slide10.xml><?xml version="1.0" encoding="utf-8"?>
-<p:sld xmlns:a="http://schemas.openxmlformats.org/drawingml/2006/main" xmlns:r="http://schemas.openxmlformats.org/officeDocument/2006/relationships" xmlns:p="http://schemas.openxmlformats.org/presentationml/2006/main">
-  <p:cSld>
-    <p:spTree>
-      <p:nvGrpSpPr>
-        <p:cNvPr id="1" name=""/>
-        <p:cNvGrpSpPr/>
-        <p:nvPr/>
-      </p:nvGrpSpPr>
-      <p:grpSpPr>
-        <a:xfrm>
-          <a:off x="0" y="0"/>
-          <a:ext cx="0" cy="0"/>
-          <a:chOff x="0" y="0"/>
-          <a:chExt cx="0" cy="0"/>
-        </a:xfrm>
-      </p:grpSpPr>
-      <p:sp>
-        <p:nvSpPr>
-          <p:cNvPr id="2" name="Título 1"/>
-          <p:cNvSpPr>
-            <a:spLocks noGrp="1"/>
-          </p:cNvSpPr>
-          <p:nvPr>
-            <p:ph type="ctrTitle"/>
-          </p:nvPr>
-        </p:nvSpPr>
-        <p:spPr>
-          <a:xfrm>
-            <a:off x="4511824" y="3789040"/>
-            <a:ext cx="3456384" cy="576064"/>
-          </a:xfrm>
-        </p:spPr>
-        <p:txBody>
-          <a:bodyPr rtlCol="0">
-            <a:noAutofit/>
-          </a:bodyPr>
-          <a:lstStyle/>
-          <a:p>
-            <a:pPr algn="ctr" rtl="0"/>
-            <a:r>
-              <a:rPr lang="es-MX" sz="3600" dirty="0"/>
-              <a:t>¡¡¡Gracias!!!</a:t>
-            </a:r>
-            <a:endParaRPr lang="es-ES" sz="3600" dirty="0"/>
-          </a:p>
-        </p:txBody>
-      </p:sp>
-      <p:pic>
-        <p:nvPicPr>
-          <p:cNvPr id="1026" name="Picture 2">
-            <a:extLst>
-              <a:ext uri="{FF2B5EF4-FFF2-40B4-BE49-F238E27FC236}">
-                <a16:creationId xmlns:a16="http://schemas.microsoft.com/office/drawing/2014/main" id="{A3FBFA89-3E25-4875-997A-79EBB0930C0C}"/>
-              </a:ext>
-            </a:extLst>
-          </p:cNvPr>
-          <p:cNvPicPr>
-            <a:picLocks noChangeAspect="1" noChangeArrowheads="1"/>
-          </p:cNvPicPr>
-          <p:nvPr/>
-        </p:nvPicPr>
-        <p:blipFill>
-          <a:blip r:embed="rId2">
-            <a:extLst>
-              <a:ext uri="{28A0092B-C50C-407E-A947-70E740481C1C}">
-                <a14:useLocalDpi xmlns:a14="http://schemas.microsoft.com/office/drawing/2010/main" val="0"/>
-              </a:ext>
-            </a:extLst>
-          </a:blip>
-          <a:srcRect/>
-          <a:stretch>
-            <a:fillRect/>
-          </a:stretch>
-        </p:blipFill>
-        <p:spPr bwMode="auto">
-          <a:xfrm>
-            <a:off x="9696400" y="5081946"/>
-            <a:ext cx="2319868" cy="456241"/>
-          </a:xfrm>
-          <a:prstGeom prst="rect">
-            <a:avLst/>
-          </a:prstGeom>
-          <a:noFill/>
-          <a:extLst>
-            <a:ext uri="{909E8E84-426E-40DD-AFC4-6F175D3DCCD1}">
-              <a14:hiddenFill xmlns:a14="http://schemas.microsoft.com/office/drawing/2010/main">
-                <a:solidFill>
-                  <a:srgbClr val="FFFFFF"/>
-                </a:solidFill>
-              </a14:hiddenFill>
-            </a:ext>
-          </a:extLst>
-        </p:spPr>
-      </p:pic>
-    </p:spTree>
-    <p:extLst>
-      <p:ext uri="{BB962C8B-B14F-4D97-AF65-F5344CB8AC3E}">
-        <p14:creationId xmlns:p14="http://schemas.microsoft.com/office/powerpoint/2010/main" val="881312324"/>
-      </p:ext>
-    </p:extLst>
-  </p:cSld>
-  <p:clrMapOvr>
-    <a:masterClrMapping/>
-  </p:clrMapOvr>
-  <mc:AlternateContent xmlns:mc="http://schemas.openxmlformats.org/markup-compatibility/2006" xmlns:p14="http://schemas.microsoft.com/office/powerpoint/2010/main">
-    <mc:Choice Requires="p14">
-      <p:transition spd="med" p14:dur="700">
-        <p:fade/>
-      </p:transition>
-    </mc:Choice>
-    <mc:Fallback xmlns="">
-      <p:transition spd="med">
-        <p:fade/>
-      </p:transition>
-    </mc:Fallback>
-  </mc:AlternateContent>
-</p:sld>
-</file>
-
 <file path=ppt/slides/slide2.xml><?xml version="1.0" encoding="utf-8"?>
 <p:sld xmlns:a="http://schemas.openxmlformats.org/drawingml/2006/main" xmlns:r="http://schemas.openxmlformats.org/officeDocument/2006/relationships" xmlns:p="http://schemas.openxmlformats.org/presentationml/2006/main">
   <p:cSld>
@@ -6004,28 +5973,12 @@
         <p:spPr>
           <a:xfrm>
             <a:off x="1524000" y="1828800"/>
-            <a:ext cx="3923928" cy="3400400"/>
+            <a:ext cx="3131840" cy="2896344"/>
           </a:xfrm>
         </p:spPr>
         <p:txBody>
           <a:bodyPr rtlCol="0"/>
           <a:lstStyle/>
-          <a:p>
-            <a:pPr marL="0" indent="0" rtl="0">
-              <a:buNone/>
-            </a:pPr>
-            <a:r>
-              <a:rPr lang="es-CO" dirty="0"/>
-              <a:t>📊 </a:t>
-            </a:r>
-            <a:r>
-              <a:rPr lang="es-CO" dirty="0">
-                <a:hlinkClick r:id="rId3" action="ppaction://hlinksldjump"/>
-              </a:rPr>
-              <a:t>Situación Actual.</a:t>
-            </a:r>
-            <a:endParaRPr lang="es-CO" dirty="0"/>
-          </a:p>
           <a:p>
             <a:pPr marL="0" indent="0">
               <a:buNone/>
@@ -6036,7 +5989,7 @@
             </a:r>
             <a:r>
               <a:rPr lang="es-CO" dirty="0">
-                <a:hlinkClick r:id="rId4" action="ppaction://hlinksldjump"/>
+                <a:hlinkClick r:id="rId3" action="ppaction://hlinksldjump"/>
               </a:rPr>
               <a:t>Desafíos.</a:t>
             </a:r>
@@ -6052,7 +6005,7 @@
             </a:r>
             <a:r>
               <a:rPr lang="es-CO" dirty="0">
-                <a:hlinkClick r:id="rId5" action="ppaction://hlinksldjump"/>
+                <a:hlinkClick r:id="rId4" action="ppaction://hlinksldjump"/>
               </a:rPr>
               <a:t>Propuesta.</a:t>
             </a:r>
@@ -6068,7 +6021,7 @@
             </a:r>
             <a:r>
               <a:rPr lang="es-CO" dirty="0">
-                <a:hlinkClick r:id="rId6" action="ppaction://hlinksldjump"/>
+                <a:hlinkClick r:id="rId5" action="ppaction://hlinksldjump"/>
               </a:rPr>
               <a:t>Plan de Acción.</a:t>
             </a:r>
@@ -6084,7 +6037,7 @@
             </a:r>
             <a:r>
               <a:rPr lang="es-CO" dirty="0">
-                <a:hlinkClick r:id="rId7" action="ppaction://hlinksldjump"/>
+                <a:hlinkClick r:id="rId6" action="ppaction://hlinksldjump"/>
               </a:rPr>
               <a:t>Riesgos y Mitigaciones.</a:t>
             </a:r>
@@ -6100,7 +6053,7 @@
             </a:r>
             <a:r>
               <a:rPr lang="es-CO" dirty="0">
-                <a:hlinkClick r:id="rId8" action="ppaction://hlinksldjump"/>
+                <a:hlinkClick r:id="rId7" action="ppaction://hlinksldjump"/>
               </a:rPr>
               <a:t>Requerimientos.</a:t>
             </a:r>
@@ -6116,7 +6069,7 @@
             </a:r>
             <a:r>
               <a:rPr lang="es-CO" dirty="0">
-                <a:hlinkClick r:id="rId9" action="ppaction://hlinksldjump"/>
+                <a:hlinkClick r:id="rId8" action="ppaction://hlinksldjump"/>
               </a:rPr>
               <a:t>Alternativas.</a:t>
             </a:r>
@@ -6142,420 +6095,6 @@
 </file>
 
 <file path=ppt/slides/slide3.xml><?xml version="1.0" encoding="utf-8"?>
-<p:sld xmlns:a="http://schemas.openxmlformats.org/drawingml/2006/main" xmlns:r="http://schemas.openxmlformats.org/officeDocument/2006/relationships" xmlns:p="http://schemas.openxmlformats.org/presentationml/2006/main">
-  <p:cSld>
-    <p:spTree>
-      <p:nvGrpSpPr>
-        <p:cNvPr id="1" name=""/>
-        <p:cNvGrpSpPr/>
-        <p:nvPr/>
-      </p:nvGrpSpPr>
-      <p:grpSpPr>
-        <a:xfrm>
-          <a:off x="0" y="0"/>
-          <a:ext cx="0" cy="0"/>
-          <a:chOff x="0" y="0"/>
-          <a:chExt cx="0" cy="0"/>
-        </a:xfrm>
-      </p:grpSpPr>
-      <p:sp>
-        <p:nvSpPr>
-          <p:cNvPr id="2" name="Título 1"/>
-          <p:cNvSpPr>
-            <a:spLocks noGrp="1"/>
-          </p:cNvSpPr>
-          <p:nvPr>
-            <p:ph type="title"/>
-          </p:nvPr>
-        </p:nvSpPr>
-        <p:spPr>
-          <a:xfrm>
-            <a:off x="1524000" y="1052736"/>
-            <a:ext cx="4644008" cy="547464"/>
-          </a:xfrm>
-        </p:spPr>
-        <p:txBody>
-          <a:bodyPr rtlCol="0">
-            <a:normAutofit fontScale="90000"/>
-          </a:bodyPr>
-          <a:lstStyle/>
-          <a:p>
-            <a:pPr marL="0" indent="0">
-              <a:buNone/>
-            </a:pPr>
-            <a:r>
-              <a:rPr lang="es-CO" b="1" dirty="0"/>
-              <a:t>📊 Situación Actual.</a:t>
-            </a:r>
-          </a:p>
-        </p:txBody>
-      </p:sp>
-      <p:graphicFrame>
-        <p:nvGraphicFramePr>
-          <p:cNvPr id="5" name="Marcador de posición de contenido 4" descr="Tabla de ejemplo con 3 columnas y 4 filas" title="Tabla"/>
-          <p:cNvGraphicFramePr>
-            <a:graphicFrameLocks noGrp="1"/>
-          </p:cNvGraphicFramePr>
-          <p:nvPr>
-            <p:ph sz="half" idx="2"/>
-            <p:extLst>
-              <p:ext uri="{D42A27DB-BD31-4B8C-83A1-F6EECF244321}">
-                <p14:modId xmlns:p14="http://schemas.microsoft.com/office/powerpoint/2010/main" val="30324420"/>
-              </p:ext>
-            </p:extLst>
-          </p:nvPr>
-        </p:nvGraphicFramePr>
-        <p:xfrm>
-          <a:off x="2351584" y="2780928"/>
-          <a:ext cx="7706551" cy="1793082"/>
-        </p:xfrm>
-        <a:graphic>
-          <a:graphicData uri="http://schemas.openxmlformats.org/drawingml/2006/table">
-            <a:tbl>
-              <a:tblPr firstRow="1" bandRow="1">
-                <a:tableStyleId>{5C22544A-7EE6-4342-B048-85BDC9FD1C3A}</a:tableStyleId>
-              </a:tblPr>
-              <a:tblGrid>
-                <a:gridCol w="1221740">
-                  <a:extLst>
-                    <a:ext uri="{9D8B030D-6E8A-4147-A177-3AD203B41FA5}">
-                      <a16:colId xmlns:a16="http://schemas.microsoft.com/office/drawing/2014/main" val="20000"/>
-                    </a:ext>
-                  </a:extLst>
-                </a:gridCol>
-                <a:gridCol w="1286193">
-                  <a:extLst>
-                    <a:ext uri="{9D8B030D-6E8A-4147-A177-3AD203B41FA5}">
-                      <a16:colId xmlns:a16="http://schemas.microsoft.com/office/drawing/2014/main" val="20001"/>
-                    </a:ext>
-                  </a:extLst>
-                </a:gridCol>
-                <a:gridCol w="855980">
-                  <a:extLst>
-                    <a:ext uri="{9D8B030D-6E8A-4147-A177-3AD203B41FA5}">
-                      <a16:colId xmlns:a16="http://schemas.microsoft.com/office/drawing/2014/main" val="20002"/>
-                    </a:ext>
-                  </a:extLst>
-                </a:gridCol>
-                <a:gridCol w="4342638">
-                  <a:extLst>
-                    <a:ext uri="{9D8B030D-6E8A-4147-A177-3AD203B41FA5}">
-                      <a16:colId xmlns:a16="http://schemas.microsoft.com/office/drawing/2014/main" val="2789338225"/>
-                    </a:ext>
-                  </a:extLst>
-                </a:gridCol>
-              </a:tblGrid>
-              <a:tr h="496094">
-                <a:tc>
-                  <a:txBody>
-                    <a:bodyPr/>
-                    <a:lstStyle/>
-                    <a:p>
-                      <a:pPr marL="0" marR="0" lvl="0" indent="0" algn="ctr" defTabSz="914400" rtl="0" eaLnBrk="1" fontAlgn="auto" latinLnBrk="0" hangingPunct="1">
-                        <a:lnSpc>
-                          <a:spcPct val="100000"/>
-                        </a:lnSpc>
-                        <a:spcBef>
-                          <a:spcPts val="0"/>
-                        </a:spcBef>
-                        <a:spcAft>
-                          <a:spcPts val="0"/>
-                        </a:spcAft>
-                        <a:buClrTx/>
-                        <a:buSzTx/>
-                        <a:buFontTx/>
-                        <a:buNone/>
-                        <a:tabLst/>
-                        <a:defRPr/>
-                      </a:pPr>
-                      <a:r>
-                        <a:rPr lang="es-ES" sz="1400" b="1" noProof="0" dirty="0">
-                          <a:solidFill>
-                            <a:srgbClr val="002060"/>
-                          </a:solidFill>
-                        </a:rPr>
-                        <a:t>Data Factory.</a:t>
-                      </a:r>
-                    </a:p>
-                  </a:txBody>
-                  <a:tcPr anchor="ctr"/>
-                </a:tc>
-                <a:tc>
-                  <a:txBody>
-                    <a:bodyPr/>
-                    <a:lstStyle/>
-                    <a:p>
-                      <a:pPr algn="ctr" rtl="0"/>
-                      <a:r>
-                        <a:rPr lang="es-ES" sz="1400" b="1" noProof="0" dirty="0">
-                          <a:solidFill>
-                            <a:srgbClr val="002060"/>
-                          </a:solidFill>
-                        </a:rPr>
-                        <a:t>Instancia.</a:t>
-                      </a:r>
-                    </a:p>
-                  </a:txBody>
-                  <a:tcPr anchor="ctr"/>
-                </a:tc>
-                <a:tc>
-                  <a:txBody>
-                    <a:bodyPr/>
-                    <a:lstStyle/>
-                    <a:p>
-                      <a:pPr algn="ctr"/>
-                      <a:r>
-                        <a:rPr lang="es-CO" sz="1400" b="1" dirty="0">
-                          <a:solidFill>
-                            <a:srgbClr val="002060"/>
-                          </a:solidFill>
-                        </a:rPr>
-                        <a:t>DevOps.</a:t>
-                      </a:r>
-                    </a:p>
-                  </a:txBody>
-                  <a:tcPr anchor="ctr"/>
-                </a:tc>
-                <a:tc>
-                  <a:txBody>
-                    <a:bodyPr/>
-                    <a:lstStyle/>
-                    <a:p>
-                      <a:pPr algn="ctr"/>
-                      <a:r>
-                        <a:rPr lang="es-CO" sz="1400" b="1" dirty="0">
-                          <a:solidFill>
-                            <a:srgbClr val="002060"/>
-                          </a:solidFill>
-                        </a:rPr>
-                        <a:t>Pipelines.</a:t>
-                      </a:r>
-                    </a:p>
-                  </a:txBody>
-                  <a:tcPr anchor="ctr"/>
-                </a:tc>
-                <a:extLst>
-                  <a:ext uri="{0D108BD9-81ED-4DB2-BD59-A6C34878D82A}">
-                    <a16:rowId xmlns:a16="http://schemas.microsoft.com/office/drawing/2014/main" val="10000"/>
-                  </a:ext>
-                </a:extLst>
-              </a:tr>
-              <a:tr h="496094">
-                <a:tc>
-                  <a:txBody>
-                    <a:bodyPr/>
-                    <a:lstStyle/>
-                    <a:p>
-                      <a:pPr algn="ctr"/>
-                      <a:r>
-                        <a:rPr lang="es-CO" sz="1400" dirty="0"/>
-                        <a:t>DF1.</a:t>
-                      </a:r>
-                    </a:p>
-                  </a:txBody>
-                  <a:tcPr anchor="ctr"/>
-                </a:tc>
-                <a:tc>
-                  <a:txBody>
-                    <a:bodyPr/>
-                    <a:lstStyle/>
-                    <a:p>
-                      <a:pPr algn="ctr"/>
-                      <a:r>
-                        <a:rPr lang="es-CO" sz="1400" dirty="0"/>
-                        <a:t>Desarrollo.</a:t>
-                      </a:r>
-                    </a:p>
-                  </a:txBody>
-                  <a:tcPr anchor="ctr"/>
-                </a:tc>
-                <a:tc>
-                  <a:txBody>
-                    <a:bodyPr/>
-                    <a:lstStyle/>
-                    <a:p>
-                      <a:pPr algn="ctr"/>
-                      <a:r>
-                        <a:rPr lang="es-CO" sz="1400" dirty="0"/>
-                        <a:t>SI.</a:t>
-                      </a:r>
-                    </a:p>
-                  </a:txBody>
-                  <a:tcPr anchor="ctr"/>
-                </a:tc>
-                <a:tc>
-                  <a:txBody>
-                    <a:bodyPr/>
-                    <a:lstStyle/>
-                    <a:p>
-                      <a:pPr algn="ctr"/>
-                      <a:r>
-                        <a:rPr lang="es-ES" sz="1400" noProof="0" dirty="0"/>
-                        <a:t>Databricks, Synapse, Functions, SQL Server, Key Vaults</a:t>
-                      </a:r>
-                      <a:r>
-                        <a:rPr lang="es-CO" sz="1400" dirty="0"/>
-                        <a:t>.</a:t>
-                      </a:r>
-                    </a:p>
-                  </a:txBody>
-                  <a:tcPr anchor="ctr"/>
-                </a:tc>
-                <a:extLst>
-                  <a:ext uri="{0D108BD9-81ED-4DB2-BD59-A6C34878D82A}">
-                    <a16:rowId xmlns:a16="http://schemas.microsoft.com/office/drawing/2014/main" val="10001"/>
-                  </a:ext>
-                </a:extLst>
-              </a:tr>
-              <a:tr h="496094">
-                <a:tc>
-                  <a:txBody>
-                    <a:bodyPr/>
-                    <a:lstStyle/>
-                    <a:p>
-                      <a:pPr algn="ctr"/>
-                      <a:r>
-                        <a:rPr lang="es-CO" sz="1400" dirty="0"/>
-                        <a:t>DF2.</a:t>
-                      </a:r>
-                    </a:p>
-                  </a:txBody>
-                  <a:tcPr anchor="ctr"/>
-                </a:tc>
-                <a:tc>
-                  <a:txBody>
-                    <a:bodyPr/>
-                    <a:lstStyle/>
-                    <a:p>
-                      <a:pPr algn="ctr"/>
-                      <a:r>
-                        <a:rPr lang="es-CO" sz="1400" dirty="0"/>
-                        <a:t>Producción.</a:t>
-                      </a:r>
-                    </a:p>
-                  </a:txBody>
-                  <a:tcPr anchor="ctr"/>
-                </a:tc>
-                <a:tc rowSpan="2">
-                  <a:txBody>
-                    <a:bodyPr/>
-                    <a:lstStyle/>
-                    <a:p>
-                      <a:pPr algn="ctr"/>
-                      <a:r>
-                        <a:rPr lang="es-CO" sz="1400" dirty="0"/>
-                        <a:t>No.</a:t>
-                      </a:r>
-                    </a:p>
-                  </a:txBody>
-                  <a:tcPr anchor="ctr"/>
-                </a:tc>
-                <a:tc>
-                  <a:txBody>
-                    <a:bodyPr/>
-                    <a:lstStyle/>
-                    <a:p>
-                      <a:pPr algn="ctr"/>
-                      <a:r>
-                        <a:rPr lang="es-ES" sz="1400" noProof="0" dirty="0"/>
-                        <a:t>Databricks, Synapse, Functions, SQL Server, Key Vaults</a:t>
-                      </a:r>
-                      <a:r>
-                        <a:rPr lang="es-CO" sz="1400" dirty="0"/>
-                        <a:t>.</a:t>
-                      </a:r>
-                    </a:p>
-                  </a:txBody>
-                  <a:tcPr anchor="ctr"/>
-                </a:tc>
-                <a:extLst>
-                  <a:ext uri="{0D108BD9-81ED-4DB2-BD59-A6C34878D82A}">
-                    <a16:rowId xmlns:a16="http://schemas.microsoft.com/office/drawing/2014/main" val="10002"/>
-                  </a:ext>
-                </a:extLst>
-              </a:tr>
-              <a:tr h="248047">
-                <a:tc>
-                  <a:txBody>
-                    <a:bodyPr/>
-                    <a:lstStyle/>
-                    <a:p>
-                      <a:pPr algn="ctr"/>
-                      <a:r>
-                        <a:rPr lang="es-CO" sz="1400" dirty="0"/>
-                        <a:t>DF3.</a:t>
-                      </a:r>
-                    </a:p>
-                  </a:txBody>
-                  <a:tcPr anchor="ctr"/>
-                </a:tc>
-                <a:tc>
-                  <a:txBody>
-                    <a:bodyPr/>
-                    <a:lstStyle/>
-                    <a:p>
-                      <a:pPr algn="ctr"/>
-                      <a:r>
-                        <a:rPr lang="es-CO" sz="1400" dirty="0"/>
-                        <a:t>Carpeta extra.</a:t>
-                      </a:r>
-                    </a:p>
-                  </a:txBody>
-                  <a:tcPr anchor="ctr"/>
-                </a:tc>
-                <a:tc vMerge="1">
-                  <a:txBody>
-                    <a:bodyPr/>
-                    <a:lstStyle/>
-                    <a:p>
-                      <a:pPr algn="ctr"/>
-                      <a:r>
-                        <a:rPr lang="es-CO" sz="1400" dirty="0"/>
-                        <a:t>DF3.</a:t>
-                      </a:r>
-                    </a:p>
-                  </a:txBody>
-                  <a:tcPr anchor="ctr"/>
-                </a:tc>
-                <a:tc>
-                  <a:txBody>
-                    <a:bodyPr/>
-                    <a:lstStyle/>
-                    <a:p>
-                      <a:pPr algn="ctr"/>
-                      <a:r>
-                        <a:rPr lang="es-ES" sz="1400" noProof="0" dirty="0"/>
-                        <a:t>Excel (Sharepoint), Logic Apps.</a:t>
-                      </a:r>
-                      <a:endParaRPr lang="es-CO" sz="1400" dirty="0"/>
-                    </a:p>
-                  </a:txBody>
-                  <a:tcPr anchor="ctr"/>
-                </a:tc>
-                <a:extLst>
-                  <a:ext uri="{0D108BD9-81ED-4DB2-BD59-A6C34878D82A}">
-                    <a16:rowId xmlns:a16="http://schemas.microsoft.com/office/drawing/2014/main" val="10003"/>
-                  </a:ext>
-                </a:extLst>
-              </a:tr>
-            </a:tbl>
-          </a:graphicData>
-        </a:graphic>
-      </p:graphicFrame>
-    </p:spTree>
-    <p:extLst>
-      <p:ext uri="{BB962C8B-B14F-4D97-AF65-F5344CB8AC3E}">
-        <p14:creationId xmlns:p14="http://schemas.microsoft.com/office/powerpoint/2010/main" val="2105110879"/>
-      </p:ext>
-    </p:extLst>
-  </p:cSld>
-  <p:clrMapOvr>
-    <a:masterClrMapping/>
-  </p:clrMapOvr>
-</p:sld>
-</file>
-
-<file path=ppt/slides/slide4.xml><?xml version="1.0" encoding="utf-8"?>
 <p:sld xmlns:a="http://schemas.openxmlformats.org/drawingml/2006/main" xmlns:r="http://schemas.openxmlformats.org/officeDocument/2006/relationships" xmlns:p="http://schemas.openxmlformats.org/presentationml/2006/main">
   <p:cSld>
     <p:spTree>
@@ -8320,14 +7859,11 @@
                 </a:spcAft>
                 <a:buNone/>
               </a:pPr>
-              <a:r>
-                <a:rPr lang="es-ES" sz="1600" b="1" kern="1200" noProof="0" dirty="0">
-                  <a:solidFill>
-                    <a:schemeClr val="bg2"/>
-                  </a:solidFill>
-                </a:rPr>
-                <a:t>* 3.</a:t>
-              </a:r>
+              <a:endParaRPr lang="es-ES" sz="1600" b="1" kern="1200" noProof="0" dirty="0">
+                <a:solidFill>
+                  <a:schemeClr val="bg2"/>
+                </a:solidFill>
+              </a:endParaRPr>
             </a:p>
           </p:txBody>
         </p:sp>
@@ -9600,30 +9136,11 @@
                 </a:spcAft>
                 <a:buNone/>
               </a:pPr>
-              <a:r>
-                <a:rPr lang="es-ES" sz="1600" b="1" kern="1200" noProof="0" dirty="0">
-                  <a:solidFill>
-                    <a:schemeClr val="bg2"/>
-                  </a:solidFill>
-                </a:rPr>
-                <a:t>* </a:t>
-              </a:r>
-              <a:r>
-                <a:rPr lang="es-ES" sz="1600" b="1" dirty="0">
-                  <a:solidFill>
-                    <a:schemeClr val="bg2"/>
-                  </a:solidFill>
-                </a:rPr>
-                <a:t>3</a:t>
-              </a:r>
-              <a:r>
-                <a:rPr lang="es-ES" sz="1600" b="1" kern="1200" noProof="0" dirty="0">
-                  <a:solidFill>
-                    <a:schemeClr val="bg2"/>
-                  </a:solidFill>
-                </a:rPr>
-                <a:t>.                  </a:t>
-              </a:r>
+              <a:endParaRPr lang="es-ES" sz="1600" b="1" kern="1200" noProof="0" dirty="0">
+                <a:solidFill>
+                  <a:schemeClr val="bg2"/>
+                </a:solidFill>
+              </a:endParaRPr>
             </a:p>
           </p:txBody>
         </p:sp>
@@ -10489,7 +10006,7 @@
         </p:nvSpPr>
         <p:spPr>
           <a:xfrm>
-            <a:off x="6453938" y="4377770"/>
+            <a:off x="6508632" y="4323882"/>
             <a:ext cx="1406728" cy="486461"/>
           </a:xfrm>
           <a:prstGeom prst="rect">
@@ -12936,7 +12453,7 @@
                   <a:schemeClr val="bg2"/>
                 </a:solidFill>
               </a:rPr>
-              <a:t>* 3</a:t>
+              <a:t>* 1</a:t>
             </a:r>
             <a:r>
               <a:rPr lang="es-ES" sz="1800" b="1" kern="1200" noProof="0" dirty="0">
@@ -15112,6 +14629,108 @@
           </a:extLst>
         </p:spPr>
       </p:pic>
+      <p:sp>
+        <p:nvSpPr>
+          <p:cNvPr id="149" name="CuadroTexto 148">
+            <a:extLst>
+              <a:ext uri="{FF2B5EF4-FFF2-40B4-BE49-F238E27FC236}">
+                <a16:creationId xmlns:a16="http://schemas.microsoft.com/office/drawing/2014/main" id="{4FC35BCF-1886-4097-9726-407FBB22F592}"/>
+              </a:ext>
+            </a:extLst>
+          </p:cNvPr>
+          <p:cNvSpPr txBox="1"/>
+          <p:nvPr/>
+        </p:nvSpPr>
+        <p:spPr>
+          <a:xfrm>
+            <a:off x="4284275" y="2837786"/>
+            <a:ext cx="554263" cy="341632"/>
+          </a:xfrm>
+          <a:prstGeom prst="rect">
+            <a:avLst/>
+          </a:prstGeom>
+          <a:noFill/>
+        </p:spPr>
+        <p:txBody>
+          <a:bodyPr wrap="square">
+            <a:spAutoFit/>
+          </a:bodyPr>
+          <a:lstStyle/>
+          <a:p>
+            <a:pPr marL="0" lvl="0" indent="0" algn="ctr" defTabSz="977900" rtl="0">
+              <a:lnSpc>
+                <a:spcPct val="90000"/>
+              </a:lnSpc>
+              <a:spcBef>
+                <a:spcPct val="0"/>
+              </a:spcBef>
+              <a:spcAft>
+                <a:spcPct val="35000"/>
+              </a:spcAft>
+              <a:buNone/>
+            </a:pPr>
+            <a:r>
+              <a:rPr lang="es-ES" sz="1800" b="1" kern="1200" noProof="0" dirty="0">
+                <a:solidFill>
+                  <a:schemeClr val="bg2"/>
+                </a:solidFill>
+              </a:rPr>
+              <a:t>* 3.</a:t>
+            </a:r>
+          </a:p>
+        </p:txBody>
+      </p:sp>
+      <p:sp>
+        <p:nvSpPr>
+          <p:cNvPr id="155" name="CuadroTexto 154">
+            <a:extLst>
+              <a:ext uri="{FF2B5EF4-FFF2-40B4-BE49-F238E27FC236}">
+                <a16:creationId xmlns:a16="http://schemas.microsoft.com/office/drawing/2014/main" id="{BF900522-179F-4F5F-9454-2AB0939E851E}"/>
+              </a:ext>
+            </a:extLst>
+          </p:cNvPr>
+          <p:cNvSpPr txBox="1"/>
+          <p:nvPr/>
+        </p:nvSpPr>
+        <p:spPr>
+          <a:xfrm>
+            <a:off x="9735501" y="2875484"/>
+            <a:ext cx="554263" cy="341632"/>
+          </a:xfrm>
+          <a:prstGeom prst="rect">
+            <a:avLst/>
+          </a:prstGeom>
+          <a:noFill/>
+        </p:spPr>
+        <p:txBody>
+          <a:bodyPr wrap="square">
+            <a:spAutoFit/>
+          </a:bodyPr>
+          <a:lstStyle/>
+          <a:p>
+            <a:pPr marL="0" lvl="0" indent="0" algn="ctr" defTabSz="977900" rtl="0">
+              <a:lnSpc>
+                <a:spcPct val="90000"/>
+              </a:lnSpc>
+              <a:spcBef>
+                <a:spcPct val="0"/>
+              </a:spcBef>
+              <a:spcAft>
+                <a:spcPct val="35000"/>
+              </a:spcAft>
+              <a:buNone/>
+            </a:pPr>
+            <a:r>
+              <a:rPr lang="es-ES" sz="1800" b="1" kern="1200" noProof="0" dirty="0">
+                <a:solidFill>
+                  <a:schemeClr val="bg2"/>
+                </a:solidFill>
+              </a:rPr>
+              <a:t>* 2.</a:t>
+            </a:r>
+          </a:p>
+        </p:txBody>
+      </p:sp>
     </p:spTree>
     <p:extLst>
       <p:ext uri="{BB962C8B-B14F-4D97-AF65-F5344CB8AC3E}">
@@ -15125,7 +14744,7 @@
 </p:sld>
 </file>
 
-<file path=ppt/slides/slide5.xml><?xml version="1.0" encoding="utf-8"?>
+<file path=ppt/slides/slide4.xml><?xml version="1.0" encoding="utf-8"?>
 <p:sld xmlns:a="http://schemas.openxmlformats.org/drawingml/2006/main" xmlns:r="http://schemas.openxmlformats.org/officeDocument/2006/relationships" xmlns:p="http://schemas.openxmlformats.org/presentationml/2006/main">
   <p:cSld>
     <p:spTree>
@@ -15505,13 +15124,6 @@
               </a:rPr>
               <a:t>2. Azure DevOps (Integración Git).</a:t>
             </a:r>
-            <a:endParaRPr lang="es-CO" b="1" dirty="0"/>
-          </a:p>
-          <a:p>
-            <a:pPr marL="0" indent="0">
-              <a:buFont typeface="Arial" pitchFamily="34" charset="0"/>
-              <a:buNone/>
-            </a:pPr>
             <a:endParaRPr lang="es-CO" b="1" dirty="0">
               <a:solidFill>
                 <a:schemeClr val="tx1"/>
@@ -15522,10 +15134,11 @@
       </p:sp>
       <p:pic>
         <p:nvPicPr>
-          <p:cNvPr id="5" name="Imagen 4">
+          <p:cNvPr id="18" name="Imagen 17">
+            <a:hlinkClick r:id="rId4" action="ppaction://hlinksldjump" tooltip="Azure Integration Runtime: Gestiona el escalado automatico a demanda de la orquestación de Data Factory."/>
             <a:extLst>
               <a:ext uri="{FF2B5EF4-FFF2-40B4-BE49-F238E27FC236}">
-                <a16:creationId xmlns:a16="http://schemas.microsoft.com/office/drawing/2014/main" id="{A9F62792-2081-4D1C-91DD-9D2EA612C511}"/>
+                <a16:creationId xmlns:a16="http://schemas.microsoft.com/office/drawing/2014/main" id="{20FB7F7B-9071-4199-A428-F315FD828D89}"/>
               </a:ext>
             </a:extLst>
           </p:cNvPr>
@@ -15535,15 +15148,15 @@
           <p:nvPr/>
         </p:nvPicPr>
         <p:blipFill>
-          <a:blip r:embed="rId4"/>
+          <a:blip r:embed="rId5"/>
           <a:stretch>
             <a:fillRect/>
           </a:stretch>
         </p:blipFill>
         <p:spPr>
           <a:xfrm>
-            <a:off x="2783632" y="880119"/>
-            <a:ext cx="7074986" cy="4277073"/>
+            <a:off x="2567607" y="880120"/>
+            <a:ext cx="6984777" cy="4277072"/>
           </a:xfrm>
           <a:prstGeom prst="rect">
             <a:avLst/>
@@ -15552,10 +15165,10 @@
       </p:pic>
       <p:sp>
         <p:nvSpPr>
-          <p:cNvPr id="13" name="CuadroTexto 12">
+          <p:cNvPr id="11" name="CuadroTexto 10">
             <a:extLst>
               <a:ext uri="{FF2B5EF4-FFF2-40B4-BE49-F238E27FC236}">
-                <a16:creationId xmlns:a16="http://schemas.microsoft.com/office/drawing/2014/main" id="{0349F266-8F74-4D71-AF90-A74869CBE55F}"/>
+                <a16:creationId xmlns:a16="http://schemas.microsoft.com/office/drawing/2014/main" id="{480D9449-77CB-46E5-99D0-6AC2362D1D73}"/>
               </a:ext>
             </a:extLst>
           </p:cNvPr>
@@ -15564,7 +15177,7 @@
         </p:nvSpPr>
         <p:spPr>
           <a:xfrm>
-            <a:off x="2855640" y="1772816"/>
+            <a:off x="2639616" y="1700808"/>
             <a:ext cx="288032" cy="276999"/>
           </a:xfrm>
           <a:prstGeom prst="rect">
@@ -15607,7 +15220,7 @@
 </p:sld>
 </file>
 
-<file path=ppt/slides/slide6.xml><?xml version="1.0" encoding="utf-8"?>
+<file path=ppt/slides/slide5.xml><?xml version="1.0" encoding="utf-8"?>
 <p:sld xmlns:a="http://schemas.openxmlformats.org/drawingml/2006/main" xmlns:r="http://schemas.openxmlformats.org/officeDocument/2006/relationships" xmlns:p="http://schemas.openxmlformats.org/presentationml/2006/main">
   <p:cSld>
     <p:spTree>
@@ -15737,7 +15350,7 @@
       </p:sp>
       <p:graphicFrame>
         <p:nvGraphicFramePr>
-          <p:cNvPr id="6" name="Gráfico 5">
+          <p:cNvPr id="5" name="Gráfico 4">
             <a:extLst>
               <a:ext uri="{FF2B5EF4-FFF2-40B4-BE49-F238E27FC236}">
                 <a16:creationId xmlns:a16="http://schemas.microsoft.com/office/drawing/2014/main" id="{DFDD1AF0-CE04-4303-B96A-E331F9FE0308}"/>
@@ -15750,14 +15363,14 @@
           <p:nvPr>
             <p:extLst>
               <p:ext uri="{D42A27DB-BD31-4B8C-83A1-F6EECF244321}">
-                <p14:modId xmlns:p14="http://schemas.microsoft.com/office/powerpoint/2010/main" val="340945243"/>
+                <p14:modId xmlns:p14="http://schemas.microsoft.com/office/powerpoint/2010/main" val="2510325260"/>
               </p:ext>
             </p:extLst>
           </p:nvPr>
         </p:nvGraphicFramePr>
         <p:xfrm>
-          <a:off x="551384" y="1304925"/>
-          <a:ext cx="11233247" cy="4248149"/>
+          <a:off x="1271464" y="1438274"/>
+          <a:ext cx="10225136" cy="4366989"/>
         </p:xfrm>
         <a:graphic>
           <a:graphicData uri="http://schemas.openxmlformats.org/drawingml/2006/chart">
@@ -15778,7 +15391,7 @@
 </p:sld>
 </file>
 
-<file path=ppt/slides/slide7.xml><?xml version="1.0" encoding="utf-8"?>
+<file path=ppt/slides/slide6.xml><?xml version="1.0" encoding="utf-8"?>
 <p:sld xmlns:a="http://schemas.openxmlformats.org/drawingml/2006/main" xmlns:r="http://schemas.openxmlformats.org/officeDocument/2006/relationships" xmlns:p="http://schemas.openxmlformats.org/presentationml/2006/main">
   <p:cSld>
     <p:spTree>
@@ -16378,7 +15991,7 @@
 </p:sld>
 </file>
 
-<file path=ppt/slides/slide8.xml><?xml version="1.0" encoding="utf-8"?>
+<file path=ppt/slides/slide7.xml><?xml version="1.0" encoding="utf-8"?>
 <p:sld xmlns:a="http://schemas.openxmlformats.org/drawingml/2006/main" xmlns:r="http://schemas.openxmlformats.org/officeDocument/2006/relationships" xmlns:p="http://schemas.openxmlformats.org/presentationml/2006/main">
   <p:cSld>
     <p:spTree>
@@ -16437,14 +16050,14 @@
             <p:ph sz="half" idx="2"/>
             <p:extLst>
               <p:ext uri="{D42A27DB-BD31-4B8C-83A1-F6EECF244321}">
-                <p14:modId xmlns:p14="http://schemas.microsoft.com/office/powerpoint/2010/main" val="2796358312"/>
+                <p14:modId xmlns:p14="http://schemas.microsoft.com/office/powerpoint/2010/main" val="2449563575"/>
               </p:ext>
             </p:extLst>
           </p:nvPr>
         </p:nvGraphicFramePr>
         <p:xfrm>
           <a:off x="767408" y="1628800"/>
-          <a:ext cx="10963465" cy="3491548"/>
+          <a:ext cx="11296841" cy="3278188"/>
         </p:xfrm>
         <a:graphic>
           <a:graphicData uri="http://schemas.openxmlformats.org/drawingml/2006/table">
@@ -16453,7 +16066,7 @@
                 <a:tableStyleId>{5C22544A-7EE6-4342-B048-85BDC9FD1C3A}</a:tableStyleId>
               </a:tblPr>
               <a:tblGrid>
-                <a:gridCol w="1981517">
+                <a:gridCol w="2314893">
                   <a:extLst>
                     <a:ext uri="{9D8B030D-6E8A-4147-A177-3AD203B41FA5}">
                       <a16:colId xmlns:a16="http://schemas.microsoft.com/office/drawing/2014/main" val="20000"/>
@@ -16586,7 +16199,21 @@
                       <a:pPr algn="ctr"/>
                       <a:r>
                         <a:rPr lang="es-CO" sz="1400" dirty="0"/>
-                        <a:t>Azure Data Factory.</a:t>
+                        <a:t>🔄 Azure Data Factory.</a:t>
+                      </a:r>
+                    </a:p>
+                    <a:p>
+                      <a:pPr algn="ctr"/>
+                      <a:r>
+                        <a:rPr lang="es-CO" sz="1400" dirty="0"/>
+                        <a:t>🔄 Azure Databricks.</a:t>
+                      </a:r>
+                    </a:p>
+                    <a:p>
+                      <a:pPr algn="ctr"/>
+                      <a:r>
+                        <a:rPr lang="es-CO" sz="1400" dirty="0"/>
+                        <a:t>🔄 Azure Synapse Analitics.</a:t>
                       </a:r>
                     </a:p>
                   </a:txBody>
@@ -16646,6 +16273,13 @@
                         <a:t>Azure Data Factory Studio.</a:t>
                       </a:r>
                     </a:p>
+                    <a:p>
+                      <a:pPr algn="ctr"/>
+                      <a:r>
+                        <a:rPr lang="es-CO" sz="1400" dirty="0"/>
+                        <a:t>🔄 Cuotas.</a:t>
+                      </a:r>
+                    </a:p>
                   </a:txBody>
                   <a:tcPr anchor="ctr"/>
                 </a:tc>
@@ -16664,7 +16298,7 @@
                       <a:pPr algn="ctr"/>
                       <a:r>
                         <a:rPr lang="es-CO" sz="1400" dirty="0"/>
-                        <a:t>🔄 Security.</a:t>
+                        <a:t>Security.</a:t>
                       </a:r>
                     </a:p>
                   </a:txBody>
@@ -16743,7 +16377,7 @@
                       <a:pPr algn="ctr"/>
                       <a:r>
                         <a:rPr lang="es-CO" sz="1400" dirty="0"/>
-                        <a:t>🔄 Storage.</a:t>
+                        <a:t>Storage.</a:t>
                       </a:r>
                     </a:p>
                   </a:txBody>
@@ -16792,7 +16426,7 @@
                       <a:pPr algn="ctr"/>
                       <a:r>
                         <a:rPr lang="es-CO" sz="1400" dirty="0"/>
-                        <a:t>Sharepoint.</a:t>
+                        <a:t>🔄 Sharepoint.</a:t>
                       </a:r>
                     </a:p>
                     <a:p>
@@ -16884,7 +16518,7 @@
                       <a:pPr algn="ctr"/>
                       <a:r>
                         <a:rPr lang="es-CO" sz="1400" dirty="0"/>
-                        <a:t>🔄 DevOps.</a:t>
+                        <a:t>DevOps.</a:t>
                       </a:r>
                     </a:p>
                   </a:txBody>
@@ -16907,18 +16541,6 @@
                         <a:rPr lang="es-MX" sz="1400" dirty="0"/>
                         <a:t>Automatizar (CI/CD).</a:t>
                       </a:r>
-                    </a:p>
-                    <a:p>
-                      <a:pPr algn="ctr"/>
-                      <a:r>
-                        <a:rPr lang="es-CO" sz="1400" dirty="0"/>
-                        <a:t>Logic Apps</a:t>
-                      </a:r>
-                      <a:r>
-                        <a:rPr lang="es-ES" sz="1400" noProof="0" dirty="0"/>
-                        <a:t>.</a:t>
-                      </a:r>
-                      <a:endParaRPr lang="es-CO" sz="1400" dirty="0"/>
                     </a:p>
                   </a:txBody>
                   <a:tcPr anchor="ctr"/>
@@ -17073,7 +16695,7 @@
 </p:sld>
 </file>
 
-<file path=ppt/slides/slide9.xml><?xml version="1.0" encoding="utf-8"?>
+<file path=ppt/slides/slide8.xml><?xml version="1.0" encoding="utf-8"?>
 <p:sld xmlns:a="http://schemas.openxmlformats.org/drawingml/2006/main" xmlns:r="http://schemas.openxmlformats.org/officeDocument/2006/relationships" xmlns:p="http://schemas.openxmlformats.org/presentationml/2006/main">
   <p:cSld>
     <p:spTree>
@@ -17132,14 +16754,14 @@
             <p:ph sz="half" idx="2"/>
             <p:extLst>
               <p:ext uri="{D42A27DB-BD31-4B8C-83A1-F6EECF244321}">
-                <p14:modId xmlns:p14="http://schemas.microsoft.com/office/powerpoint/2010/main" val="1497821066"/>
+                <p14:modId xmlns:p14="http://schemas.microsoft.com/office/powerpoint/2010/main" val="2815967249"/>
               </p:ext>
             </p:extLst>
           </p:nvPr>
         </p:nvGraphicFramePr>
         <p:xfrm>
-          <a:off x="1225724" y="2204864"/>
-          <a:ext cx="10033001" cy="1510348"/>
+          <a:off x="2459613" y="2414746"/>
+          <a:ext cx="7920843" cy="1014254"/>
         </p:xfrm>
         <a:graphic>
           <a:graphicData uri="http://schemas.openxmlformats.org/drawingml/2006/table">
@@ -17148,21 +16770,21 @@
                 <a:tableStyleId>{5C22544A-7EE6-4342-B048-85BDC9FD1C3A}</a:tableStyleId>
               </a:tblPr>
               <a:tblGrid>
-                <a:gridCol w="2587943">
+                <a:gridCol w="2652762">
                   <a:extLst>
                     <a:ext uri="{9D8B030D-6E8A-4147-A177-3AD203B41FA5}">
                       <a16:colId xmlns:a16="http://schemas.microsoft.com/office/drawing/2014/main" val="20000"/>
                     </a:ext>
                   </a:extLst>
                 </a:gridCol>
-                <a:gridCol w="3320415">
+                <a:gridCol w="1040130">
                   <a:extLst>
                     <a:ext uri="{9D8B030D-6E8A-4147-A177-3AD203B41FA5}">
                       <a16:colId xmlns:a16="http://schemas.microsoft.com/office/drawing/2014/main" val="20001"/>
                     </a:ext>
                   </a:extLst>
                 </a:gridCol>
-                <a:gridCol w="4124643">
+                <a:gridCol w="4227951">
                   <a:extLst>
                     <a:ext uri="{9D8B030D-6E8A-4147-A177-3AD203B41FA5}">
                       <a16:colId xmlns:a16="http://schemas.microsoft.com/office/drawing/2014/main" val="20002"/>
@@ -17244,57 +16866,6 @@
                 <a:extLst>
                   <a:ext uri="{0D108BD9-81ED-4DB2-BD59-A6C34878D82A}">
                     <a16:rowId xmlns:a16="http://schemas.microsoft.com/office/drawing/2014/main" val="10000"/>
-                  </a:ext>
-                </a:extLst>
-              </a:tr>
-              <a:tr h="496094">
-                <a:tc>
-                  <a:txBody>
-                    <a:bodyPr/>
-                    <a:lstStyle/>
-                    <a:p>
-                      <a:pPr algn="ctr"/>
-                      <a:r>
-                        <a:rPr lang="es-CO" sz="1400" dirty="0"/>
-                        <a:t>🔄 Data Factory Copy Tool.</a:t>
-                      </a:r>
-                    </a:p>
-                  </a:txBody>
-                  <a:tcPr anchor="ctr"/>
-                </a:tc>
-                <a:tc>
-                  <a:txBody>
-                    <a:bodyPr/>
-                    <a:lstStyle/>
-                    <a:p>
-                      <a:pPr algn="ctr"/>
-                      <a:r>
-                        <a:rPr lang="es-MX" sz="1400" dirty="0"/>
-                        <a:t>Migra datos entre ADF del mismo Tenant.</a:t>
-                      </a:r>
-                      <a:endParaRPr lang="es-CO" sz="1400" dirty="0"/>
-                    </a:p>
-                  </a:txBody>
-                  <a:tcPr anchor="ctr"/>
-                </a:tc>
-                <a:tc>
-                  <a:txBody>
-                    <a:bodyPr/>
-                    <a:lstStyle/>
-                    <a:p>
-                      <a:pPr algn="ctr"/>
-                      <a:r>
-                        <a:rPr lang="es-MX" sz="1400" dirty="0"/>
-                        <a:t>Integración Azure.</a:t>
-                      </a:r>
-                      <a:endParaRPr lang="es-CO" sz="1400" dirty="0"/>
-                    </a:p>
-                  </a:txBody>
-                  <a:tcPr anchor="ctr"/>
-                </a:tc>
-                <a:extLst>
-                  <a:ext uri="{0D108BD9-81ED-4DB2-BD59-A6C34878D82A}">
-                    <a16:rowId xmlns:a16="http://schemas.microsoft.com/office/drawing/2014/main" val="10001"/>
                   </a:ext>
                 </a:extLst>
               </a:tr>
@@ -17470,6 +17041,126 @@
   <p:clrMapOvr>
     <a:masterClrMapping/>
   </p:clrMapOvr>
+</p:sld>
+</file>
+
+<file path=ppt/slides/slide9.xml><?xml version="1.0" encoding="utf-8"?>
+<p:sld xmlns:a="http://schemas.openxmlformats.org/drawingml/2006/main" xmlns:r="http://schemas.openxmlformats.org/officeDocument/2006/relationships" xmlns:p="http://schemas.openxmlformats.org/presentationml/2006/main">
+  <p:cSld>
+    <p:spTree>
+      <p:nvGrpSpPr>
+        <p:cNvPr id="1" name=""/>
+        <p:cNvGrpSpPr/>
+        <p:nvPr/>
+      </p:nvGrpSpPr>
+      <p:grpSpPr>
+        <a:xfrm>
+          <a:off x="0" y="0"/>
+          <a:ext cx="0" cy="0"/>
+          <a:chOff x="0" y="0"/>
+          <a:chExt cx="0" cy="0"/>
+        </a:xfrm>
+      </p:grpSpPr>
+      <p:sp>
+        <p:nvSpPr>
+          <p:cNvPr id="2" name="Título 1"/>
+          <p:cNvSpPr>
+            <a:spLocks noGrp="1"/>
+          </p:cNvSpPr>
+          <p:nvPr>
+            <p:ph type="ctrTitle"/>
+          </p:nvPr>
+        </p:nvSpPr>
+        <p:spPr>
+          <a:xfrm>
+            <a:off x="4511824" y="3789040"/>
+            <a:ext cx="3456384" cy="576064"/>
+          </a:xfrm>
+        </p:spPr>
+        <p:txBody>
+          <a:bodyPr rtlCol="0">
+            <a:noAutofit/>
+          </a:bodyPr>
+          <a:lstStyle/>
+          <a:p>
+            <a:pPr algn="ctr" rtl="0"/>
+            <a:r>
+              <a:rPr lang="es-MX" sz="3600" dirty="0"/>
+              <a:t>¡¡¡Gracias!!!</a:t>
+            </a:r>
+            <a:endParaRPr lang="es-ES" sz="3600" dirty="0"/>
+          </a:p>
+        </p:txBody>
+      </p:sp>
+      <p:pic>
+        <p:nvPicPr>
+          <p:cNvPr id="1026" name="Picture 2">
+            <a:extLst>
+              <a:ext uri="{FF2B5EF4-FFF2-40B4-BE49-F238E27FC236}">
+                <a16:creationId xmlns:a16="http://schemas.microsoft.com/office/drawing/2014/main" id="{A3FBFA89-3E25-4875-997A-79EBB0930C0C}"/>
+              </a:ext>
+            </a:extLst>
+          </p:cNvPr>
+          <p:cNvPicPr>
+            <a:picLocks noChangeAspect="1" noChangeArrowheads="1"/>
+          </p:cNvPicPr>
+          <p:nvPr/>
+        </p:nvPicPr>
+        <p:blipFill>
+          <a:blip r:embed="rId2">
+            <a:extLst>
+              <a:ext uri="{28A0092B-C50C-407E-A947-70E740481C1C}">
+                <a14:useLocalDpi xmlns:a14="http://schemas.microsoft.com/office/drawing/2010/main" val="0"/>
+              </a:ext>
+            </a:extLst>
+          </a:blip>
+          <a:srcRect/>
+          <a:stretch>
+            <a:fillRect/>
+          </a:stretch>
+        </p:blipFill>
+        <p:spPr bwMode="auto">
+          <a:xfrm>
+            <a:off x="9696400" y="5081946"/>
+            <a:ext cx="2319868" cy="456241"/>
+          </a:xfrm>
+          <a:prstGeom prst="rect">
+            <a:avLst/>
+          </a:prstGeom>
+          <a:noFill/>
+          <a:extLst>
+            <a:ext uri="{909E8E84-426E-40DD-AFC4-6F175D3DCCD1}">
+              <a14:hiddenFill xmlns:a14="http://schemas.microsoft.com/office/drawing/2010/main">
+                <a:solidFill>
+                  <a:srgbClr val="FFFFFF"/>
+                </a:solidFill>
+              </a14:hiddenFill>
+            </a:ext>
+          </a:extLst>
+        </p:spPr>
+      </p:pic>
+    </p:spTree>
+    <p:extLst>
+      <p:ext uri="{BB962C8B-B14F-4D97-AF65-F5344CB8AC3E}">
+        <p14:creationId xmlns:p14="http://schemas.microsoft.com/office/powerpoint/2010/main" val="881312324"/>
+      </p:ext>
+    </p:extLst>
+  </p:cSld>
+  <p:clrMapOvr>
+    <a:masterClrMapping/>
+  </p:clrMapOvr>
+  <mc:AlternateContent xmlns:mc="http://schemas.openxmlformats.org/markup-compatibility/2006" xmlns:p14="http://schemas.microsoft.com/office/powerpoint/2010/main">
+    <mc:Choice Requires="p14">
+      <p:transition spd="med" p14:dur="700">
+        <p:fade/>
+      </p:transition>
+    </mc:Choice>
+    <mc:Fallback xmlns="">
+      <p:transition spd="med">
+        <p:fade/>
+      </p:transition>
+    </mc:Fallback>
+  </mc:AlternateContent>
 </p:sld>
 </file>
 

</xml_diff>

<commit_message>
🔀  feat(word) Add report (#8)
</commit_message>
<xml_diff>
--- a/Diagrams/guides/Propuesta migracion - Perceptio.pptx
+++ b/Diagrams/guides/Propuesta migracion - Perceptio.pptx
@@ -5,22 +5,21 @@
     <p:sldMasterId id="2147483648" r:id="rId4"/>
   </p:sldMasterIdLst>
   <p:notesMasterIdLst>
-    <p:notesMasterId r:id="rId15"/>
+    <p:notesMasterId r:id="rId14"/>
   </p:notesMasterIdLst>
   <p:handoutMasterIdLst>
-    <p:handoutMasterId r:id="rId16"/>
+    <p:handoutMasterId r:id="rId15"/>
   </p:handoutMasterIdLst>
   <p:sldIdLst>
     <p:sldId id="256" r:id="rId5"/>
     <p:sldId id="265" r:id="rId6"/>
-    <p:sldId id="276" r:id="rId7"/>
-    <p:sldId id="267" r:id="rId8"/>
-    <p:sldId id="266" r:id="rId9"/>
-    <p:sldId id="277" r:id="rId10"/>
-    <p:sldId id="279" r:id="rId11"/>
-    <p:sldId id="280" r:id="rId12"/>
-    <p:sldId id="281" r:id="rId13"/>
-    <p:sldId id="278" r:id="rId14"/>
+    <p:sldId id="267" r:id="rId7"/>
+    <p:sldId id="266" r:id="rId8"/>
+    <p:sldId id="277" r:id="rId9"/>
+    <p:sldId id="279" r:id="rId10"/>
+    <p:sldId id="280" r:id="rId11"/>
+    <p:sldId id="281" r:id="rId12"/>
+    <p:sldId id="278" r:id="rId13"/>
   </p:sldIdLst>
   <p:sldSz cx="12192000" cy="6858000"/>
   <p:notesSz cx="6858000" cy="9144000"/>
@@ -176,10 +175,7 @@
             <a:pPr>
               <a:defRPr sz="1400" b="0" i="0" u="none" strike="noStrike" kern="1200" spc="0" baseline="0">
                 <a:solidFill>
-                  <a:schemeClr val="tx1">
-                    <a:lumMod val="65000"/>
-                    <a:lumOff val="35000"/>
-                  </a:schemeClr>
+                  <a:srgbClr val="FF0000"/>
                 </a:solidFill>
                 <a:latin typeface="+mn-lt"/>
                 <a:ea typeface="+mn-ea"/>
@@ -187,14 +183,26 @@
               </a:defRPr>
             </a:pPr>
             <a:r>
-              <a:rPr lang="es-CO" b="1"/>
+              <a:rPr lang="es-CO" b="1">
+                <a:solidFill>
+                  <a:srgbClr val="FF0000"/>
+                </a:solidFill>
+              </a:rPr>
               <a:t>Deadline de</a:t>
             </a:r>
             <a:r>
-              <a:rPr lang="es-CO" b="1" baseline="0"/>
+              <a:rPr lang="es-CO" b="1" baseline="0">
+                <a:solidFill>
+                  <a:srgbClr val="FF0000"/>
+                </a:solidFill>
+              </a:rPr>
               <a:t> migracion.</a:t>
             </a:r>
-            <a:endParaRPr lang="es-CO" b="1"/>
+            <a:endParaRPr lang="es-CO" b="1">
+              <a:solidFill>
+                <a:srgbClr val="FF0000"/>
+              </a:solidFill>
+            </a:endParaRPr>
           </a:p>
         </c:rich>
       </c:tx>
@@ -202,8 +210,8 @@
         <c:manualLayout>
           <c:xMode val="edge"/>
           <c:yMode val="edge"/>
-          <c:x val="0.44586351021263132"/>
-          <c:y val="4.1666677182181804E-2"/>
+          <c:x val="0.4446214700714004"/>
+          <c:y val="3.0033966195014458E-2"/>
         </c:manualLayout>
       </c:layout>
       <c:overlay val="0"/>
@@ -221,10 +229,7 @@
           <a:pPr>
             <a:defRPr sz="1400" b="0" i="0" u="none" strike="noStrike" kern="1200" spc="0" baseline="0">
               <a:solidFill>
-                <a:schemeClr val="tx1">
-                  <a:lumMod val="65000"/>
-                  <a:lumOff val="35000"/>
-                </a:schemeClr>
+                <a:srgbClr val="FF0000"/>
               </a:solidFill>
               <a:latin typeface="+mn-lt"/>
               <a:ea typeface="+mn-ea"/>
@@ -243,9 +248,9 @@
           <c:xMode val="edge"/>
           <c:yMode val="edge"/>
           <c:x val="0.23901110139010401"/>
-          <c:y val="0.29900093352537188"/>
+          <c:y val="0.24251194587391914"/>
           <c:w val="0.73926050354816764"/>
-          <c:h val="0.59242494256635947"/>
+          <c:h val="0.69130332135024841"/>
         </c:manualLayout>
       </c:layout>
       <c:barChart>
@@ -278,46 +283,88 @@
           <c:invertIfNegative val="0"/>
           <c:cat>
             <c:strRef>
-              <c:f>Gantt!$B$10:$B$22</c:f>
+              <c:f>Gantt!$B$10:$B$36</c:f>
               <c:strCache>
-                <c:ptCount val="13"/>
+                <c:ptCount val="27"/>
                 <c:pt idx="0">
                   <c:v>Análisis de Impacto.</c:v>
                 </c:pt>
                 <c:pt idx="1">
+                  <c:v>Configurar Integration Runtime.</c:v>
+                </c:pt>
+                <c:pt idx="2">
                   <c:v>Configurar workspaces en Synapse.</c:v>
                 </c:pt>
-                <c:pt idx="2">
+                <c:pt idx="3">
                   <c:v>Configurar clusters en Databricks.</c:v>
                 </c:pt>
-                <c:pt idx="3">
-                  <c:v>Crea Key Vaults, secretos.</c:v>
+                <c:pt idx="4">
+                  <c:v>Crear Key Vaults, secretos.</c:v>
                 </c:pt>
-                <c:pt idx="4">
+                <c:pt idx="5">
+                  <c:v>Configurar Storage Services.</c:v>
+                </c:pt>
+                <c:pt idx="6">
                   <c:v>Configurar instancia SQL Server.</c:v>
                 </c:pt>
-                <c:pt idx="5">
+                <c:pt idx="7">
                   <c:v>Configurar CI/CD pipelines.</c:v>
                 </c:pt>
-                <c:pt idx="6">
+                <c:pt idx="8">
                   <c:v>Exportar pipelines y datasets de ADF.</c:v>
                 </c:pt>
-                <c:pt idx="7">
+                <c:pt idx="9">
                   <c:v>Desplegar pipelines y datasets.</c:v>
                 </c:pt>
-                <c:pt idx="8">
+                <c:pt idx="10">
                   <c:v>Configurar Linked Services.</c:v>
                 </c:pt>
-                <c:pt idx="9">
+                <c:pt idx="11">
+                  <c:v>Configurar Monitor para pipelines ADF.</c:v>
+                </c:pt>
+                <c:pt idx="12">
+                  <c:v>Exportar scripts Synapse.</c:v>
+                </c:pt>
+                <c:pt idx="13">
+                  <c:v>Importar scripts en Synapse.</c:v>
+                </c:pt>
+                <c:pt idx="14">
+                  <c:v>Exportar Notebooks de Databricks.</c:v>
+                </c:pt>
+                <c:pt idx="15">
+                  <c:v>Configurar notebooks en Databricks.</c:v>
+                </c:pt>
+                <c:pt idx="16">
+                  <c:v>Exportar contenedores del Storage Account.</c:v>
+                </c:pt>
+                <c:pt idx="17">
+                  <c:v>importar datos en Storage Services.</c:v>
+                </c:pt>
+                <c:pt idx="18">
+                  <c:v>Exportar backup de  SQL Databases.</c:v>
+                </c:pt>
+                <c:pt idx="19">
+                  <c:v>Importar tablas en SQL Databases.</c:v>
+                </c:pt>
+                <c:pt idx="20">
                   <c:v>Ejecutar Pipelines.</c:v>
                 </c:pt>
-                <c:pt idx="10">
+                <c:pt idx="21">
+                  <c:v>Exportar Logic Apps.</c:v>
+                </c:pt>
+                <c:pt idx="22">
+                  <c:v>importar Logic Apps.</c:v>
+                </c:pt>
+                <c:pt idx="23">
+                  <c:v>Configurar Insights Logic Apps.</c:v>
+                </c:pt>
+                <c:pt idx="24">
                   <c:v>Validación.</c:v>
                 </c:pt>
-                <c:pt idx="11">
-                  <c:v>Monitoreo y Optimización.</c:v>
+                <c:pt idx="25">
+                  <c:v>Optimización.</c:v>
                 </c:pt>
-                <c:pt idx="12">
+                <c:pt idx="26">
                   <c:v>Evaluacion.</c:v>
                 </c:pt>
               </c:strCache>
@@ -325,10 +372,10 @@
           </c:cat>
           <c:val>
             <c:numRef>
-              <c:f>Gantt!$C$10:$C$22</c:f>
+              <c:f>Gantt!$C$10:$C$36</c:f>
               <c:numCache>
                 <c:formatCode>m/d/yyyy</c:formatCode>
-                <c:ptCount val="13"/>
+                <c:ptCount val="27"/>
                 <c:pt idx="0">
                   <c:v>45551</c:v>
                 </c:pt>
@@ -336,7 +383,7 @@
                   <c:v>45558</c:v>
                 </c:pt>
                 <c:pt idx="2">
-                  <c:v>45562</c:v>
+                  <c:v>45560</c:v>
                 </c:pt>
                 <c:pt idx="3">
                   <c:v>45565</c:v>
@@ -351,16 +398,16 @@
                   <c:v>45574</c:v>
                 </c:pt>
                 <c:pt idx="7">
-                  <c:v>45575</c:v>
+                  <c:v>45579</c:v>
                 </c:pt>
                 <c:pt idx="8">
-                  <c:v>45576</c:v>
+                  <c:v>45581</c:v>
                 </c:pt>
                 <c:pt idx="9">
-                  <c:v>45579</c:v>
+                  <c:v>45582</c:v>
                 </c:pt>
                 <c:pt idx="10">
-                  <c:v>45581</c:v>
+                  <c:v>45583</c:v>
                 </c:pt>
                 <c:pt idx="11">
                   <c:v>45586</c:v>
@@ -368,12 +415,54 @@
                 <c:pt idx="12">
                   <c:v>45587</c:v>
                 </c:pt>
+                <c:pt idx="13">
+                  <c:v>45588</c:v>
+                </c:pt>
+                <c:pt idx="14">
+                  <c:v>45590</c:v>
+                </c:pt>
+                <c:pt idx="15">
+                  <c:v>45593</c:v>
+                </c:pt>
+                <c:pt idx="16">
+                  <c:v>45595</c:v>
+                </c:pt>
+                <c:pt idx="17">
+                  <c:v>45596</c:v>
+                </c:pt>
+                <c:pt idx="18">
+                  <c:v>45600</c:v>
+                </c:pt>
+                <c:pt idx="19">
+                  <c:v>45628</c:v>
+                </c:pt>
+                <c:pt idx="20">
+                  <c:v>45630</c:v>
+                </c:pt>
+                <c:pt idx="21">
+                  <c:v>45635</c:v>
+                </c:pt>
+                <c:pt idx="22">
+                  <c:v>45642</c:v>
+                </c:pt>
+                <c:pt idx="23">
+                  <c:v>45644</c:v>
+                </c:pt>
+                <c:pt idx="24">
+                  <c:v>45645</c:v>
+                </c:pt>
+                <c:pt idx="25">
+                  <c:v>45649</c:v>
+                </c:pt>
+                <c:pt idx="26">
+                  <c:v>45650</c:v>
+                </c:pt>
               </c:numCache>
             </c:numRef>
           </c:val>
           <c:extLst>
             <c:ext xmlns:c16="http://schemas.microsoft.com/office/drawing/2014/chart" uri="{C3380CC4-5D6E-409C-BE32-E72D297353CC}">
-              <c16:uniqueId val="{00000000-8EC5-43D8-A9A3-15F3ED06FF28}"/>
+              <c16:uniqueId val="{00000000-82C4-48C1-9871-DFEB3A918CD9}"/>
             </c:ext>
           </c:extLst>
         </c:ser>
@@ -416,12 +505,9 @@
               <a:lstStyle/>
               <a:p>
                 <a:pPr>
-                  <a:defRPr sz="900" b="0" i="0" u="none" strike="noStrike" kern="1200" baseline="0">
+                  <a:defRPr sz="700" b="1" i="0" u="none" strike="noStrike" kern="1200" baseline="0">
                     <a:solidFill>
-                      <a:schemeClr val="bg1">
-                        <a:lumMod val="75000"/>
-                        <a:lumOff val="25000"/>
-                      </a:schemeClr>
+                      <a:schemeClr val="bg1"/>
                     </a:solidFill>
                     <a:latin typeface="+mn-lt"/>
                     <a:ea typeface="+mn-ea"/>
@@ -461,46 +547,88 @@
           </c:dLbls>
           <c:cat>
             <c:strRef>
-              <c:f>Gantt!$B$10:$B$22</c:f>
+              <c:f>Gantt!$B$10:$B$36</c:f>
               <c:strCache>
-                <c:ptCount val="13"/>
+                <c:ptCount val="27"/>
                 <c:pt idx="0">
                   <c:v>Análisis de Impacto.</c:v>
                 </c:pt>
                 <c:pt idx="1">
+                  <c:v>Configurar Integration Runtime.</c:v>
+                </c:pt>
+                <c:pt idx="2">
                   <c:v>Configurar workspaces en Synapse.</c:v>
                 </c:pt>
-                <c:pt idx="2">
+                <c:pt idx="3">
                   <c:v>Configurar clusters en Databricks.</c:v>
                 </c:pt>
-                <c:pt idx="3">
-                  <c:v>Crea Key Vaults, secretos.</c:v>
+                <c:pt idx="4">
+                  <c:v>Crear Key Vaults, secretos.</c:v>
                 </c:pt>
-                <c:pt idx="4">
+                <c:pt idx="5">
+                  <c:v>Configurar Storage Services.</c:v>
+                </c:pt>
+                <c:pt idx="6">
                   <c:v>Configurar instancia SQL Server.</c:v>
                 </c:pt>
-                <c:pt idx="5">
+                <c:pt idx="7">
                   <c:v>Configurar CI/CD pipelines.</c:v>
                 </c:pt>
-                <c:pt idx="6">
+                <c:pt idx="8">
                   <c:v>Exportar pipelines y datasets de ADF.</c:v>
                 </c:pt>
-                <c:pt idx="7">
+                <c:pt idx="9">
                   <c:v>Desplegar pipelines y datasets.</c:v>
                 </c:pt>
-                <c:pt idx="8">
+                <c:pt idx="10">
                   <c:v>Configurar Linked Services.</c:v>
                 </c:pt>
-                <c:pt idx="9">
+                <c:pt idx="11">
+                  <c:v>Configurar Monitor para pipelines ADF.</c:v>
+                </c:pt>
+                <c:pt idx="12">
+                  <c:v>Exportar scripts Synapse.</c:v>
+                </c:pt>
+                <c:pt idx="13">
+                  <c:v>Importar scripts en Synapse.</c:v>
+                </c:pt>
+                <c:pt idx="14">
+                  <c:v>Exportar Notebooks de Databricks.</c:v>
+                </c:pt>
+                <c:pt idx="15">
+                  <c:v>Configurar notebooks en Databricks.</c:v>
+                </c:pt>
+                <c:pt idx="16">
+                  <c:v>Exportar contenedores del Storage Account.</c:v>
+                </c:pt>
+                <c:pt idx="17">
+                  <c:v>importar datos en Storage Services.</c:v>
+                </c:pt>
+                <c:pt idx="18">
+                  <c:v>Exportar backup de  SQL Databases.</c:v>
+                </c:pt>
+                <c:pt idx="19">
+                  <c:v>Importar tablas en SQL Databases.</c:v>
+                </c:pt>
+                <c:pt idx="20">
                   <c:v>Ejecutar Pipelines.</c:v>
                 </c:pt>
-                <c:pt idx="10">
+                <c:pt idx="21">
+                  <c:v>Exportar Logic Apps.</c:v>
+                </c:pt>
+                <c:pt idx="22">
+                  <c:v>importar Logic Apps.</c:v>
+                </c:pt>
+                <c:pt idx="23">
+                  <c:v>Configurar Insights Logic Apps.</c:v>
+                </c:pt>
+                <c:pt idx="24">
                   <c:v>Validación.</c:v>
                 </c:pt>
-                <c:pt idx="11">
-                  <c:v>Monitoreo y Optimización.</c:v>
+                <c:pt idx="25">
+                  <c:v>Optimización.</c:v>
                 </c:pt>
-                <c:pt idx="12">
+                <c:pt idx="26">
                   <c:v>Evaluacion.</c:v>
                 </c:pt>
               </c:strCache>
@@ -508,18 +636,18 @@
           </c:cat>
           <c:val>
             <c:numRef>
-              <c:f>Gantt!$D$10:$D$22</c:f>
+              <c:f>Gantt!$D$10:$D$36</c:f>
               <c:numCache>
                 <c:formatCode>General</c:formatCode>
-                <c:ptCount val="13"/>
+                <c:ptCount val="27"/>
                 <c:pt idx="0">
                   <c:v>7</c:v>
                 </c:pt>
                 <c:pt idx="1">
-                  <c:v>4</c:v>
+                  <c:v>2</c:v>
                 </c:pt>
                 <c:pt idx="2">
-                  <c:v>3</c:v>
+                  <c:v>5</c:v>
                 </c:pt>
                 <c:pt idx="3">
                   <c:v>2</c:v>
@@ -531,24 +659,66 @@
                   <c:v>2</c:v>
                 </c:pt>
                 <c:pt idx="6">
+                  <c:v>5</c:v>
+                </c:pt>
+                <c:pt idx="7">
+                  <c:v>2</c:v>
+                </c:pt>
+                <c:pt idx="8">
                   <c:v>1</c:v>
                 </c:pt>
-                <c:pt idx="7">
+                <c:pt idx="9">
                   <c:v>1</c:v>
                 </c:pt>
-                <c:pt idx="8">
+                <c:pt idx="10">
                   <c:v>3</c:v>
-                </c:pt>
-                <c:pt idx="9">
-                  <c:v>2</c:v>
-                </c:pt>
-                <c:pt idx="10">
-                  <c:v>5</c:v>
                 </c:pt>
                 <c:pt idx="11">
                   <c:v>1</c:v>
                 </c:pt>
                 <c:pt idx="12">
+                  <c:v>1</c:v>
+                </c:pt>
+                <c:pt idx="13">
+                  <c:v>2</c:v>
+                </c:pt>
+                <c:pt idx="14">
+                  <c:v>3</c:v>
+                </c:pt>
+                <c:pt idx="15">
+                  <c:v>2</c:v>
+                </c:pt>
+                <c:pt idx="16">
+                  <c:v>1</c:v>
+                </c:pt>
+                <c:pt idx="17">
+                  <c:v>4</c:v>
+                </c:pt>
+                <c:pt idx="18">
+                  <c:v>28</c:v>
+                </c:pt>
+                <c:pt idx="19">
+                  <c:v>2</c:v>
+                </c:pt>
+                <c:pt idx="20">
+                  <c:v>5</c:v>
+                </c:pt>
+                <c:pt idx="21">
+                  <c:v>7</c:v>
+                </c:pt>
+                <c:pt idx="22">
+                  <c:v>2</c:v>
+                </c:pt>
+                <c:pt idx="23">
+                  <c:v>1</c:v>
+                </c:pt>
+                <c:pt idx="24">
+                  <c:v>4</c:v>
+                </c:pt>
+                <c:pt idx="25">
+                  <c:v>1</c:v>
+                </c:pt>
+                <c:pt idx="26">
                   <c:v>6</c:v>
                 </c:pt>
               </c:numCache>
@@ -556,7 +726,7 @@
           </c:val>
           <c:extLst>
             <c:ext xmlns:c16="http://schemas.microsoft.com/office/drawing/2014/chart" uri="{C3380CC4-5D6E-409C-BE32-E72D297353CC}">
-              <c16:uniqueId val="{00000001-8EC5-43D8-A9A3-15F3ED06FF28}"/>
+              <c16:uniqueId val="{00000001-82C4-48C1-9871-DFEB3A918CD9}"/>
             </c:ext>
           </c:extLst>
         </c:ser>
@@ -602,12 +772,9 @@
           <a:lstStyle/>
           <a:p>
             <a:pPr>
-              <a:defRPr sz="1200" b="1" i="0" u="none" strike="noStrike" kern="1200" baseline="0">
+              <a:defRPr sz="900" b="1" i="0" u="none" strike="noStrike" kern="1200" baseline="0">
                 <a:solidFill>
-                  <a:schemeClr val="tx1">
-                    <a:lumMod val="65000"/>
-                    <a:lumOff val="35000"/>
-                  </a:schemeClr>
+                  <a:srgbClr val="FFFF00"/>
                 </a:solidFill>
                 <a:latin typeface="+mn-lt"/>
                 <a:ea typeface="+mn-ea"/>
@@ -628,7 +795,7 @@
         <c:axId val="1184412656"/>
         <c:scaling>
           <c:orientation val="minMax"/>
-          <c:max val="45593"/>
+          <c:max val="45657"/>
           <c:min val="45551"/>
         </c:scaling>
         <c:delete val="0"/>
@@ -665,10 +832,7 @@
             <a:pPr>
               <a:defRPr sz="900" b="1" i="0" u="none" strike="noStrike" kern="1200" baseline="0">
                 <a:solidFill>
-                  <a:schemeClr val="tx1">
-                    <a:lumMod val="65000"/>
-                    <a:lumOff val="35000"/>
-                  </a:schemeClr>
+                  <a:srgbClr val="FFFF00"/>
                 </a:solidFill>
                 <a:latin typeface="+mn-lt"/>
                 <a:ea typeface="+mn-ea"/>
@@ -692,6 +856,16 @@
     </c:plotArea>
     <c:legend>
       <c:legendPos val="b"/>
+      <c:layout>
+        <c:manualLayout>
+          <c:xMode val="edge"/>
+          <c:yMode val="edge"/>
+          <c:x val="0.41818479185210661"/>
+          <c:y val="0.94617187205666287"/>
+          <c:w val="0.16363041629578678"/>
+          <c:h val="3.4689371962475977E-2"/>
+        </c:manualLayout>
+      </c:layout>
       <c:overlay val="0"/>
       <c:spPr>
         <a:noFill/>
@@ -1384,7 +1558,7 @@
             <a:pPr algn="r" rtl="0"/>
             <a:fld id="{C57DE37D-B738-4817-B751-0C1B86D8B665}" type="datetime1">
               <a:rPr lang="es-ES" smtClean="0"/>
-              <a:t>13/09/2024</a:t>
+              <a:t>15/09/2024</a:t>
             </a:fld>
             <a:endParaRPr dirty="0"/>
           </a:p>
@@ -1554,7 +1728,7 @@
             <a:fld id="{17BB30D9-D505-4352-B274-A1AB529BC646}" type="datetime1">
               <a:rPr lang="es-ES" smtClean="0"/>
               <a:pPr/>
-              <a:t>13/09/2024</a:t>
+              <a:t>15/09/2024</a:t>
             </a:fld>
             <a:endParaRPr lang="es-ES" dirty="0"/>
           </a:p>
@@ -1984,7 +2158,7 @@
     </p:spTree>
     <p:extLst>
       <p:ext uri="{BB962C8B-B14F-4D97-AF65-F5344CB8AC3E}">
-        <p14:creationId xmlns:p14="http://schemas.microsoft.com/office/powerpoint/2010/main" val="2275032356"/>
+        <p14:creationId xmlns:p14="http://schemas.microsoft.com/office/powerpoint/2010/main" val="1962836447"/>
       </p:ext>
     </p:extLst>
   </p:cSld>
@@ -2069,7 +2243,7 @@
     </p:spTree>
     <p:extLst>
       <p:ext uri="{BB962C8B-B14F-4D97-AF65-F5344CB8AC3E}">
-        <p14:creationId xmlns:p14="http://schemas.microsoft.com/office/powerpoint/2010/main" val="1962836447"/>
+        <p14:creationId xmlns:p14="http://schemas.microsoft.com/office/powerpoint/2010/main" val="3171899052"/>
       </p:ext>
     </p:extLst>
   </p:cSld>
@@ -2154,7 +2328,7 @@
     </p:spTree>
     <p:extLst>
       <p:ext uri="{BB962C8B-B14F-4D97-AF65-F5344CB8AC3E}">
-        <p14:creationId xmlns:p14="http://schemas.microsoft.com/office/powerpoint/2010/main" val="3171899052"/>
+        <p14:creationId xmlns:p14="http://schemas.microsoft.com/office/powerpoint/2010/main" val="1351420944"/>
       </p:ext>
     </p:extLst>
   </p:cSld>
@@ -2239,7 +2413,7 @@
     </p:spTree>
     <p:extLst>
       <p:ext uri="{BB962C8B-B14F-4D97-AF65-F5344CB8AC3E}">
-        <p14:creationId xmlns:p14="http://schemas.microsoft.com/office/powerpoint/2010/main" val="1351420944"/>
+        <p14:creationId xmlns:p14="http://schemas.microsoft.com/office/powerpoint/2010/main" val="1651911614"/>
       </p:ext>
     </p:extLst>
   </p:cSld>
@@ -2324,7 +2498,7 @@
     </p:spTree>
     <p:extLst>
       <p:ext uri="{BB962C8B-B14F-4D97-AF65-F5344CB8AC3E}">
-        <p14:creationId xmlns:p14="http://schemas.microsoft.com/office/powerpoint/2010/main" val="1651911614"/>
+        <p14:creationId xmlns:p14="http://schemas.microsoft.com/office/powerpoint/2010/main" val="3219785553"/>
       </p:ext>
     </p:extLst>
   </p:cSld>
@@ -2401,91 +2575,6 @@
               <a:rPr lang="es-ES" smtClean="0"/>
               <a:pPr/>
               <a:t>8</a:t>
-            </a:fld>
-            <a:endParaRPr lang="es-ES" dirty="0"/>
-          </a:p>
-        </p:txBody>
-      </p:sp>
-    </p:spTree>
-    <p:extLst>
-      <p:ext uri="{BB962C8B-B14F-4D97-AF65-F5344CB8AC3E}">
-        <p14:creationId xmlns:p14="http://schemas.microsoft.com/office/powerpoint/2010/main" val="3219785553"/>
-      </p:ext>
-    </p:extLst>
-  </p:cSld>
-  <p:clrMapOvr>
-    <a:masterClrMapping/>
-  </p:clrMapOvr>
-</p:notes>
-</file>
-
-<file path=ppt/notesSlides/notesSlide8.xml><?xml version="1.0" encoding="utf-8"?>
-<p:notes xmlns:a="http://schemas.openxmlformats.org/drawingml/2006/main" xmlns:r="http://schemas.openxmlformats.org/officeDocument/2006/relationships" xmlns:p="http://schemas.openxmlformats.org/presentationml/2006/main">
-  <p:cSld>
-    <p:spTree>
-      <p:nvGrpSpPr>
-        <p:cNvPr id="1" name=""/>
-        <p:cNvGrpSpPr/>
-        <p:nvPr/>
-      </p:nvGrpSpPr>
-      <p:grpSpPr>
-        <a:xfrm>
-          <a:off x="0" y="0"/>
-          <a:ext cx="0" cy="0"/>
-          <a:chOff x="0" y="0"/>
-          <a:chExt cx="0" cy="0"/>
-        </a:xfrm>
-      </p:grpSpPr>
-      <p:sp>
-        <p:nvSpPr>
-          <p:cNvPr id="2" name="Marcador de imagen de diapositiva 1"/>
-          <p:cNvSpPr>
-            <a:spLocks noGrp="1" noRot="1" noChangeAspect="1"/>
-          </p:cNvSpPr>
-          <p:nvPr>
-            <p:ph type="sldImg"/>
-          </p:nvPr>
-        </p:nvSpPr>
-        <p:spPr/>
-      </p:sp>
-      <p:sp>
-        <p:nvSpPr>
-          <p:cNvPr id="3" name="Marcador de notas 2"/>
-          <p:cNvSpPr>
-            <a:spLocks noGrp="1"/>
-          </p:cNvSpPr>
-          <p:nvPr>
-            <p:ph type="body" idx="1"/>
-          </p:nvPr>
-        </p:nvSpPr>
-        <p:spPr/>
-        <p:txBody>
-          <a:bodyPr/>
-          <a:lstStyle/>
-          <a:p>
-            <a:endParaRPr lang="es-ES"/>
-          </a:p>
-        </p:txBody>
-      </p:sp>
-      <p:sp>
-        <p:nvSpPr>
-          <p:cNvPr id="4" name="Marcador de número de diapositiva 3"/>
-          <p:cNvSpPr>
-            <a:spLocks noGrp="1"/>
-          </p:cNvSpPr>
-          <p:nvPr>
-            <p:ph type="sldNum" sz="quarter" idx="10"/>
-          </p:nvPr>
-        </p:nvSpPr>
-        <p:spPr/>
-        <p:txBody>
-          <a:bodyPr/>
-          <a:lstStyle/>
-          <a:p>
-            <a:fld id="{5EE2CF44-2B13-41B4-A334-1CDF534EEBBF}" type="slidenum">
-              <a:rPr lang="es-ES" smtClean="0"/>
-              <a:pPr/>
-              <a:t>9</a:t>
             </a:fld>
             <a:endParaRPr lang="es-ES" dirty="0"/>
           </a:p>
@@ -2877,7 +2966,7 @@
             <a:fld id="{FC1B432D-78E7-40AE-81C6-52773394A046}" type="datetime1">
               <a:rPr lang="es-ES" smtClean="0"/>
               <a:pPr/>
-              <a:t>13/09/2024</a:t>
+              <a:t>15/09/2024</a:t>
             </a:fld>
             <a:endParaRPr lang="es-ES" dirty="0"/>
           </a:p>
@@ -3067,7 +3156,7 @@
             <a:fld id="{E062C603-371F-4D8B-AFB8-8337237C6271}" type="datetime1">
               <a:rPr lang="es-ES" smtClean="0"/>
               <a:pPr algn="r"/>
-              <a:t>13/09/2024</a:t>
+              <a:t>15/09/2024</a:t>
             </a:fld>
             <a:endParaRPr lang="es-ES" dirty="0"/>
           </a:p>
@@ -3250,7 +3339,7 @@
             <a:fld id="{D1AE6EBB-BEC9-4000-8D95-40B44C4E2CA6}" type="datetime1">
               <a:rPr lang="es-ES" smtClean="0"/>
               <a:pPr/>
-              <a:t>13/09/2024</a:t>
+              <a:t>15/09/2024</a:t>
             </a:fld>
             <a:endParaRPr lang="es-ES" dirty="0"/>
           </a:p>
@@ -3695,7 +3784,7 @@
             <a:fld id="{7CAF1BE7-5365-4137-AE14-A7C362FC891C}" type="datetime1">
               <a:rPr lang="es-ES" smtClean="0"/>
               <a:pPr/>
-              <a:t>13/09/2024</a:t>
+              <a:t>15/09/2024</a:t>
             </a:fld>
             <a:endParaRPr lang="es-ES" dirty="0"/>
           </a:p>
@@ -4144,7 +4233,7 @@
             <a:fld id="{CCE83AA6-4601-4BF7-BD54-99DD2B193FD1}" type="datetime1">
               <a:rPr lang="es-ES" smtClean="0"/>
               <a:pPr/>
-              <a:t>13/09/2024</a:t>
+              <a:t>15/09/2024</a:t>
             </a:fld>
             <a:endParaRPr lang="es-ES" dirty="0"/>
           </a:p>
@@ -4271,7 +4360,7 @@
             <a:fld id="{808DBE58-23DC-4EE9-8158-B69AC44D4A43}" type="datetime1">
               <a:rPr lang="es-ES" smtClean="0"/>
               <a:pPr/>
-              <a:t>13/09/2024</a:t>
+              <a:t>15/09/2024</a:t>
             </a:fld>
             <a:endParaRPr lang="es-ES" dirty="0"/>
           </a:p>
@@ -4374,7 +4463,7 @@
             <a:fld id="{97C2EBBF-D49B-4842-B69E-CE552000DC09}" type="datetime1">
               <a:rPr lang="es-ES" smtClean="0"/>
               <a:pPr/>
-              <a:t>13/09/2024</a:t>
+              <a:t>15/09/2024</a:t>
             </a:fld>
             <a:endParaRPr lang="es-ES" dirty="0"/>
           </a:p>
@@ -4668,7 +4757,7 @@
             <a:fld id="{AF364E66-D00E-49A9-9E62-AB0485562249}" type="datetime1">
               <a:rPr lang="es-ES" smtClean="0"/>
               <a:pPr algn="r"/>
-              <a:t>13/09/2024</a:t>
+              <a:t>15/09/2024</a:t>
             </a:fld>
             <a:endParaRPr lang="es-ES" dirty="0"/>
           </a:p>
@@ -4994,7 +5083,7 @@
             <a:fld id="{8EB92E29-7FB2-4284-9496-FE061DBF8A30}" type="datetime1">
               <a:rPr lang="es-ES" smtClean="0"/>
               <a:pPr/>
-              <a:t>13/09/2024</a:t>
+              <a:t>15/09/2024</a:t>
             </a:fld>
             <a:endParaRPr lang="es-ES" dirty="0"/>
           </a:p>
@@ -5210,7 +5299,7 @@
             <a:fld id="{F03D15E0-E6C7-48CB-A009-DF16BCB95302}" type="datetime1">
               <a:rPr lang="es-ES" smtClean="0"/>
               <a:pPr/>
-              <a:t>13/09/2024</a:t>
+              <a:t>15/09/2024</a:t>
             </a:fld>
             <a:endParaRPr lang="es-ES" dirty="0"/>
           </a:p>
@@ -5820,126 +5909,6 @@
 </p:sld>
 </file>
 
-<file path=ppt/slides/slide10.xml><?xml version="1.0" encoding="utf-8"?>
-<p:sld xmlns:a="http://schemas.openxmlformats.org/drawingml/2006/main" xmlns:r="http://schemas.openxmlformats.org/officeDocument/2006/relationships" xmlns:p="http://schemas.openxmlformats.org/presentationml/2006/main">
-  <p:cSld>
-    <p:spTree>
-      <p:nvGrpSpPr>
-        <p:cNvPr id="1" name=""/>
-        <p:cNvGrpSpPr/>
-        <p:nvPr/>
-      </p:nvGrpSpPr>
-      <p:grpSpPr>
-        <a:xfrm>
-          <a:off x="0" y="0"/>
-          <a:ext cx="0" cy="0"/>
-          <a:chOff x="0" y="0"/>
-          <a:chExt cx="0" cy="0"/>
-        </a:xfrm>
-      </p:grpSpPr>
-      <p:sp>
-        <p:nvSpPr>
-          <p:cNvPr id="2" name="Título 1"/>
-          <p:cNvSpPr>
-            <a:spLocks noGrp="1"/>
-          </p:cNvSpPr>
-          <p:nvPr>
-            <p:ph type="ctrTitle"/>
-          </p:nvPr>
-        </p:nvSpPr>
-        <p:spPr>
-          <a:xfrm>
-            <a:off x="4511824" y="3789040"/>
-            <a:ext cx="3456384" cy="576064"/>
-          </a:xfrm>
-        </p:spPr>
-        <p:txBody>
-          <a:bodyPr rtlCol="0">
-            <a:noAutofit/>
-          </a:bodyPr>
-          <a:lstStyle/>
-          <a:p>
-            <a:pPr algn="ctr" rtl="0"/>
-            <a:r>
-              <a:rPr lang="es-MX" sz="3600" dirty="0"/>
-              <a:t>¡¡¡Gracias!!!</a:t>
-            </a:r>
-            <a:endParaRPr lang="es-ES" sz="3600" dirty="0"/>
-          </a:p>
-        </p:txBody>
-      </p:sp>
-      <p:pic>
-        <p:nvPicPr>
-          <p:cNvPr id="1026" name="Picture 2">
-            <a:extLst>
-              <a:ext uri="{FF2B5EF4-FFF2-40B4-BE49-F238E27FC236}">
-                <a16:creationId xmlns:a16="http://schemas.microsoft.com/office/drawing/2014/main" id="{A3FBFA89-3E25-4875-997A-79EBB0930C0C}"/>
-              </a:ext>
-            </a:extLst>
-          </p:cNvPr>
-          <p:cNvPicPr>
-            <a:picLocks noChangeAspect="1" noChangeArrowheads="1"/>
-          </p:cNvPicPr>
-          <p:nvPr/>
-        </p:nvPicPr>
-        <p:blipFill>
-          <a:blip r:embed="rId2">
-            <a:extLst>
-              <a:ext uri="{28A0092B-C50C-407E-A947-70E740481C1C}">
-                <a14:useLocalDpi xmlns:a14="http://schemas.microsoft.com/office/drawing/2010/main" val="0"/>
-              </a:ext>
-            </a:extLst>
-          </a:blip>
-          <a:srcRect/>
-          <a:stretch>
-            <a:fillRect/>
-          </a:stretch>
-        </p:blipFill>
-        <p:spPr bwMode="auto">
-          <a:xfrm>
-            <a:off x="9696400" y="5081946"/>
-            <a:ext cx="2319868" cy="456241"/>
-          </a:xfrm>
-          <a:prstGeom prst="rect">
-            <a:avLst/>
-          </a:prstGeom>
-          <a:noFill/>
-          <a:extLst>
-            <a:ext uri="{909E8E84-426E-40DD-AFC4-6F175D3DCCD1}">
-              <a14:hiddenFill xmlns:a14="http://schemas.microsoft.com/office/drawing/2010/main">
-                <a:solidFill>
-                  <a:srgbClr val="FFFFFF"/>
-                </a:solidFill>
-              </a14:hiddenFill>
-            </a:ext>
-          </a:extLst>
-        </p:spPr>
-      </p:pic>
-    </p:spTree>
-    <p:extLst>
-      <p:ext uri="{BB962C8B-B14F-4D97-AF65-F5344CB8AC3E}">
-        <p14:creationId xmlns:p14="http://schemas.microsoft.com/office/powerpoint/2010/main" val="881312324"/>
-      </p:ext>
-    </p:extLst>
-  </p:cSld>
-  <p:clrMapOvr>
-    <a:masterClrMapping/>
-  </p:clrMapOvr>
-  <mc:AlternateContent xmlns:mc="http://schemas.openxmlformats.org/markup-compatibility/2006" xmlns:p14="http://schemas.microsoft.com/office/powerpoint/2010/main">
-    <mc:Choice Requires="p14">
-      <p:transition spd="med" p14:dur="700">
-        <p:fade/>
-      </p:transition>
-    </mc:Choice>
-    <mc:Fallback xmlns="">
-      <p:transition spd="med">
-        <p:fade/>
-      </p:transition>
-    </mc:Fallback>
-  </mc:AlternateContent>
-</p:sld>
-</file>
-
 <file path=ppt/slides/slide2.xml><?xml version="1.0" encoding="utf-8"?>
 <p:sld xmlns:a="http://schemas.openxmlformats.org/drawingml/2006/main" xmlns:r="http://schemas.openxmlformats.org/officeDocument/2006/relationships" xmlns:p="http://schemas.openxmlformats.org/presentationml/2006/main">
   <p:cSld>
@@ -6004,28 +5973,12 @@
         <p:spPr>
           <a:xfrm>
             <a:off x="1524000" y="1828800"/>
-            <a:ext cx="3923928" cy="3400400"/>
+            <a:ext cx="3131840" cy="2896344"/>
           </a:xfrm>
         </p:spPr>
         <p:txBody>
           <a:bodyPr rtlCol="0"/>
           <a:lstStyle/>
-          <a:p>
-            <a:pPr marL="0" indent="0" rtl="0">
-              <a:buNone/>
-            </a:pPr>
-            <a:r>
-              <a:rPr lang="es-CO" dirty="0"/>
-              <a:t>📊 </a:t>
-            </a:r>
-            <a:r>
-              <a:rPr lang="es-CO" dirty="0">
-                <a:hlinkClick r:id="rId3" action="ppaction://hlinksldjump"/>
-              </a:rPr>
-              <a:t>Situación Actual.</a:t>
-            </a:r>
-            <a:endParaRPr lang="es-CO" dirty="0"/>
-          </a:p>
           <a:p>
             <a:pPr marL="0" indent="0">
               <a:buNone/>
@@ -6036,7 +5989,7 @@
             </a:r>
             <a:r>
               <a:rPr lang="es-CO" dirty="0">
-                <a:hlinkClick r:id="rId4" action="ppaction://hlinksldjump"/>
+                <a:hlinkClick r:id="rId3" action="ppaction://hlinksldjump"/>
               </a:rPr>
               <a:t>Desafíos.</a:t>
             </a:r>
@@ -6052,7 +6005,7 @@
             </a:r>
             <a:r>
               <a:rPr lang="es-CO" dirty="0">
-                <a:hlinkClick r:id="rId5" action="ppaction://hlinksldjump"/>
+                <a:hlinkClick r:id="rId4" action="ppaction://hlinksldjump"/>
               </a:rPr>
               <a:t>Propuesta.</a:t>
             </a:r>
@@ -6068,7 +6021,7 @@
             </a:r>
             <a:r>
               <a:rPr lang="es-CO" dirty="0">
-                <a:hlinkClick r:id="rId6" action="ppaction://hlinksldjump"/>
+                <a:hlinkClick r:id="rId5" action="ppaction://hlinksldjump"/>
               </a:rPr>
               <a:t>Plan de Acción.</a:t>
             </a:r>
@@ -6084,7 +6037,7 @@
             </a:r>
             <a:r>
               <a:rPr lang="es-CO" dirty="0">
-                <a:hlinkClick r:id="rId7" action="ppaction://hlinksldjump"/>
+                <a:hlinkClick r:id="rId6" action="ppaction://hlinksldjump"/>
               </a:rPr>
               <a:t>Riesgos y Mitigaciones.</a:t>
             </a:r>
@@ -6100,7 +6053,7 @@
             </a:r>
             <a:r>
               <a:rPr lang="es-CO" dirty="0">
-                <a:hlinkClick r:id="rId8" action="ppaction://hlinksldjump"/>
+                <a:hlinkClick r:id="rId7" action="ppaction://hlinksldjump"/>
               </a:rPr>
               <a:t>Requerimientos.</a:t>
             </a:r>
@@ -6116,7 +6069,7 @@
             </a:r>
             <a:r>
               <a:rPr lang="es-CO" dirty="0">
-                <a:hlinkClick r:id="rId9" action="ppaction://hlinksldjump"/>
+                <a:hlinkClick r:id="rId8" action="ppaction://hlinksldjump"/>
               </a:rPr>
               <a:t>Alternativas.</a:t>
             </a:r>
@@ -6142,420 +6095,6 @@
 </file>
 
 <file path=ppt/slides/slide3.xml><?xml version="1.0" encoding="utf-8"?>
-<p:sld xmlns:a="http://schemas.openxmlformats.org/drawingml/2006/main" xmlns:r="http://schemas.openxmlformats.org/officeDocument/2006/relationships" xmlns:p="http://schemas.openxmlformats.org/presentationml/2006/main">
-  <p:cSld>
-    <p:spTree>
-      <p:nvGrpSpPr>
-        <p:cNvPr id="1" name=""/>
-        <p:cNvGrpSpPr/>
-        <p:nvPr/>
-      </p:nvGrpSpPr>
-      <p:grpSpPr>
-        <a:xfrm>
-          <a:off x="0" y="0"/>
-          <a:ext cx="0" cy="0"/>
-          <a:chOff x="0" y="0"/>
-          <a:chExt cx="0" cy="0"/>
-        </a:xfrm>
-      </p:grpSpPr>
-      <p:sp>
-        <p:nvSpPr>
-          <p:cNvPr id="2" name="Título 1"/>
-          <p:cNvSpPr>
-            <a:spLocks noGrp="1"/>
-          </p:cNvSpPr>
-          <p:nvPr>
-            <p:ph type="title"/>
-          </p:nvPr>
-        </p:nvSpPr>
-        <p:spPr>
-          <a:xfrm>
-            <a:off x="1524000" y="1052736"/>
-            <a:ext cx="4644008" cy="547464"/>
-          </a:xfrm>
-        </p:spPr>
-        <p:txBody>
-          <a:bodyPr rtlCol="0">
-            <a:normAutofit fontScale="90000"/>
-          </a:bodyPr>
-          <a:lstStyle/>
-          <a:p>
-            <a:pPr marL="0" indent="0">
-              <a:buNone/>
-            </a:pPr>
-            <a:r>
-              <a:rPr lang="es-CO" b="1" dirty="0"/>
-              <a:t>📊 Situación Actual.</a:t>
-            </a:r>
-          </a:p>
-        </p:txBody>
-      </p:sp>
-      <p:graphicFrame>
-        <p:nvGraphicFramePr>
-          <p:cNvPr id="5" name="Marcador de posición de contenido 4" descr="Tabla de ejemplo con 3 columnas y 4 filas" title="Tabla"/>
-          <p:cNvGraphicFramePr>
-            <a:graphicFrameLocks noGrp="1"/>
-          </p:cNvGraphicFramePr>
-          <p:nvPr>
-            <p:ph sz="half" idx="2"/>
-            <p:extLst>
-              <p:ext uri="{D42A27DB-BD31-4B8C-83A1-F6EECF244321}">
-                <p14:modId xmlns:p14="http://schemas.microsoft.com/office/powerpoint/2010/main" val="30324420"/>
-              </p:ext>
-            </p:extLst>
-          </p:nvPr>
-        </p:nvGraphicFramePr>
-        <p:xfrm>
-          <a:off x="2351584" y="2780928"/>
-          <a:ext cx="7706551" cy="1793082"/>
-        </p:xfrm>
-        <a:graphic>
-          <a:graphicData uri="http://schemas.openxmlformats.org/drawingml/2006/table">
-            <a:tbl>
-              <a:tblPr firstRow="1" bandRow="1">
-                <a:tableStyleId>{5C22544A-7EE6-4342-B048-85BDC9FD1C3A}</a:tableStyleId>
-              </a:tblPr>
-              <a:tblGrid>
-                <a:gridCol w="1221740">
-                  <a:extLst>
-                    <a:ext uri="{9D8B030D-6E8A-4147-A177-3AD203B41FA5}">
-                      <a16:colId xmlns:a16="http://schemas.microsoft.com/office/drawing/2014/main" val="20000"/>
-                    </a:ext>
-                  </a:extLst>
-                </a:gridCol>
-                <a:gridCol w="1286193">
-                  <a:extLst>
-                    <a:ext uri="{9D8B030D-6E8A-4147-A177-3AD203B41FA5}">
-                      <a16:colId xmlns:a16="http://schemas.microsoft.com/office/drawing/2014/main" val="20001"/>
-                    </a:ext>
-                  </a:extLst>
-                </a:gridCol>
-                <a:gridCol w="855980">
-                  <a:extLst>
-                    <a:ext uri="{9D8B030D-6E8A-4147-A177-3AD203B41FA5}">
-                      <a16:colId xmlns:a16="http://schemas.microsoft.com/office/drawing/2014/main" val="20002"/>
-                    </a:ext>
-                  </a:extLst>
-                </a:gridCol>
-                <a:gridCol w="4342638">
-                  <a:extLst>
-                    <a:ext uri="{9D8B030D-6E8A-4147-A177-3AD203B41FA5}">
-                      <a16:colId xmlns:a16="http://schemas.microsoft.com/office/drawing/2014/main" val="2789338225"/>
-                    </a:ext>
-                  </a:extLst>
-                </a:gridCol>
-              </a:tblGrid>
-              <a:tr h="496094">
-                <a:tc>
-                  <a:txBody>
-                    <a:bodyPr/>
-                    <a:lstStyle/>
-                    <a:p>
-                      <a:pPr marL="0" marR="0" lvl="0" indent="0" algn="ctr" defTabSz="914400" rtl="0" eaLnBrk="1" fontAlgn="auto" latinLnBrk="0" hangingPunct="1">
-                        <a:lnSpc>
-                          <a:spcPct val="100000"/>
-                        </a:lnSpc>
-                        <a:spcBef>
-                          <a:spcPts val="0"/>
-                        </a:spcBef>
-                        <a:spcAft>
-                          <a:spcPts val="0"/>
-                        </a:spcAft>
-                        <a:buClrTx/>
-                        <a:buSzTx/>
-                        <a:buFontTx/>
-                        <a:buNone/>
-                        <a:tabLst/>
-                        <a:defRPr/>
-                      </a:pPr>
-                      <a:r>
-                        <a:rPr lang="es-ES" sz="1400" b="1" noProof="0" dirty="0">
-                          <a:solidFill>
-                            <a:srgbClr val="002060"/>
-                          </a:solidFill>
-                        </a:rPr>
-                        <a:t>Data Factory.</a:t>
-                      </a:r>
-                    </a:p>
-                  </a:txBody>
-                  <a:tcPr anchor="ctr"/>
-                </a:tc>
-                <a:tc>
-                  <a:txBody>
-                    <a:bodyPr/>
-                    <a:lstStyle/>
-                    <a:p>
-                      <a:pPr algn="ctr" rtl="0"/>
-                      <a:r>
-                        <a:rPr lang="es-ES" sz="1400" b="1" noProof="0" dirty="0">
-                          <a:solidFill>
-                            <a:srgbClr val="002060"/>
-                          </a:solidFill>
-                        </a:rPr>
-                        <a:t>Instancia.</a:t>
-                      </a:r>
-                    </a:p>
-                  </a:txBody>
-                  <a:tcPr anchor="ctr"/>
-                </a:tc>
-                <a:tc>
-                  <a:txBody>
-                    <a:bodyPr/>
-                    <a:lstStyle/>
-                    <a:p>
-                      <a:pPr algn="ctr"/>
-                      <a:r>
-                        <a:rPr lang="es-CO" sz="1400" b="1" dirty="0">
-                          <a:solidFill>
-                            <a:srgbClr val="002060"/>
-                          </a:solidFill>
-                        </a:rPr>
-                        <a:t>DevOps.</a:t>
-                      </a:r>
-                    </a:p>
-                  </a:txBody>
-                  <a:tcPr anchor="ctr"/>
-                </a:tc>
-                <a:tc>
-                  <a:txBody>
-                    <a:bodyPr/>
-                    <a:lstStyle/>
-                    <a:p>
-                      <a:pPr algn="ctr"/>
-                      <a:r>
-                        <a:rPr lang="es-CO" sz="1400" b="1" dirty="0">
-                          <a:solidFill>
-                            <a:srgbClr val="002060"/>
-                          </a:solidFill>
-                        </a:rPr>
-                        <a:t>Pipelines.</a:t>
-                      </a:r>
-                    </a:p>
-                  </a:txBody>
-                  <a:tcPr anchor="ctr"/>
-                </a:tc>
-                <a:extLst>
-                  <a:ext uri="{0D108BD9-81ED-4DB2-BD59-A6C34878D82A}">
-                    <a16:rowId xmlns:a16="http://schemas.microsoft.com/office/drawing/2014/main" val="10000"/>
-                  </a:ext>
-                </a:extLst>
-              </a:tr>
-              <a:tr h="496094">
-                <a:tc>
-                  <a:txBody>
-                    <a:bodyPr/>
-                    <a:lstStyle/>
-                    <a:p>
-                      <a:pPr algn="ctr"/>
-                      <a:r>
-                        <a:rPr lang="es-CO" sz="1400" dirty="0"/>
-                        <a:t>DF1.</a:t>
-                      </a:r>
-                    </a:p>
-                  </a:txBody>
-                  <a:tcPr anchor="ctr"/>
-                </a:tc>
-                <a:tc>
-                  <a:txBody>
-                    <a:bodyPr/>
-                    <a:lstStyle/>
-                    <a:p>
-                      <a:pPr algn="ctr"/>
-                      <a:r>
-                        <a:rPr lang="es-CO" sz="1400" dirty="0"/>
-                        <a:t>Desarrollo.</a:t>
-                      </a:r>
-                    </a:p>
-                  </a:txBody>
-                  <a:tcPr anchor="ctr"/>
-                </a:tc>
-                <a:tc>
-                  <a:txBody>
-                    <a:bodyPr/>
-                    <a:lstStyle/>
-                    <a:p>
-                      <a:pPr algn="ctr"/>
-                      <a:r>
-                        <a:rPr lang="es-CO" sz="1400" dirty="0"/>
-                        <a:t>SI.</a:t>
-                      </a:r>
-                    </a:p>
-                  </a:txBody>
-                  <a:tcPr anchor="ctr"/>
-                </a:tc>
-                <a:tc>
-                  <a:txBody>
-                    <a:bodyPr/>
-                    <a:lstStyle/>
-                    <a:p>
-                      <a:pPr algn="ctr"/>
-                      <a:r>
-                        <a:rPr lang="es-ES" sz="1400" noProof="0" dirty="0"/>
-                        <a:t>Databricks, Synapse, Functions, SQL Server, Key Vaults</a:t>
-                      </a:r>
-                      <a:r>
-                        <a:rPr lang="es-CO" sz="1400" dirty="0"/>
-                        <a:t>.</a:t>
-                      </a:r>
-                    </a:p>
-                  </a:txBody>
-                  <a:tcPr anchor="ctr"/>
-                </a:tc>
-                <a:extLst>
-                  <a:ext uri="{0D108BD9-81ED-4DB2-BD59-A6C34878D82A}">
-                    <a16:rowId xmlns:a16="http://schemas.microsoft.com/office/drawing/2014/main" val="10001"/>
-                  </a:ext>
-                </a:extLst>
-              </a:tr>
-              <a:tr h="496094">
-                <a:tc>
-                  <a:txBody>
-                    <a:bodyPr/>
-                    <a:lstStyle/>
-                    <a:p>
-                      <a:pPr algn="ctr"/>
-                      <a:r>
-                        <a:rPr lang="es-CO" sz="1400" dirty="0"/>
-                        <a:t>DF2.</a:t>
-                      </a:r>
-                    </a:p>
-                  </a:txBody>
-                  <a:tcPr anchor="ctr"/>
-                </a:tc>
-                <a:tc>
-                  <a:txBody>
-                    <a:bodyPr/>
-                    <a:lstStyle/>
-                    <a:p>
-                      <a:pPr algn="ctr"/>
-                      <a:r>
-                        <a:rPr lang="es-CO" sz="1400" dirty="0"/>
-                        <a:t>Producción.</a:t>
-                      </a:r>
-                    </a:p>
-                  </a:txBody>
-                  <a:tcPr anchor="ctr"/>
-                </a:tc>
-                <a:tc rowSpan="2">
-                  <a:txBody>
-                    <a:bodyPr/>
-                    <a:lstStyle/>
-                    <a:p>
-                      <a:pPr algn="ctr"/>
-                      <a:r>
-                        <a:rPr lang="es-CO" sz="1400" dirty="0"/>
-                        <a:t>No.</a:t>
-                      </a:r>
-                    </a:p>
-                  </a:txBody>
-                  <a:tcPr anchor="ctr"/>
-                </a:tc>
-                <a:tc>
-                  <a:txBody>
-                    <a:bodyPr/>
-                    <a:lstStyle/>
-                    <a:p>
-                      <a:pPr algn="ctr"/>
-                      <a:r>
-                        <a:rPr lang="es-ES" sz="1400" noProof="0" dirty="0"/>
-                        <a:t>Databricks, Synapse, Functions, SQL Server, Key Vaults</a:t>
-                      </a:r>
-                      <a:r>
-                        <a:rPr lang="es-CO" sz="1400" dirty="0"/>
-                        <a:t>.</a:t>
-                      </a:r>
-                    </a:p>
-                  </a:txBody>
-                  <a:tcPr anchor="ctr"/>
-                </a:tc>
-                <a:extLst>
-                  <a:ext uri="{0D108BD9-81ED-4DB2-BD59-A6C34878D82A}">
-                    <a16:rowId xmlns:a16="http://schemas.microsoft.com/office/drawing/2014/main" val="10002"/>
-                  </a:ext>
-                </a:extLst>
-              </a:tr>
-              <a:tr h="248047">
-                <a:tc>
-                  <a:txBody>
-                    <a:bodyPr/>
-                    <a:lstStyle/>
-                    <a:p>
-                      <a:pPr algn="ctr"/>
-                      <a:r>
-                        <a:rPr lang="es-CO" sz="1400" dirty="0"/>
-                        <a:t>DF3.</a:t>
-                      </a:r>
-                    </a:p>
-                  </a:txBody>
-                  <a:tcPr anchor="ctr"/>
-                </a:tc>
-                <a:tc>
-                  <a:txBody>
-                    <a:bodyPr/>
-                    <a:lstStyle/>
-                    <a:p>
-                      <a:pPr algn="ctr"/>
-                      <a:r>
-                        <a:rPr lang="es-CO" sz="1400" dirty="0"/>
-                        <a:t>Carpeta extra.</a:t>
-                      </a:r>
-                    </a:p>
-                  </a:txBody>
-                  <a:tcPr anchor="ctr"/>
-                </a:tc>
-                <a:tc vMerge="1">
-                  <a:txBody>
-                    <a:bodyPr/>
-                    <a:lstStyle/>
-                    <a:p>
-                      <a:pPr algn="ctr"/>
-                      <a:r>
-                        <a:rPr lang="es-CO" sz="1400" dirty="0"/>
-                        <a:t>DF3.</a:t>
-                      </a:r>
-                    </a:p>
-                  </a:txBody>
-                  <a:tcPr anchor="ctr"/>
-                </a:tc>
-                <a:tc>
-                  <a:txBody>
-                    <a:bodyPr/>
-                    <a:lstStyle/>
-                    <a:p>
-                      <a:pPr algn="ctr"/>
-                      <a:r>
-                        <a:rPr lang="es-ES" sz="1400" noProof="0" dirty="0"/>
-                        <a:t>Excel (Sharepoint), Logic Apps.</a:t>
-                      </a:r>
-                      <a:endParaRPr lang="es-CO" sz="1400" dirty="0"/>
-                    </a:p>
-                  </a:txBody>
-                  <a:tcPr anchor="ctr"/>
-                </a:tc>
-                <a:extLst>
-                  <a:ext uri="{0D108BD9-81ED-4DB2-BD59-A6C34878D82A}">
-                    <a16:rowId xmlns:a16="http://schemas.microsoft.com/office/drawing/2014/main" val="10003"/>
-                  </a:ext>
-                </a:extLst>
-              </a:tr>
-            </a:tbl>
-          </a:graphicData>
-        </a:graphic>
-      </p:graphicFrame>
-    </p:spTree>
-    <p:extLst>
-      <p:ext uri="{BB962C8B-B14F-4D97-AF65-F5344CB8AC3E}">
-        <p14:creationId xmlns:p14="http://schemas.microsoft.com/office/powerpoint/2010/main" val="2105110879"/>
-      </p:ext>
-    </p:extLst>
-  </p:cSld>
-  <p:clrMapOvr>
-    <a:masterClrMapping/>
-  </p:clrMapOvr>
-</p:sld>
-</file>
-
-<file path=ppt/slides/slide4.xml><?xml version="1.0" encoding="utf-8"?>
 <p:sld xmlns:a="http://schemas.openxmlformats.org/drawingml/2006/main" xmlns:r="http://schemas.openxmlformats.org/officeDocument/2006/relationships" xmlns:p="http://schemas.openxmlformats.org/presentationml/2006/main">
   <p:cSld>
     <p:spTree>
@@ -8320,14 +7859,11 @@
                 </a:spcAft>
                 <a:buNone/>
               </a:pPr>
-              <a:r>
-                <a:rPr lang="es-ES" sz="1600" b="1" kern="1200" noProof="0" dirty="0">
-                  <a:solidFill>
-                    <a:schemeClr val="bg2"/>
-                  </a:solidFill>
-                </a:rPr>
-                <a:t>* 3.</a:t>
-              </a:r>
+              <a:endParaRPr lang="es-ES" sz="1600" b="1" kern="1200" noProof="0" dirty="0">
+                <a:solidFill>
+                  <a:schemeClr val="bg2"/>
+                </a:solidFill>
+              </a:endParaRPr>
             </a:p>
           </p:txBody>
         </p:sp>
@@ -9600,30 +9136,11 @@
                 </a:spcAft>
                 <a:buNone/>
               </a:pPr>
-              <a:r>
-                <a:rPr lang="es-ES" sz="1600" b="1" kern="1200" noProof="0" dirty="0">
-                  <a:solidFill>
-                    <a:schemeClr val="bg2"/>
-                  </a:solidFill>
-                </a:rPr>
-                <a:t>* </a:t>
-              </a:r>
-              <a:r>
-                <a:rPr lang="es-ES" sz="1600" b="1" dirty="0">
-                  <a:solidFill>
-                    <a:schemeClr val="bg2"/>
-                  </a:solidFill>
-                </a:rPr>
-                <a:t>3</a:t>
-              </a:r>
-              <a:r>
-                <a:rPr lang="es-ES" sz="1600" b="1" kern="1200" noProof="0" dirty="0">
-                  <a:solidFill>
-                    <a:schemeClr val="bg2"/>
-                  </a:solidFill>
-                </a:rPr>
-                <a:t>.                  </a:t>
-              </a:r>
+              <a:endParaRPr lang="es-ES" sz="1600" b="1" kern="1200" noProof="0" dirty="0">
+                <a:solidFill>
+                  <a:schemeClr val="bg2"/>
+                </a:solidFill>
+              </a:endParaRPr>
             </a:p>
           </p:txBody>
         </p:sp>
@@ -10489,7 +10006,7 @@
         </p:nvSpPr>
         <p:spPr>
           <a:xfrm>
-            <a:off x="6453938" y="4377770"/>
+            <a:off x="6508632" y="4323882"/>
             <a:ext cx="1406728" cy="486461"/>
           </a:xfrm>
           <a:prstGeom prst="rect">
@@ -12936,7 +12453,7 @@
                   <a:schemeClr val="bg2"/>
                 </a:solidFill>
               </a:rPr>
-              <a:t>* 3</a:t>
+              <a:t>* 1</a:t>
             </a:r>
             <a:r>
               <a:rPr lang="es-ES" sz="1800" b="1" kern="1200" noProof="0" dirty="0">
@@ -15112,6 +14629,108 @@
           </a:extLst>
         </p:spPr>
       </p:pic>
+      <p:sp>
+        <p:nvSpPr>
+          <p:cNvPr id="149" name="CuadroTexto 148">
+            <a:extLst>
+              <a:ext uri="{FF2B5EF4-FFF2-40B4-BE49-F238E27FC236}">
+                <a16:creationId xmlns:a16="http://schemas.microsoft.com/office/drawing/2014/main" id="{4FC35BCF-1886-4097-9726-407FBB22F592}"/>
+              </a:ext>
+            </a:extLst>
+          </p:cNvPr>
+          <p:cNvSpPr txBox="1"/>
+          <p:nvPr/>
+        </p:nvSpPr>
+        <p:spPr>
+          <a:xfrm>
+            <a:off x="4284275" y="2837786"/>
+            <a:ext cx="554263" cy="341632"/>
+          </a:xfrm>
+          <a:prstGeom prst="rect">
+            <a:avLst/>
+          </a:prstGeom>
+          <a:noFill/>
+        </p:spPr>
+        <p:txBody>
+          <a:bodyPr wrap="square">
+            <a:spAutoFit/>
+          </a:bodyPr>
+          <a:lstStyle/>
+          <a:p>
+            <a:pPr marL="0" lvl="0" indent="0" algn="ctr" defTabSz="977900" rtl="0">
+              <a:lnSpc>
+                <a:spcPct val="90000"/>
+              </a:lnSpc>
+              <a:spcBef>
+                <a:spcPct val="0"/>
+              </a:spcBef>
+              <a:spcAft>
+                <a:spcPct val="35000"/>
+              </a:spcAft>
+              <a:buNone/>
+            </a:pPr>
+            <a:r>
+              <a:rPr lang="es-ES" sz="1800" b="1" kern="1200" noProof="0" dirty="0">
+                <a:solidFill>
+                  <a:schemeClr val="bg2"/>
+                </a:solidFill>
+              </a:rPr>
+              <a:t>* 3.</a:t>
+            </a:r>
+          </a:p>
+        </p:txBody>
+      </p:sp>
+      <p:sp>
+        <p:nvSpPr>
+          <p:cNvPr id="155" name="CuadroTexto 154">
+            <a:extLst>
+              <a:ext uri="{FF2B5EF4-FFF2-40B4-BE49-F238E27FC236}">
+                <a16:creationId xmlns:a16="http://schemas.microsoft.com/office/drawing/2014/main" id="{BF900522-179F-4F5F-9454-2AB0939E851E}"/>
+              </a:ext>
+            </a:extLst>
+          </p:cNvPr>
+          <p:cNvSpPr txBox="1"/>
+          <p:nvPr/>
+        </p:nvSpPr>
+        <p:spPr>
+          <a:xfrm>
+            <a:off x="9735501" y="2875484"/>
+            <a:ext cx="554263" cy="341632"/>
+          </a:xfrm>
+          <a:prstGeom prst="rect">
+            <a:avLst/>
+          </a:prstGeom>
+          <a:noFill/>
+        </p:spPr>
+        <p:txBody>
+          <a:bodyPr wrap="square">
+            <a:spAutoFit/>
+          </a:bodyPr>
+          <a:lstStyle/>
+          <a:p>
+            <a:pPr marL="0" lvl="0" indent="0" algn="ctr" defTabSz="977900" rtl="0">
+              <a:lnSpc>
+                <a:spcPct val="90000"/>
+              </a:lnSpc>
+              <a:spcBef>
+                <a:spcPct val="0"/>
+              </a:spcBef>
+              <a:spcAft>
+                <a:spcPct val="35000"/>
+              </a:spcAft>
+              <a:buNone/>
+            </a:pPr>
+            <a:r>
+              <a:rPr lang="es-ES" sz="1800" b="1" kern="1200" noProof="0" dirty="0">
+                <a:solidFill>
+                  <a:schemeClr val="bg2"/>
+                </a:solidFill>
+              </a:rPr>
+              <a:t>* 2.</a:t>
+            </a:r>
+          </a:p>
+        </p:txBody>
+      </p:sp>
     </p:spTree>
     <p:extLst>
       <p:ext uri="{BB962C8B-B14F-4D97-AF65-F5344CB8AC3E}">
@@ -15125,7 +14744,7 @@
 </p:sld>
 </file>
 
-<file path=ppt/slides/slide5.xml><?xml version="1.0" encoding="utf-8"?>
+<file path=ppt/slides/slide4.xml><?xml version="1.0" encoding="utf-8"?>
 <p:sld xmlns:a="http://schemas.openxmlformats.org/drawingml/2006/main" xmlns:r="http://schemas.openxmlformats.org/officeDocument/2006/relationships" xmlns:p="http://schemas.openxmlformats.org/presentationml/2006/main">
   <p:cSld>
     <p:spTree>
@@ -15505,13 +15124,6 @@
               </a:rPr>
               <a:t>2. Azure DevOps (Integración Git).</a:t>
             </a:r>
-            <a:endParaRPr lang="es-CO" b="1" dirty="0"/>
-          </a:p>
-          <a:p>
-            <a:pPr marL="0" indent="0">
-              <a:buFont typeface="Arial" pitchFamily="34" charset="0"/>
-              <a:buNone/>
-            </a:pPr>
             <a:endParaRPr lang="es-CO" b="1" dirty="0">
               <a:solidFill>
                 <a:schemeClr val="tx1"/>
@@ -15522,10 +15134,11 @@
       </p:sp>
       <p:pic>
         <p:nvPicPr>
-          <p:cNvPr id="5" name="Imagen 4">
+          <p:cNvPr id="18" name="Imagen 17">
+            <a:hlinkClick r:id="rId4" action="ppaction://hlinksldjump" tooltip="Azure Integration Runtime: Gestiona el escalado automatico a demanda de la orquestación de Data Factory."/>
             <a:extLst>
               <a:ext uri="{FF2B5EF4-FFF2-40B4-BE49-F238E27FC236}">
-                <a16:creationId xmlns:a16="http://schemas.microsoft.com/office/drawing/2014/main" id="{A9F62792-2081-4D1C-91DD-9D2EA612C511}"/>
+                <a16:creationId xmlns:a16="http://schemas.microsoft.com/office/drawing/2014/main" id="{20FB7F7B-9071-4199-A428-F315FD828D89}"/>
               </a:ext>
             </a:extLst>
           </p:cNvPr>
@@ -15535,15 +15148,15 @@
           <p:nvPr/>
         </p:nvPicPr>
         <p:blipFill>
-          <a:blip r:embed="rId4"/>
+          <a:blip r:embed="rId5"/>
           <a:stretch>
             <a:fillRect/>
           </a:stretch>
         </p:blipFill>
         <p:spPr>
           <a:xfrm>
-            <a:off x="2783632" y="880119"/>
-            <a:ext cx="7074986" cy="4277073"/>
+            <a:off x="2567607" y="880120"/>
+            <a:ext cx="6984777" cy="4277072"/>
           </a:xfrm>
           <a:prstGeom prst="rect">
             <a:avLst/>
@@ -15552,10 +15165,10 @@
       </p:pic>
       <p:sp>
         <p:nvSpPr>
-          <p:cNvPr id="13" name="CuadroTexto 12">
+          <p:cNvPr id="11" name="CuadroTexto 10">
             <a:extLst>
               <a:ext uri="{FF2B5EF4-FFF2-40B4-BE49-F238E27FC236}">
-                <a16:creationId xmlns:a16="http://schemas.microsoft.com/office/drawing/2014/main" id="{0349F266-8F74-4D71-AF90-A74869CBE55F}"/>
+                <a16:creationId xmlns:a16="http://schemas.microsoft.com/office/drawing/2014/main" id="{480D9449-77CB-46E5-99D0-6AC2362D1D73}"/>
               </a:ext>
             </a:extLst>
           </p:cNvPr>
@@ -15564,7 +15177,7 @@
         </p:nvSpPr>
         <p:spPr>
           <a:xfrm>
-            <a:off x="2855640" y="1772816"/>
+            <a:off x="2639616" y="1700808"/>
             <a:ext cx="288032" cy="276999"/>
           </a:xfrm>
           <a:prstGeom prst="rect">
@@ -15607,7 +15220,7 @@
 </p:sld>
 </file>
 
-<file path=ppt/slides/slide6.xml><?xml version="1.0" encoding="utf-8"?>
+<file path=ppt/slides/slide5.xml><?xml version="1.0" encoding="utf-8"?>
 <p:sld xmlns:a="http://schemas.openxmlformats.org/drawingml/2006/main" xmlns:r="http://schemas.openxmlformats.org/officeDocument/2006/relationships" xmlns:p="http://schemas.openxmlformats.org/presentationml/2006/main">
   <p:cSld>
     <p:spTree>
@@ -15737,7 +15350,7 @@
       </p:sp>
       <p:graphicFrame>
         <p:nvGraphicFramePr>
-          <p:cNvPr id="6" name="Gráfico 5">
+          <p:cNvPr id="5" name="Gráfico 4">
             <a:extLst>
               <a:ext uri="{FF2B5EF4-FFF2-40B4-BE49-F238E27FC236}">
                 <a16:creationId xmlns:a16="http://schemas.microsoft.com/office/drawing/2014/main" id="{DFDD1AF0-CE04-4303-B96A-E331F9FE0308}"/>
@@ -15750,14 +15363,14 @@
           <p:nvPr>
             <p:extLst>
               <p:ext uri="{D42A27DB-BD31-4B8C-83A1-F6EECF244321}">
-                <p14:modId xmlns:p14="http://schemas.microsoft.com/office/powerpoint/2010/main" val="340945243"/>
+                <p14:modId xmlns:p14="http://schemas.microsoft.com/office/powerpoint/2010/main" val="2510325260"/>
               </p:ext>
             </p:extLst>
           </p:nvPr>
         </p:nvGraphicFramePr>
         <p:xfrm>
-          <a:off x="551384" y="1304925"/>
-          <a:ext cx="11233247" cy="4248149"/>
+          <a:off x="1271464" y="1438274"/>
+          <a:ext cx="10225136" cy="4366989"/>
         </p:xfrm>
         <a:graphic>
           <a:graphicData uri="http://schemas.openxmlformats.org/drawingml/2006/chart">
@@ -15778,7 +15391,7 @@
 </p:sld>
 </file>
 
-<file path=ppt/slides/slide7.xml><?xml version="1.0" encoding="utf-8"?>
+<file path=ppt/slides/slide6.xml><?xml version="1.0" encoding="utf-8"?>
 <p:sld xmlns:a="http://schemas.openxmlformats.org/drawingml/2006/main" xmlns:r="http://schemas.openxmlformats.org/officeDocument/2006/relationships" xmlns:p="http://schemas.openxmlformats.org/presentationml/2006/main">
   <p:cSld>
     <p:spTree>
@@ -16378,7 +15991,7 @@
 </p:sld>
 </file>
 
-<file path=ppt/slides/slide8.xml><?xml version="1.0" encoding="utf-8"?>
+<file path=ppt/slides/slide7.xml><?xml version="1.0" encoding="utf-8"?>
 <p:sld xmlns:a="http://schemas.openxmlformats.org/drawingml/2006/main" xmlns:r="http://schemas.openxmlformats.org/officeDocument/2006/relationships" xmlns:p="http://schemas.openxmlformats.org/presentationml/2006/main">
   <p:cSld>
     <p:spTree>
@@ -16437,14 +16050,14 @@
             <p:ph sz="half" idx="2"/>
             <p:extLst>
               <p:ext uri="{D42A27DB-BD31-4B8C-83A1-F6EECF244321}">
-                <p14:modId xmlns:p14="http://schemas.microsoft.com/office/powerpoint/2010/main" val="2796358312"/>
+                <p14:modId xmlns:p14="http://schemas.microsoft.com/office/powerpoint/2010/main" val="2449563575"/>
               </p:ext>
             </p:extLst>
           </p:nvPr>
         </p:nvGraphicFramePr>
         <p:xfrm>
           <a:off x="767408" y="1628800"/>
-          <a:ext cx="10963465" cy="3491548"/>
+          <a:ext cx="11296841" cy="3278188"/>
         </p:xfrm>
         <a:graphic>
           <a:graphicData uri="http://schemas.openxmlformats.org/drawingml/2006/table">
@@ -16453,7 +16066,7 @@
                 <a:tableStyleId>{5C22544A-7EE6-4342-B048-85BDC9FD1C3A}</a:tableStyleId>
               </a:tblPr>
               <a:tblGrid>
-                <a:gridCol w="1981517">
+                <a:gridCol w="2314893">
                   <a:extLst>
                     <a:ext uri="{9D8B030D-6E8A-4147-A177-3AD203B41FA5}">
                       <a16:colId xmlns:a16="http://schemas.microsoft.com/office/drawing/2014/main" val="20000"/>
@@ -16586,7 +16199,21 @@
                       <a:pPr algn="ctr"/>
                       <a:r>
                         <a:rPr lang="es-CO" sz="1400" dirty="0"/>
-                        <a:t>Azure Data Factory.</a:t>
+                        <a:t>🔄 Azure Data Factory.</a:t>
+                      </a:r>
+                    </a:p>
+                    <a:p>
+                      <a:pPr algn="ctr"/>
+                      <a:r>
+                        <a:rPr lang="es-CO" sz="1400" dirty="0"/>
+                        <a:t>🔄 Azure Databricks.</a:t>
+                      </a:r>
+                    </a:p>
+                    <a:p>
+                      <a:pPr algn="ctr"/>
+                      <a:r>
+                        <a:rPr lang="es-CO" sz="1400" dirty="0"/>
+                        <a:t>🔄 Azure Synapse Analitics.</a:t>
                       </a:r>
                     </a:p>
                   </a:txBody>
@@ -16646,6 +16273,13 @@
                         <a:t>Azure Data Factory Studio.</a:t>
                       </a:r>
                     </a:p>
+                    <a:p>
+                      <a:pPr algn="ctr"/>
+                      <a:r>
+                        <a:rPr lang="es-CO" sz="1400" dirty="0"/>
+                        <a:t>🔄 Cuotas.</a:t>
+                      </a:r>
+                    </a:p>
                   </a:txBody>
                   <a:tcPr anchor="ctr"/>
                 </a:tc>
@@ -16664,7 +16298,7 @@
                       <a:pPr algn="ctr"/>
                       <a:r>
                         <a:rPr lang="es-CO" sz="1400" dirty="0"/>
-                        <a:t>🔄 Security.</a:t>
+                        <a:t>Security.</a:t>
                       </a:r>
                     </a:p>
                   </a:txBody>
@@ -16743,7 +16377,7 @@
                       <a:pPr algn="ctr"/>
                       <a:r>
                         <a:rPr lang="es-CO" sz="1400" dirty="0"/>
-                        <a:t>🔄 Storage.</a:t>
+                        <a:t>Storage.</a:t>
                       </a:r>
                     </a:p>
                   </a:txBody>
@@ -16792,7 +16426,7 @@
                       <a:pPr algn="ctr"/>
                       <a:r>
                         <a:rPr lang="es-CO" sz="1400" dirty="0"/>
-                        <a:t>Sharepoint.</a:t>
+                        <a:t>🔄 Sharepoint.</a:t>
                       </a:r>
                     </a:p>
                     <a:p>
@@ -16884,7 +16518,7 @@
                       <a:pPr algn="ctr"/>
                       <a:r>
                         <a:rPr lang="es-CO" sz="1400" dirty="0"/>
-                        <a:t>🔄 DevOps.</a:t>
+                        <a:t>DevOps.</a:t>
                       </a:r>
                     </a:p>
                   </a:txBody>
@@ -16907,18 +16541,6 @@
                         <a:rPr lang="es-MX" sz="1400" dirty="0"/>
                         <a:t>Automatizar (CI/CD).</a:t>
                       </a:r>
-                    </a:p>
-                    <a:p>
-                      <a:pPr algn="ctr"/>
-                      <a:r>
-                        <a:rPr lang="es-CO" sz="1400" dirty="0"/>
-                        <a:t>Logic Apps</a:t>
-                      </a:r>
-                      <a:r>
-                        <a:rPr lang="es-ES" sz="1400" noProof="0" dirty="0"/>
-                        <a:t>.</a:t>
-                      </a:r>
-                      <a:endParaRPr lang="es-CO" sz="1400" dirty="0"/>
                     </a:p>
                   </a:txBody>
                   <a:tcPr anchor="ctr"/>
@@ -17073,7 +16695,7 @@
 </p:sld>
 </file>
 
-<file path=ppt/slides/slide9.xml><?xml version="1.0" encoding="utf-8"?>
+<file path=ppt/slides/slide8.xml><?xml version="1.0" encoding="utf-8"?>
 <p:sld xmlns:a="http://schemas.openxmlformats.org/drawingml/2006/main" xmlns:r="http://schemas.openxmlformats.org/officeDocument/2006/relationships" xmlns:p="http://schemas.openxmlformats.org/presentationml/2006/main">
   <p:cSld>
     <p:spTree>
@@ -17132,14 +16754,14 @@
             <p:ph sz="half" idx="2"/>
             <p:extLst>
               <p:ext uri="{D42A27DB-BD31-4B8C-83A1-F6EECF244321}">
-                <p14:modId xmlns:p14="http://schemas.microsoft.com/office/powerpoint/2010/main" val="1497821066"/>
+                <p14:modId xmlns:p14="http://schemas.microsoft.com/office/powerpoint/2010/main" val="2815967249"/>
               </p:ext>
             </p:extLst>
           </p:nvPr>
         </p:nvGraphicFramePr>
         <p:xfrm>
-          <a:off x="1225724" y="2204864"/>
-          <a:ext cx="10033001" cy="1510348"/>
+          <a:off x="2459613" y="2414746"/>
+          <a:ext cx="7920843" cy="1014254"/>
         </p:xfrm>
         <a:graphic>
           <a:graphicData uri="http://schemas.openxmlformats.org/drawingml/2006/table">
@@ -17148,21 +16770,21 @@
                 <a:tableStyleId>{5C22544A-7EE6-4342-B048-85BDC9FD1C3A}</a:tableStyleId>
               </a:tblPr>
               <a:tblGrid>
-                <a:gridCol w="2587943">
+                <a:gridCol w="2652762">
                   <a:extLst>
                     <a:ext uri="{9D8B030D-6E8A-4147-A177-3AD203B41FA5}">
                       <a16:colId xmlns:a16="http://schemas.microsoft.com/office/drawing/2014/main" val="20000"/>
                     </a:ext>
                   </a:extLst>
                 </a:gridCol>
-                <a:gridCol w="3320415">
+                <a:gridCol w="1040130">
                   <a:extLst>
                     <a:ext uri="{9D8B030D-6E8A-4147-A177-3AD203B41FA5}">
                       <a16:colId xmlns:a16="http://schemas.microsoft.com/office/drawing/2014/main" val="20001"/>
                     </a:ext>
                   </a:extLst>
                 </a:gridCol>
-                <a:gridCol w="4124643">
+                <a:gridCol w="4227951">
                   <a:extLst>
                     <a:ext uri="{9D8B030D-6E8A-4147-A177-3AD203B41FA5}">
                       <a16:colId xmlns:a16="http://schemas.microsoft.com/office/drawing/2014/main" val="20002"/>
@@ -17244,57 +16866,6 @@
                 <a:extLst>
                   <a:ext uri="{0D108BD9-81ED-4DB2-BD59-A6C34878D82A}">
                     <a16:rowId xmlns:a16="http://schemas.microsoft.com/office/drawing/2014/main" val="10000"/>
-                  </a:ext>
-                </a:extLst>
-              </a:tr>
-              <a:tr h="496094">
-                <a:tc>
-                  <a:txBody>
-                    <a:bodyPr/>
-                    <a:lstStyle/>
-                    <a:p>
-                      <a:pPr algn="ctr"/>
-                      <a:r>
-                        <a:rPr lang="es-CO" sz="1400" dirty="0"/>
-                        <a:t>🔄 Data Factory Copy Tool.</a:t>
-                      </a:r>
-                    </a:p>
-                  </a:txBody>
-                  <a:tcPr anchor="ctr"/>
-                </a:tc>
-                <a:tc>
-                  <a:txBody>
-                    <a:bodyPr/>
-                    <a:lstStyle/>
-                    <a:p>
-                      <a:pPr algn="ctr"/>
-                      <a:r>
-                        <a:rPr lang="es-MX" sz="1400" dirty="0"/>
-                        <a:t>Migra datos entre ADF del mismo Tenant.</a:t>
-                      </a:r>
-                      <a:endParaRPr lang="es-CO" sz="1400" dirty="0"/>
-                    </a:p>
-                  </a:txBody>
-                  <a:tcPr anchor="ctr"/>
-                </a:tc>
-                <a:tc>
-                  <a:txBody>
-                    <a:bodyPr/>
-                    <a:lstStyle/>
-                    <a:p>
-                      <a:pPr algn="ctr"/>
-                      <a:r>
-                        <a:rPr lang="es-MX" sz="1400" dirty="0"/>
-                        <a:t>Integración Azure.</a:t>
-                      </a:r>
-                      <a:endParaRPr lang="es-CO" sz="1400" dirty="0"/>
-                    </a:p>
-                  </a:txBody>
-                  <a:tcPr anchor="ctr"/>
-                </a:tc>
-                <a:extLst>
-                  <a:ext uri="{0D108BD9-81ED-4DB2-BD59-A6C34878D82A}">
-                    <a16:rowId xmlns:a16="http://schemas.microsoft.com/office/drawing/2014/main" val="10001"/>
                   </a:ext>
                 </a:extLst>
               </a:tr>
@@ -17470,6 +17041,126 @@
   <p:clrMapOvr>
     <a:masterClrMapping/>
   </p:clrMapOvr>
+</p:sld>
+</file>
+
+<file path=ppt/slides/slide9.xml><?xml version="1.0" encoding="utf-8"?>
+<p:sld xmlns:a="http://schemas.openxmlformats.org/drawingml/2006/main" xmlns:r="http://schemas.openxmlformats.org/officeDocument/2006/relationships" xmlns:p="http://schemas.openxmlformats.org/presentationml/2006/main">
+  <p:cSld>
+    <p:spTree>
+      <p:nvGrpSpPr>
+        <p:cNvPr id="1" name=""/>
+        <p:cNvGrpSpPr/>
+        <p:nvPr/>
+      </p:nvGrpSpPr>
+      <p:grpSpPr>
+        <a:xfrm>
+          <a:off x="0" y="0"/>
+          <a:ext cx="0" cy="0"/>
+          <a:chOff x="0" y="0"/>
+          <a:chExt cx="0" cy="0"/>
+        </a:xfrm>
+      </p:grpSpPr>
+      <p:sp>
+        <p:nvSpPr>
+          <p:cNvPr id="2" name="Título 1"/>
+          <p:cNvSpPr>
+            <a:spLocks noGrp="1"/>
+          </p:cNvSpPr>
+          <p:nvPr>
+            <p:ph type="ctrTitle"/>
+          </p:nvPr>
+        </p:nvSpPr>
+        <p:spPr>
+          <a:xfrm>
+            <a:off x="4511824" y="3789040"/>
+            <a:ext cx="3456384" cy="576064"/>
+          </a:xfrm>
+        </p:spPr>
+        <p:txBody>
+          <a:bodyPr rtlCol="0">
+            <a:noAutofit/>
+          </a:bodyPr>
+          <a:lstStyle/>
+          <a:p>
+            <a:pPr algn="ctr" rtl="0"/>
+            <a:r>
+              <a:rPr lang="es-MX" sz="3600" dirty="0"/>
+              <a:t>¡¡¡Gracias!!!</a:t>
+            </a:r>
+            <a:endParaRPr lang="es-ES" sz="3600" dirty="0"/>
+          </a:p>
+        </p:txBody>
+      </p:sp>
+      <p:pic>
+        <p:nvPicPr>
+          <p:cNvPr id="1026" name="Picture 2">
+            <a:extLst>
+              <a:ext uri="{FF2B5EF4-FFF2-40B4-BE49-F238E27FC236}">
+                <a16:creationId xmlns:a16="http://schemas.microsoft.com/office/drawing/2014/main" id="{A3FBFA89-3E25-4875-997A-79EBB0930C0C}"/>
+              </a:ext>
+            </a:extLst>
+          </p:cNvPr>
+          <p:cNvPicPr>
+            <a:picLocks noChangeAspect="1" noChangeArrowheads="1"/>
+          </p:cNvPicPr>
+          <p:nvPr/>
+        </p:nvPicPr>
+        <p:blipFill>
+          <a:blip r:embed="rId2">
+            <a:extLst>
+              <a:ext uri="{28A0092B-C50C-407E-A947-70E740481C1C}">
+                <a14:useLocalDpi xmlns:a14="http://schemas.microsoft.com/office/drawing/2010/main" val="0"/>
+              </a:ext>
+            </a:extLst>
+          </a:blip>
+          <a:srcRect/>
+          <a:stretch>
+            <a:fillRect/>
+          </a:stretch>
+        </p:blipFill>
+        <p:spPr bwMode="auto">
+          <a:xfrm>
+            <a:off x="9696400" y="5081946"/>
+            <a:ext cx="2319868" cy="456241"/>
+          </a:xfrm>
+          <a:prstGeom prst="rect">
+            <a:avLst/>
+          </a:prstGeom>
+          <a:noFill/>
+          <a:extLst>
+            <a:ext uri="{909E8E84-426E-40DD-AFC4-6F175D3DCCD1}">
+              <a14:hiddenFill xmlns:a14="http://schemas.microsoft.com/office/drawing/2010/main">
+                <a:solidFill>
+                  <a:srgbClr val="FFFFFF"/>
+                </a:solidFill>
+              </a14:hiddenFill>
+            </a:ext>
+          </a:extLst>
+        </p:spPr>
+      </p:pic>
+    </p:spTree>
+    <p:extLst>
+      <p:ext uri="{BB962C8B-B14F-4D97-AF65-F5344CB8AC3E}">
+        <p14:creationId xmlns:p14="http://schemas.microsoft.com/office/powerpoint/2010/main" val="881312324"/>
+      </p:ext>
+    </p:extLst>
+  </p:cSld>
+  <p:clrMapOvr>
+    <a:masterClrMapping/>
+  </p:clrMapOvr>
+  <mc:AlternateContent xmlns:mc="http://schemas.openxmlformats.org/markup-compatibility/2006" xmlns:p14="http://schemas.microsoft.com/office/powerpoint/2010/main">
+    <mc:Choice Requires="p14">
+      <p:transition spd="med" p14:dur="700">
+        <p:fade/>
+      </p:transition>
+    </mc:Choice>
+    <mc:Fallback xmlns="">
+      <p:transition spd="med">
+        <p:fade/>
+      </p:transition>
+    </mc:Fallback>
+  </mc:AlternateContent>
 </p:sld>
 </file>
 

</xml_diff>

<commit_message>
⚡ feat(powerpoint) Change diagram
</commit_message>
<xml_diff>
--- a/Diagrams/guides/Propuesta migracion - Perceptio.pptx
+++ b/Diagrams/guides/Propuesta migracion - Perceptio.pptx
@@ -175,7 +175,10 @@
             <a:pPr>
               <a:defRPr sz="1400" b="0" i="0" u="none" strike="noStrike" kern="1200" spc="0" baseline="0">
                 <a:solidFill>
-                  <a:srgbClr val="FF0000"/>
+                  <a:schemeClr val="tx1">
+                    <a:lumMod val="65000"/>
+                    <a:lumOff val="35000"/>
+                  </a:schemeClr>
                 </a:solidFill>
                 <a:latin typeface="+mn-lt"/>
                 <a:ea typeface="+mn-ea"/>
@@ -183,22 +186,30 @@
               </a:defRPr>
             </a:pPr>
             <a:r>
-              <a:rPr lang="es-CO" b="1">
+              <a:rPr lang="es-CO" b="1" dirty="0" err="1">
                 <a:solidFill>
                   <a:srgbClr val="FF0000"/>
                 </a:solidFill>
               </a:rPr>
-              <a:t>Deadline de</a:t>
+              <a:t>Deadline</a:t>
             </a:r>
             <a:r>
-              <a:rPr lang="es-CO" b="1" baseline="0">
+              <a:rPr lang="es-CO" b="1" dirty="0">
                 <a:solidFill>
                   <a:srgbClr val="FF0000"/>
                 </a:solidFill>
               </a:rPr>
-              <a:t> migracion.</a:t>
+              <a:t> de</a:t>
             </a:r>
-            <a:endParaRPr lang="es-CO" b="1">
+            <a:r>
+              <a:rPr lang="es-CO" b="1" baseline="0" dirty="0">
+                <a:solidFill>
+                  <a:srgbClr val="FF0000"/>
+                </a:solidFill>
+              </a:rPr>
+              <a:t> migración.</a:t>
+            </a:r>
+            <a:endParaRPr lang="es-CO" b="1" dirty="0">
               <a:solidFill>
                 <a:srgbClr val="FF0000"/>
               </a:solidFill>
@@ -210,8 +221,8 @@
         <c:manualLayout>
           <c:xMode val="edge"/>
           <c:yMode val="edge"/>
-          <c:x val="0.4446214700714004"/>
-          <c:y val="3.0033966195014458E-2"/>
+          <c:x val="0.4472062915163405"/>
+          <c:y val="1.5860299720599443E-2"/>
         </c:manualLayout>
       </c:layout>
       <c:overlay val="0"/>
@@ -229,7 +240,10 @@
           <a:pPr>
             <a:defRPr sz="1400" b="0" i="0" u="none" strike="noStrike" kern="1200" spc="0" baseline="0">
               <a:solidFill>
-                <a:srgbClr val="FF0000"/>
+                <a:schemeClr val="tx1">
+                  <a:lumMod val="65000"/>
+                  <a:lumOff val="35000"/>
+                </a:schemeClr>
               </a:solidFill>
               <a:latin typeface="+mn-lt"/>
               <a:ea typeface="+mn-ea"/>
@@ -248,9 +262,9 @@
           <c:xMode val="edge"/>
           <c:yMode val="edge"/>
           <c:x val="0.23901110139010401"/>
-          <c:y val="0.24251194587391914"/>
+          <c:y val="0.1819698352923276"/>
           <c:w val="0.73926050354816764"/>
-          <c:h val="0.69130332135024841"/>
+          <c:h val="0.75184525847312567"/>
         </c:manualLayout>
       </c:layout>
       <c:barChart>
@@ -283,9 +297,9 @@
           <c:invertIfNegative val="0"/>
           <c:cat>
             <c:strRef>
-              <c:f>Gantt!$B$10:$B$36</c:f>
+              <c:f>Gantt!$B$10:$B$37</c:f>
               <c:strCache>
-                <c:ptCount val="27"/>
+                <c:ptCount val="28"/>
                 <c:pt idx="0">
                   <c:v>Análisis de Impacto.</c:v>
                 </c:pt>
@@ -350,21 +364,24 @@
                   <c:v>Ejecutar Pipelines.</c:v>
                 </c:pt>
                 <c:pt idx="21">
+                  <c:v>Ejecutar tests.</c:v>
+                </c:pt>
+                <c:pt idx="22">
                   <c:v>Exportar Logic Apps.</c:v>
                 </c:pt>
-                <c:pt idx="22">
+                <c:pt idx="23">
                   <c:v>importar Logic Apps.</c:v>
                 </c:pt>
-                <c:pt idx="23">
+                <c:pt idx="24">
                   <c:v>Configurar Insights Logic Apps.</c:v>
                 </c:pt>
-                <c:pt idx="24">
+                <c:pt idx="25">
                   <c:v>Validación.</c:v>
                 </c:pt>
-                <c:pt idx="25">
+                <c:pt idx="26">
                   <c:v>Optimización.</c:v>
                 </c:pt>
-                <c:pt idx="26">
+                <c:pt idx="27">
                   <c:v>Evaluacion.</c:v>
                 </c:pt>
               </c:strCache>
@@ -372,10 +389,10 @@
           </c:cat>
           <c:val>
             <c:numRef>
-              <c:f>Gantt!$C$10:$C$36</c:f>
+              <c:f>Gantt!$C$10:$C$37</c:f>
               <c:numCache>
                 <c:formatCode>m/d/yyyy</c:formatCode>
-                <c:ptCount val="27"/>
+                <c:ptCount val="28"/>
                 <c:pt idx="0">
                   <c:v>45551</c:v>
                 </c:pt>
@@ -443,26 +460,29 @@
                   <c:v>45635</c:v>
                 </c:pt>
                 <c:pt idx="22">
-                  <c:v>45642</c:v>
+                  <c:v>45636</c:v>
                 </c:pt>
                 <c:pt idx="23">
-                  <c:v>45644</c:v>
+                  <c:v>45649</c:v>
                 </c:pt>
                 <c:pt idx="24">
-                  <c:v>45645</c:v>
+                  <c:v>45651</c:v>
                 </c:pt>
                 <c:pt idx="25">
-                  <c:v>45649</c:v>
+                  <c:v>45652</c:v>
                 </c:pt>
                 <c:pt idx="26">
-                  <c:v>45650</c:v>
+                  <c:v>45656</c:v>
+                </c:pt>
+                <c:pt idx="27">
+                  <c:v>45657</c:v>
                 </c:pt>
               </c:numCache>
             </c:numRef>
           </c:val>
           <c:extLst>
             <c:ext xmlns:c16="http://schemas.microsoft.com/office/drawing/2014/chart" uri="{C3380CC4-5D6E-409C-BE32-E72D297353CC}">
-              <c16:uniqueId val="{00000000-82C4-48C1-9871-DFEB3A918CD9}"/>
+              <c16:uniqueId val="{00000000-2C30-4AE1-B16A-EB10DE4FCD81}"/>
             </c:ext>
           </c:extLst>
         </c:ser>
@@ -505,7 +525,7 @@
               <a:lstStyle/>
               <a:p>
                 <a:pPr>
-                  <a:defRPr sz="700" b="1" i="0" u="none" strike="noStrike" kern="1200" baseline="0">
+                  <a:defRPr sz="600" b="1" i="0" u="none" strike="noStrike" kern="1200" baseline="0">
                     <a:solidFill>
                       <a:schemeClr val="bg1"/>
                     </a:solidFill>
@@ -547,9 +567,9 @@
           </c:dLbls>
           <c:cat>
             <c:strRef>
-              <c:f>Gantt!$B$10:$B$36</c:f>
+              <c:f>Gantt!$B$10:$B$37</c:f>
               <c:strCache>
-                <c:ptCount val="27"/>
+                <c:ptCount val="28"/>
                 <c:pt idx="0">
                   <c:v>Análisis de Impacto.</c:v>
                 </c:pt>
@@ -614,21 +634,24 @@
                   <c:v>Ejecutar Pipelines.</c:v>
                 </c:pt>
                 <c:pt idx="21">
+                  <c:v>Ejecutar tests.</c:v>
+                </c:pt>
+                <c:pt idx="22">
                   <c:v>Exportar Logic Apps.</c:v>
                 </c:pt>
-                <c:pt idx="22">
+                <c:pt idx="23">
                   <c:v>importar Logic Apps.</c:v>
                 </c:pt>
-                <c:pt idx="23">
+                <c:pt idx="24">
                   <c:v>Configurar Insights Logic Apps.</c:v>
                 </c:pt>
-                <c:pt idx="24">
+                <c:pt idx="25">
                   <c:v>Validación.</c:v>
                 </c:pt>
-                <c:pt idx="25">
+                <c:pt idx="26">
                   <c:v>Optimización.</c:v>
                 </c:pt>
-                <c:pt idx="26">
+                <c:pt idx="27">
                   <c:v>Evaluacion.</c:v>
                 </c:pt>
               </c:strCache>
@@ -636,10 +659,10 @@
           </c:cat>
           <c:val>
             <c:numRef>
-              <c:f>Gantt!$D$10:$D$36</c:f>
+              <c:f>Gantt!$D$10:$D$37</c:f>
               <c:numCache>
                 <c:formatCode>General</c:formatCode>
-                <c:ptCount val="27"/>
+                <c:ptCount val="28"/>
                 <c:pt idx="0">
                   <c:v>7</c:v>
                 </c:pt>
@@ -704,21 +727,24 @@
                   <c:v>5</c:v>
                 </c:pt>
                 <c:pt idx="21">
-                  <c:v>7</c:v>
+                  <c:v>1</c:v>
                 </c:pt>
                 <c:pt idx="22">
+                  <c:v>13</c:v>
+                </c:pt>
+                <c:pt idx="23">
                   <c:v>2</c:v>
                 </c:pt>
-                <c:pt idx="23">
+                <c:pt idx="24">
                   <c:v>1</c:v>
                 </c:pt>
-                <c:pt idx="24">
+                <c:pt idx="25">
                   <c:v>4</c:v>
                 </c:pt>
-                <c:pt idx="25">
+                <c:pt idx="26">
                   <c:v>1</c:v>
                 </c:pt>
-                <c:pt idx="26">
+                <c:pt idx="27">
                   <c:v>6</c:v>
                 </c:pt>
               </c:numCache>
@@ -726,7 +752,7 @@
           </c:val>
           <c:extLst>
             <c:ext xmlns:c16="http://schemas.microsoft.com/office/drawing/2014/chart" uri="{C3380CC4-5D6E-409C-BE32-E72D297353CC}">
-              <c16:uniqueId val="{00000001-82C4-48C1-9871-DFEB3A918CD9}"/>
+              <c16:uniqueId val="{00000001-2C30-4AE1-B16A-EB10DE4FCD81}"/>
             </c:ext>
           </c:extLst>
         </c:ser>
@@ -772,9 +798,9 @@
           <a:lstStyle/>
           <a:p>
             <a:pPr>
-              <a:defRPr sz="900" b="1" i="0" u="none" strike="noStrike" kern="1200" baseline="0">
+              <a:defRPr sz="800" b="1" i="0" u="none" strike="noStrike" kern="1200" baseline="0">
                 <a:solidFill>
-                  <a:srgbClr val="FFFF00"/>
+                  <a:srgbClr val="FFC000"/>
                 </a:solidFill>
                 <a:latin typeface="+mn-lt"/>
                 <a:ea typeface="+mn-ea"/>
@@ -795,7 +821,7 @@
         <c:axId val="1184412656"/>
         <c:scaling>
           <c:orientation val="minMax"/>
-          <c:max val="45657"/>
+          <c:max val="45663"/>
           <c:min val="45551"/>
         </c:scaling>
         <c:delete val="0"/>
@@ -832,7 +858,10 @@
             <a:pPr>
               <a:defRPr sz="900" b="1" i="0" u="none" strike="noStrike" kern="1200" baseline="0">
                 <a:solidFill>
-                  <a:srgbClr val="FFFF00"/>
+                  <a:schemeClr val="tx1">
+                    <a:lumMod val="65000"/>
+                    <a:lumOff val="35000"/>
+                  </a:schemeClr>
                 </a:solidFill>
                 <a:latin typeface="+mn-lt"/>
                 <a:ea typeface="+mn-ea"/>
@@ -15134,11 +15163,11 @@
       </p:sp>
       <p:pic>
         <p:nvPicPr>
-          <p:cNvPr id="18" name="Imagen 17">
+          <p:cNvPr id="4" name="Imagen 3">
             <a:hlinkClick r:id="rId4" action="ppaction://hlinksldjump" tooltip="Azure Integration Runtime: Gestiona el escalado automatico a demanda de la orquestación de Data Factory."/>
             <a:extLst>
               <a:ext uri="{FF2B5EF4-FFF2-40B4-BE49-F238E27FC236}">
-                <a16:creationId xmlns:a16="http://schemas.microsoft.com/office/drawing/2014/main" id="{20FB7F7B-9071-4199-A428-F315FD828D89}"/>
+                <a16:creationId xmlns:a16="http://schemas.microsoft.com/office/drawing/2014/main" id="{1BAA6753-1DB0-4355-AA8D-C4885BCF821F}"/>
               </a:ext>
             </a:extLst>
           </p:cNvPr>
@@ -15155,7 +15184,7 @@
         </p:blipFill>
         <p:spPr>
           <a:xfrm>
-            <a:off x="2567607" y="880120"/>
+            <a:off x="2567606" y="880120"/>
             <a:ext cx="6984777" cy="4277072"/>
           </a:xfrm>
           <a:prstGeom prst="rect">
@@ -15177,7 +15206,7 @@
         </p:nvSpPr>
         <p:spPr>
           <a:xfrm>
-            <a:off x="2639616" y="1700808"/>
+            <a:off x="2927648" y="1700808"/>
             <a:ext cx="288032" cy="276999"/>
           </a:xfrm>
           <a:prstGeom prst="rect">
@@ -15350,7 +15379,7 @@
       </p:sp>
       <p:graphicFrame>
         <p:nvGraphicFramePr>
-          <p:cNvPr id="5" name="Gráfico 4">
+          <p:cNvPr id="7" name="Gráfico 6">
             <a:extLst>
               <a:ext uri="{FF2B5EF4-FFF2-40B4-BE49-F238E27FC236}">
                 <a16:creationId xmlns:a16="http://schemas.microsoft.com/office/drawing/2014/main" id="{DFDD1AF0-CE04-4303-B96A-E331F9FE0308}"/>
@@ -15363,14 +15392,14 @@
           <p:nvPr>
             <p:extLst>
               <p:ext uri="{D42A27DB-BD31-4B8C-83A1-F6EECF244321}">
-                <p14:modId xmlns:p14="http://schemas.microsoft.com/office/powerpoint/2010/main" val="2510325260"/>
+                <p14:modId xmlns:p14="http://schemas.microsoft.com/office/powerpoint/2010/main" val="3149116535"/>
               </p:ext>
             </p:extLst>
           </p:nvPr>
         </p:nvGraphicFramePr>
         <p:xfrm>
-          <a:off x="1271464" y="1438274"/>
-          <a:ext cx="10225136" cy="4366989"/>
+          <a:off x="1271464" y="980728"/>
+          <a:ext cx="10225136" cy="4824536"/>
         </p:xfrm>
         <a:graphic>
           <a:graphicData uri="http://schemas.openxmlformats.org/drawingml/2006/chart">
@@ -16050,7 +16079,7 @@
             <p:ph sz="half" idx="2"/>
             <p:extLst>
               <p:ext uri="{D42A27DB-BD31-4B8C-83A1-F6EECF244321}">
-                <p14:modId xmlns:p14="http://schemas.microsoft.com/office/powerpoint/2010/main" val="2449563575"/>
+                <p14:modId xmlns:p14="http://schemas.microsoft.com/office/powerpoint/2010/main" val="1996294774"/>
               </p:ext>
             </p:extLst>
           </p:nvPr>
@@ -16278,6 +16307,13 @@
                       <a:r>
                         <a:rPr lang="es-CO" sz="1400" dirty="0"/>
                         <a:t>🔄 Cuotas.</a:t>
+                      </a:r>
+                      <a:br>
+                        <a:rPr lang="es-CO" sz="1400" dirty="0"/>
+                      </a:br>
+                      <a:r>
+                        <a:rPr lang="es-CO" sz="1400" dirty="0"/>
+                        <a:t>Synapse Studio.</a:t>
                       </a:r>
                     </a:p>
                   </a:txBody>
@@ -17957,6 +17993,132 @@
 </file>
 
 <file path=customXml/item2.xml><?xml version="1.0" encoding="utf-8"?>
+<p:properties xmlns:p="http://schemas.microsoft.com/office/2006/metadata/properties" xmlns:xsi="http://www.w3.org/2001/XMLSchema-instance" xmlns:pc="http://schemas.microsoft.com/office/infopath/2007/PartnerControls">
+  <documentManagement>
+    <DirectSourceMarket xmlns="4873beb7-5857-4685-be1f-d57550cc96cc" xsi:nil="true"/>
+    <ApprovalStatus xmlns="4873beb7-5857-4685-be1f-d57550cc96cc">InProgress</ApprovalStatus>
+    <MarketSpecific xmlns="4873beb7-5857-4685-be1f-d57550cc96cc">false</MarketSpecific>
+    <LocComments xmlns="4873beb7-5857-4685-be1f-d57550cc96cc" xsi:nil="true"/>
+    <ThumbnailAssetId xmlns="4873beb7-5857-4685-be1f-d57550cc96cc" xsi:nil="true"/>
+    <PrimaryImageGen xmlns="4873beb7-5857-4685-be1f-d57550cc96cc">true</PrimaryImageGen>
+    <LegacyData xmlns="4873beb7-5857-4685-be1f-d57550cc96cc" xsi:nil="true"/>
+    <LocRecommendedHandoff xmlns="4873beb7-5857-4685-be1f-d57550cc96cc" xsi:nil="true"/>
+    <BusinessGroup xmlns="4873beb7-5857-4685-be1f-d57550cc96cc" xsi:nil="true"/>
+    <BlockPublish xmlns="4873beb7-5857-4685-be1f-d57550cc96cc">false</BlockPublish>
+    <TPFriendlyName xmlns="4873beb7-5857-4685-be1f-d57550cc96cc" xsi:nil="true"/>
+    <NumericId xmlns="4873beb7-5857-4685-be1f-d57550cc96cc" xsi:nil="true"/>
+    <APEditor xmlns="4873beb7-5857-4685-be1f-d57550cc96cc">
+      <UserInfo>
+        <DisplayName/>
+        <AccountId xsi:nil="true"/>
+        <AccountType/>
+      </UserInfo>
+    </APEditor>
+    <SourceTitle xmlns="4873beb7-5857-4685-be1f-d57550cc96cc" xsi:nil="true"/>
+    <OpenTemplate xmlns="4873beb7-5857-4685-be1f-d57550cc96cc">true</OpenTemplate>
+    <UALocComments xmlns="4873beb7-5857-4685-be1f-d57550cc96cc" xsi:nil="true"/>
+    <ParentAssetId xmlns="4873beb7-5857-4685-be1f-d57550cc96cc" xsi:nil="true"/>
+    <IntlLangReviewDate xmlns="4873beb7-5857-4685-be1f-d57550cc96cc" xsi:nil="true"/>
+    <FeatureTagsTaxHTField0 xmlns="4873beb7-5857-4685-be1f-d57550cc96cc">
+      <Terms xmlns="http://schemas.microsoft.com/office/infopath/2007/PartnerControls"/>
+    </FeatureTagsTaxHTField0>
+    <PublishStatusLookup xmlns="4873beb7-5857-4685-be1f-d57550cc96cc">
+      <Value>1566889</Value>
+    </PublishStatusLookup>
+    <Providers xmlns="4873beb7-5857-4685-be1f-d57550cc96cc" xsi:nil="true"/>
+    <MachineTranslated xmlns="4873beb7-5857-4685-be1f-d57550cc96cc">false</MachineTranslated>
+    <OriginalSourceMarket xmlns="4873beb7-5857-4685-be1f-d57550cc96cc" xsi:nil="true"/>
+    <APDescription xmlns="4873beb7-5857-4685-be1f-d57550cc96cc" xsi:nil="true"/>
+    <ClipArtFilename xmlns="4873beb7-5857-4685-be1f-d57550cc96cc" xsi:nil="true"/>
+    <ContentItem xmlns="4873beb7-5857-4685-be1f-d57550cc96cc" xsi:nil="true"/>
+    <TPInstallLocation xmlns="4873beb7-5857-4685-be1f-d57550cc96cc" xsi:nil="true"/>
+    <PublishTargets xmlns="4873beb7-5857-4685-be1f-d57550cc96cc">OfficeOnlineVNext</PublishTargets>
+    <TimesCloned xmlns="4873beb7-5857-4685-be1f-d57550cc96cc" xsi:nil="true"/>
+    <AssetStart xmlns="4873beb7-5857-4685-be1f-d57550cc96cc">2012-05-23T08:44:00+00:00</AssetStart>
+    <Provider xmlns="4873beb7-5857-4685-be1f-d57550cc96cc" xsi:nil="true"/>
+    <AcquiredFrom xmlns="4873beb7-5857-4685-be1f-d57550cc96cc">Internal MS</AcquiredFrom>
+    <FriendlyTitle xmlns="4873beb7-5857-4685-be1f-d57550cc96cc" xsi:nil="true"/>
+    <LastHandOff xmlns="4873beb7-5857-4685-be1f-d57550cc96cc" xsi:nil="true"/>
+    <TPClientViewer xmlns="4873beb7-5857-4685-be1f-d57550cc96cc" xsi:nil="true"/>
+    <UACurrentWords xmlns="4873beb7-5857-4685-be1f-d57550cc96cc" xsi:nil="true"/>
+    <ArtSampleDocs xmlns="4873beb7-5857-4685-be1f-d57550cc96cc" xsi:nil="true"/>
+    <UALocRecommendation xmlns="4873beb7-5857-4685-be1f-d57550cc96cc">Localize</UALocRecommendation>
+    <Manager xmlns="4873beb7-5857-4685-be1f-d57550cc96cc" xsi:nil="true"/>
+    <ShowIn xmlns="4873beb7-5857-4685-be1f-d57550cc96cc">Show everywhere</ShowIn>
+    <UANotes xmlns="4873beb7-5857-4685-be1f-d57550cc96cc" xsi:nil="true"/>
+    <TemplateStatus xmlns="4873beb7-5857-4685-be1f-d57550cc96cc">Complete</TemplateStatus>
+    <InternalTagsTaxHTField0 xmlns="4873beb7-5857-4685-be1f-d57550cc96cc">
+      <Terms xmlns="http://schemas.microsoft.com/office/infopath/2007/PartnerControls"/>
+    </InternalTagsTaxHTField0>
+    <CSXHash xmlns="4873beb7-5857-4685-be1f-d57550cc96cc" xsi:nil="true"/>
+    <Downloads xmlns="4873beb7-5857-4685-be1f-d57550cc96cc">0</Downloads>
+    <VoteCount xmlns="4873beb7-5857-4685-be1f-d57550cc96cc" xsi:nil="true"/>
+    <OOCacheId xmlns="4873beb7-5857-4685-be1f-d57550cc96cc" xsi:nil="true"/>
+    <IsDeleted xmlns="4873beb7-5857-4685-be1f-d57550cc96cc">false</IsDeleted>
+    <AssetExpire xmlns="4873beb7-5857-4685-be1f-d57550cc96cc">2029-01-01T08:00:00+00:00</AssetExpire>
+    <DSATActionTaken xmlns="4873beb7-5857-4685-be1f-d57550cc96cc" xsi:nil="true"/>
+    <CSXSubmissionMarket xmlns="4873beb7-5857-4685-be1f-d57550cc96cc" xsi:nil="true"/>
+    <TPExecutable xmlns="4873beb7-5857-4685-be1f-d57550cc96cc" xsi:nil="true"/>
+    <SubmitterId xmlns="4873beb7-5857-4685-be1f-d57550cc96cc" xsi:nil="true"/>
+    <EditorialTags xmlns="4873beb7-5857-4685-be1f-d57550cc96cc" xsi:nil="true"/>
+    <ApprovalLog xmlns="4873beb7-5857-4685-be1f-d57550cc96cc" xsi:nil="true"/>
+    <AssetType xmlns="4873beb7-5857-4685-be1f-d57550cc96cc">TP</AssetType>
+    <BugNumber xmlns="4873beb7-5857-4685-be1f-d57550cc96cc" xsi:nil="true"/>
+    <CSXSubmissionDate xmlns="4873beb7-5857-4685-be1f-d57550cc96cc" xsi:nil="true"/>
+    <CSXUpdate xmlns="4873beb7-5857-4685-be1f-d57550cc96cc">false</CSXUpdate>
+    <Milestone xmlns="4873beb7-5857-4685-be1f-d57550cc96cc" xsi:nil="true"/>
+    <RecommendationsModifier xmlns="4873beb7-5857-4685-be1f-d57550cc96cc" xsi:nil="true"/>
+    <OriginAsset xmlns="4873beb7-5857-4685-be1f-d57550cc96cc" xsi:nil="true"/>
+    <TPComponent xmlns="4873beb7-5857-4685-be1f-d57550cc96cc" xsi:nil="true"/>
+    <AssetId xmlns="4873beb7-5857-4685-be1f-d57550cc96cc">TP102901017</AssetId>
+    <IntlLocPriority xmlns="4873beb7-5857-4685-be1f-d57550cc96cc" xsi:nil="true"/>
+    <PolicheckWords xmlns="4873beb7-5857-4685-be1f-d57550cc96cc" xsi:nil="true"/>
+    <TPLaunchHelpLink xmlns="4873beb7-5857-4685-be1f-d57550cc96cc" xsi:nil="true"/>
+    <TPApplication xmlns="4873beb7-5857-4685-be1f-d57550cc96cc" xsi:nil="true"/>
+    <CrawlForDependencies xmlns="4873beb7-5857-4685-be1f-d57550cc96cc">false</CrawlForDependencies>
+    <HandoffToMSDN xmlns="4873beb7-5857-4685-be1f-d57550cc96cc" xsi:nil="true"/>
+    <PlannedPubDate xmlns="4873beb7-5857-4685-be1f-d57550cc96cc" xsi:nil="true"/>
+    <IntlLangReviewer xmlns="4873beb7-5857-4685-be1f-d57550cc96cc" xsi:nil="true"/>
+    <TrustLevel xmlns="4873beb7-5857-4685-be1f-d57550cc96cc">1 Microsoft Managed Content</TrustLevel>
+    <LocLastLocAttemptVersionLookup xmlns="4873beb7-5857-4685-be1f-d57550cc96cc">836753</LocLastLocAttemptVersionLookup>
+    <IsSearchable xmlns="4873beb7-5857-4685-be1f-d57550cc96cc">true</IsSearchable>
+    <TemplateTemplateType xmlns="4873beb7-5857-4685-be1f-d57550cc96cc">PowerPoint Design Template</TemplateTemplateType>
+    <CampaignTagsTaxHTField0 xmlns="4873beb7-5857-4685-be1f-d57550cc96cc">
+      <Terms xmlns="http://schemas.microsoft.com/office/infopath/2007/PartnerControls"/>
+    </CampaignTagsTaxHTField0>
+    <TPNamespace xmlns="4873beb7-5857-4685-be1f-d57550cc96cc" xsi:nil="true"/>
+    <TaxCatchAll xmlns="4873beb7-5857-4685-be1f-d57550cc96cc"/>
+    <Markets xmlns="4873beb7-5857-4685-be1f-d57550cc96cc"/>
+    <UAProjectedTotalWords xmlns="4873beb7-5857-4685-be1f-d57550cc96cc" xsi:nil="true"/>
+    <IntlLangReview xmlns="4873beb7-5857-4685-be1f-d57550cc96cc">false</IntlLangReview>
+    <OutputCachingOn xmlns="4873beb7-5857-4685-be1f-d57550cc96cc">false</OutputCachingOn>
+    <AverageRating xmlns="4873beb7-5857-4685-be1f-d57550cc96cc" xsi:nil="true"/>
+    <APAuthor xmlns="4873beb7-5857-4685-be1f-d57550cc96cc">
+      <UserInfo>
+        <DisplayName>REDMOND\v-anij</DisplayName>
+        <AccountId>2469</AccountId>
+        <AccountType/>
+      </UserInfo>
+    </APAuthor>
+    <LocManualTestRequired xmlns="4873beb7-5857-4685-be1f-d57550cc96cc">false</LocManualTestRequired>
+    <TPCommandLine xmlns="4873beb7-5857-4685-be1f-d57550cc96cc" xsi:nil="true"/>
+    <TPAppVersion xmlns="4873beb7-5857-4685-be1f-d57550cc96cc" xsi:nil="true"/>
+    <EditorialStatus xmlns="4873beb7-5857-4685-be1f-d57550cc96cc">Complete</EditorialStatus>
+    <LastModifiedDateTime xmlns="4873beb7-5857-4685-be1f-d57550cc96cc" xsi:nil="true"/>
+    <ScenarioTagsTaxHTField0 xmlns="4873beb7-5857-4685-be1f-d57550cc96cc">
+      <Terms xmlns="http://schemas.microsoft.com/office/infopath/2007/PartnerControls"/>
+    </ScenarioTagsTaxHTField0>
+    <OriginalRelease xmlns="4873beb7-5857-4685-be1f-d57550cc96cc">15</OriginalRelease>
+    <TPLaunchHelpLinkType xmlns="4873beb7-5857-4685-be1f-d57550cc96cc">Template</TPLaunchHelpLinkType>
+    <LocalizationTagsTaxHTField0 xmlns="4873beb7-5857-4685-be1f-d57550cc96cc">
+      <Terms xmlns="http://schemas.microsoft.com/office/infopath/2007/PartnerControls"/>
+    </LocalizationTagsTaxHTField0>
+    <LocMarketGroupTiers2 xmlns="4873beb7-5857-4685-be1f-d57550cc96cc" xsi:nil="true"/>
+  </documentManagement>
+</p:properties>
+</file>
+
+<file path=customXml/item3.xml><?xml version="1.0" encoding="utf-8"?>
 <ct:contentTypeSchema xmlns:ct="http://schemas.microsoft.com/office/2006/metadata/contentType" xmlns:ma="http://schemas.microsoft.com/office/2006/metadata/properties/metaAttributes" ct:_="" ma:_="" ma:contentTypeName="TemplateFile" ma:contentTypeID="0x0101006EDDDB5EE6D98C44930B742096920B300400F5B6D36B3EF94B4E9A635CDF2A18F5B8" ma:contentTypeVersion="72" ma:contentTypeDescription="Create a new document." ma:contentTypeScope="" ma:versionID="a23e56308344d904b51738559c3d67c9">
   <xsd:schema xmlns:xsd="http://www.w3.org/2001/XMLSchema" xmlns:xs="http://www.w3.org/2001/XMLSchema" xmlns:p="http://schemas.microsoft.com/office/2006/metadata/properties" xmlns:ns2="4873beb7-5857-4685-be1f-d57550cc96cc" targetNamespace="http://schemas.microsoft.com/office/2006/metadata/properties" ma:root="true" ma:fieldsID="cd0908cc4600e77bf5da051303e00c8d" ns2:_="">
     <xsd:import namespace="4873beb7-5857-4685-be1f-d57550cc96cc"/>
@@ -18996,132 +19158,6 @@
 </ct:contentTypeSchema>
 </file>
 
-<file path=customXml/item3.xml><?xml version="1.0" encoding="utf-8"?>
-<p:properties xmlns:p="http://schemas.microsoft.com/office/2006/metadata/properties" xmlns:xsi="http://www.w3.org/2001/XMLSchema-instance" xmlns:pc="http://schemas.microsoft.com/office/infopath/2007/PartnerControls">
-  <documentManagement>
-    <DirectSourceMarket xmlns="4873beb7-5857-4685-be1f-d57550cc96cc" xsi:nil="true"/>
-    <ApprovalStatus xmlns="4873beb7-5857-4685-be1f-d57550cc96cc">InProgress</ApprovalStatus>
-    <MarketSpecific xmlns="4873beb7-5857-4685-be1f-d57550cc96cc">false</MarketSpecific>
-    <LocComments xmlns="4873beb7-5857-4685-be1f-d57550cc96cc" xsi:nil="true"/>
-    <ThumbnailAssetId xmlns="4873beb7-5857-4685-be1f-d57550cc96cc" xsi:nil="true"/>
-    <PrimaryImageGen xmlns="4873beb7-5857-4685-be1f-d57550cc96cc">true</PrimaryImageGen>
-    <LegacyData xmlns="4873beb7-5857-4685-be1f-d57550cc96cc" xsi:nil="true"/>
-    <LocRecommendedHandoff xmlns="4873beb7-5857-4685-be1f-d57550cc96cc" xsi:nil="true"/>
-    <BusinessGroup xmlns="4873beb7-5857-4685-be1f-d57550cc96cc" xsi:nil="true"/>
-    <BlockPublish xmlns="4873beb7-5857-4685-be1f-d57550cc96cc">false</BlockPublish>
-    <TPFriendlyName xmlns="4873beb7-5857-4685-be1f-d57550cc96cc" xsi:nil="true"/>
-    <NumericId xmlns="4873beb7-5857-4685-be1f-d57550cc96cc" xsi:nil="true"/>
-    <APEditor xmlns="4873beb7-5857-4685-be1f-d57550cc96cc">
-      <UserInfo>
-        <DisplayName/>
-        <AccountId xsi:nil="true"/>
-        <AccountType/>
-      </UserInfo>
-    </APEditor>
-    <SourceTitle xmlns="4873beb7-5857-4685-be1f-d57550cc96cc" xsi:nil="true"/>
-    <OpenTemplate xmlns="4873beb7-5857-4685-be1f-d57550cc96cc">true</OpenTemplate>
-    <UALocComments xmlns="4873beb7-5857-4685-be1f-d57550cc96cc" xsi:nil="true"/>
-    <ParentAssetId xmlns="4873beb7-5857-4685-be1f-d57550cc96cc" xsi:nil="true"/>
-    <IntlLangReviewDate xmlns="4873beb7-5857-4685-be1f-d57550cc96cc" xsi:nil="true"/>
-    <FeatureTagsTaxHTField0 xmlns="4873beb7-5857-4685-be1f-d57550cc96cc">
-      <Terms xmlns="http://schemas.microsoft.com/office/infopath/2007/PartnerControls"/>
-    </FeatureTagsTaxHTField0>
-    <PublishStatusLookup xmlns="4873beb7-5857-4685-be1f-d57550cc96cc">
-      <Value>1566889</Value>
-    </PublishStatusLookup>
-    <Providers xmlns="4873beb7-5857-4685-be1f-d57550cc96cc" xsi:nil="true"/>
-    <MachineTranslated xmlns="4873beb7-5857-4685-be1f-d57550cc96cc">false</MachineTranslated>
-    <OriginalSourceMarket xmlns="4873beb7-5857-4685-be1f-d57550cc96cc" xsi:nil="true"/>
-    <APDescription xmlns="4873beb7-5857-4685-be1f-d57550cc96cc" xsi:nil="true"/>
-    <ClipArtFilename xmlns="4873beb7-5857-4685-be1f-d57550cc96cc" xsi:nil="true"/>
-    <ContentItem xmlns="4873beb7-5857-4685-be1f-d57550cc96cc" xsi:nil="true"/>
-    <TPInstallLocation xmlns="4873beb7-5857-4685-be1f-d57550cc96cc" xsi:nil="true"/>
-    <PublishTargets xmlns="4873beb7-5857-4685-be1f-d57550cc96cc">OfficeOnlineVNext</PublishTargets>
-    <TimesCloned xmlns="4873beb7-5857-4685-be1f-d57550cc96cc" xsi:nil="true"/>
-    <AssetStart xmlns="4873beb7-5857-4685-be1f-d57550cc96cc">2012-05-23T08:44:00+00:00</AssetStart>
-    <Provider xmlns="4873beb7-5857-4685-be1f-d57550cc96cc" xsi:nil="true"/>
-    <AcquiredFrom xmlns="4873beb7-5857-4685-be1f-d57550cc96cc">Internal MS</AcquiredFrom>
-    <FriendlyTitle xmlns="4873beb7-5857-4685-be1f-d57550cc96cc" xsi:nil="true"/>
-    <LastHandOff xmlns="4873beb7-5857-4685-be1f-d57550cc96cc" xsi:nil="true"/>
-    <TPClientViewer xmlns="4873beb7-5857-4685-be1f-d57550cc96cc" xsi:nil="true"/>
-    <UACurrentWords xmlns="4873beb7-5857-4685-be1f-d57550cc96cc" xsi:nil="true"/>
-    <ArtSampleDocs xmlns="4873beb7-5857-4685-be1f-d57550cc96cc" xsi:nil="true"/>
-    <UALocRecommendation xmlns="4873beb7-5857-4685-be1f-d57550cc96cc">Localize</UALocRecommendation>
-    <Manager xmlns="4873beb7-5857-4685-be1f-d57550cc96cc" xsi:nil="true"/>
-    <ShowIn xmlns="4873beb7-5857-4685-be1f-d57550cc96cc">Show everywhere</ShowIn>
-    <UANotes xmlns="4873beb7-5857-4685-be1f-d57550cc96cc" xsi:nil="true"/>
-    <TemplateStatus xmlns="4873beb7-5857-4685-be1f-d57550cc96cc">Complete</TemplateStatus>
-    <InternalTagsTaxHTField0 xmlns="4873beb7-5857-4685-be1f-d57550cc96cc">
-      <Terms xmlns="http://schemas.microsoft.com/office/infopath/2007/PartnerControls"/>
-    </InternalTagsTaxHTField0>
-    <CSXHash xmlns="4873beb7-5857-4685-be1f-d57550cc96cc" xsi:nil="true"/>
-    <Downloads xmlns="4873beb7-5857-4685-be1f-d57550cc96cc">0</Downloads>
-    <VoteCount xmlns="4873beb7-5857-4685-be1f-d57550cc96cc" xsi:nil="true"/>
-    <OOCacheId xmlns="4873beb7-5857-4685-be1f-d57550cc96cc" xsi:nil="true"/>
-    <IsDeleted xmlns="4873beb7-5857-4685-be1f-d57550cc96cc">false</IsDeleted>
-    <AssetExpire xmlns="4873beb7-5857-4685-be1f-d57550cc96cc">2029-01-01T08:00:00+00:00</AssetExpire>
-    <DSATActionTaken xmlns="4873beb7-5857-4685-be1f-d57550cc96cc" xsi:nil="true"/>
-    <CSXSubmissionMarket xmlns="4873beb7-5857-4685-be1f-d57550cc96cc" xsi:nil="true"/>
-    <TPExecutable xmlns="4873beb7-5857-4685-be1f-d57550cc96cc" xsi:nil="true"/>
-    <SubmitterId xmlns="4873beb7-5857-4685-be1f-d57550cc96cc" xsi:nil="true"/>
-    <EditorialTags xmlns="4873beb7-5857-4685-be1f-d57550cc96cc" xsi:nil="true"/>
-    <ApprovalLog xmlns="4873beb7-5857-4685-be1f-d57550cc96cc" xsi:nil="true"/>
-    <AssetType xmlns="4873beb7-5857-4685-be1f-d57550cc96cc">TP</AssetType>
-    <BugNumber xmlns="4873beb7-5857-4685-be1f-d57550cc96cc" xsi:nil="true"/>
-    <CSXSubmissionDate xmlns="4873beb7-5857-4685-be1f-d57550cc96cc" xsi:nil="true"/>
-    <CSXUpdate xmlns="4873beb7-5857-4685-be1f-d57550cc96cc">false</CSXUpdate>
-    <Milestone xmlns="4873beb7-5857-4685-be1f-d57550cc96cc" xsi:nil="true"/>
-    <RecommendationsModifier xmlns="4873beb7-5857-4685-be1f-d57550cc96cc" xsi:nil="true"/>
-    <OriginAsset xmlns="4873beb7-5857-4685-be1f-d57550cc96cc" xsi:nil="true"/>
-    <TPComponent xmlns="4873beb7-5857-4685-be1f-d57550cc96cc" xsi:nil="true"/>
-    <AssetId xmlns="4873beb7-5857-4685-be1f-d57550cc96cc">TP102901017</AssetId>
-    <IntlLocPriority xmlns="4873beb7-5857-4685-be1f-d57550cc96cc" xsi:nil="true"/>
-    <PolicheckWords xmlns="4873beb7-5857-4685-be1f-d57550cc96cc" xsi:nil="true"/>
-    <TPLaunchHelpLink xmlns="4873beb7-5857-4685-be1f-d57550cc96cc" xsi:nil="true"/>
-    <TPApplication xmlns="4873beb7-5857-4685-be1f-d57550cc96cc" xsi:nil="true"/>
-    <CrawlForDependencies xmlns="4873beb7-5857-4685-be1f-d57550cc96cc">false</CrawlForDependencies>
-    <HandoffToMSDN xmlns="4873beb7-5857-4685-be1f-d57550cc96cc" xsi:nil="true"/>
-    <PlannedPubDate xmlns="4873beb7-5857-4685-be1f-d57550cc96cc" xsi:nil="true"/>
-    <IntlLangReviewer xmlns="4873beb7-5857-4685-be1f-d57550cc96cc" xsi:nil="true"/>
-    <TrustLevel xmlns="4873beb7-5857-4685-be1f-d57550cc96cc">1 Microsoft Managed Content</TrustLevel>
-    <LocLastLocAttemptVersionLookup xmlns="4873beb7-5857-4685-be1f-d57550cc96cc">836753</LocLastLocAttemptVersionLookup>
-    <IsSearchable xmlns="4873beb7-5857-4685-be1f-d57550cc96cc">true</IsSearchable>
-    <TemplateTemplateType xmlns="4873beb7-5857-4685-be1f-d57550cc96cc">PowerPoint Design Template</TemplateTemplateType>
-    <CampaignTagsTaxHTField0 xmlns="4873beb7-5857-4685-be1f-d57550cc96cc">
-      <Terms xmlns="http://schemas.microsoft.com/office/infopath/2007/PartnerControls"/>
-    </CampaignTagsTaxHTField0>
-    <TPNamespace xmlns="4873beb7-5857-4685-be1f-d57550cc96cc" xsi:nil="true"/>
-    <TaxCatchAll xmlns="4873beb7-5857-4685-be1f-d57550cc96cc"/>
-    <Markets xmlns="4873beb7-5857-4685-be1f-d57550cc96cc"/>
-    <UAProjectedTotalWords xmlns="4873beb7-5857-4685-be1f-d57550cc96cc" xsi:nil="true"/>
-    <IntlLangReview xmlns="4873beb7-5857-4685-be1f-d57550cc96cc">false</IntlLangReview>
-    <OutputCachingOn xmlns="4873beb7-5857-4685-be1f-d57550cc96cc">false</OutputCachingOn>
-    <AverageRating xmlns="4873beb7-5857-4685-be1f-d57550cc96cc" xsi:nil="true"/>
-    <APAuthor xmlns="4873beb7-5857-4685-be1f-d57550cc96cc">
-      <UserInfo>
-        <DisplayName>REDMOND\v-anij</DisplayName>
-        <AccountId>2469</AccountId>
-        <AccountType/>
-      </UserInfo>
-    </APAuthor>
-    <LocManualTestRequired xmlns="4873beb7-5857-4685-be1f-d57550cc96cc">false</LocManualTestRequired>
-    <TPCommandLine xmlns="4873beb7-5857-4685-be1f-d57550cc96cc" xsi:nil="true"/>
-    <TPAppVersion xmlns="4873beb7-5857-4685-be1f-d57550cc96cc" xsi:nil="true"/>
-    <EditorialStatus xmlns="4873beb7-5857-4685-be1f-d57550cc96cc">Complete</EditorialStatus>
-    <LastModifiedDateTime xmlns="4873beb7-5857-4685-be1f-d57550cc96cc" xsi:nil="true"/>
-    <ScenarioTagsTaxHTField0 xmlns="4873beb7-5857-4685-be1f-d57550cc96cc">
-      <Terms xmlns="http://schemas.microsoft.com/office/infopath/2007/PartnerControls"/>
-    </ScenarioTagsTaxHTField0>
-    <OriginalRelease xmlns="4873beb7-5857-4685-be1f-d57550cc96cc">15</OriginalRelease>
-    <TPLaunchHelpLinkType xmlns="4873beb7-5857-4685-be1f-d57550cc96cc">Template</TPLaunchHelpLinkType>
-    <LocalizationTagsTaxHTField0 xmlns="4873beb7-5857-4685-be1f-d57550cc96cc">
-      <Terms xmlns="http://schemas.microsoft.com/office/infopath/2007/PartnerControls"/>
-    </LocalizationTagsTaxHTField0>
-    <LocMarketGroupTiers2 xmlns="4873beb7-5857-4685-be1f-d57550cc96cc" xsi:nil="true"/>
-  </documentManagement>
-</p:properties>
-</file>
-
 <file path=customXml/itemProps1.xml><?xml version="1.0" encoding="utf-8"?>
 <ds:datastoreItem xmlns:ds="http://schemas.openxmlformats.org/officeDocument/2006/customXml" ds:itemID="{746CFF6F-D9AA-4BC0-911A-0A1356771912}">
   <ds:schemaRefs>
@@ -19131,6 +19167,16 @@
 </file>
 
 <file path=customXml/itemProps2.xml><?xml version="1.0" encoding="utf-8"?>
+<ds:datastoreItem xmlns:ds="http://schemas.openxmlformats.org/officeDocument/2006/customXml" ds:itemID="{04098515-0C12-46CF-BC7C-69B4A13CD5FA}">
+  <ds:schemaRefs>
+    <ds:schemaRef ds:uri="http://schemas.microsoft.com/office/2006/metadata/properties"/>
+    <ds:schemaRef ds:uri="http://schemas.microsoft.com/office/infopath/2007/PartnerControls"/>
+    <ds:schemaRef ds:uri="4873beb7-5857-4685-be1f-d57550cc96cc"/>
+  </ds:schemaRefs>
+</ds:datastoreItem>
+</file>
+
+<file path=customXml/itemProps3.xml><?xml version="1.0" encoding="utf-8"?>
 <ds:datastoreItem xmlns:ds="http://schemas.openxmlformats.org/officeDocument/2006/customXml" ds:itemID="{0B5C6E15-39DC-470B-9445-F754B9458020}">
   <ds:schemaRefs>
     <ds:schemaRef ds:uri="http://schemas.microsoft.com/office/2006/metadata/contentType"/>
@@ -19146,14 +19192,4 @@
     <ds:schemaRef ds:uri="http://schemas.microsoft.com/internal/obd"/>
   </ds:schemaRefs>
 </ds:datastoreItem>
-</file>
-
-<file path=customXml/itemProps3.xml><?xml version="1.0" encoding="utf-8"?>
-<ds:datastoreItem xmlns:ds="http://schemas.openxmlformats.org/officeDocument/2006/customXml" ds:itemID="{04098515-0C12-46CF-BC7C-69B4A13CD5FA}">
-  <ds:schemaRefs>
-    <ds:schemaRef ds:uri="http://schemas.microsoft.com/office/2006/metadata/properties"/>
-    <ds:schemaRef ds:uri="http://schemas.microsoft.com/office/infopath/2007/PartnerControls"/>
-    <ds:schemaRef ds:uri="4873beb7-5857-4685-be1f-d57550cc96cc"/>
-  </ds:schemaRefs>
-</ds:datastoreItem>
 </file>
</xml_diff>